<commit_message>
working on presentation 2
</commit_message>
<xml_diff>
--- a/sass.pptx
+++ b/sass.pptx
@@ -15,6 +15,8 @@
     <p:sldId id="285" r:id="rId9"/>
     <p:sldId id="286" r:id="rId10"/>
     <p:sldId id="287" r:id="rId11"/>
+    <p:sldId id="288" r:id="rId12"/>
+    <p:sldId id="289" r:id="rId13"/>
   </p:sldIdLst>
   <p:sldSz cx="12192000" cy="6858000"/>
   <p:notesSz cx="6858000" cy="9144000"/>
@@ -252,7 +254,7 @@
           <a:p>
             <a:fld id="{B19AC94C-8DDE-4B1A-BDD8-5078A1882F2A}" type="datetimeFigureOut">
               <a:rPr lang="ru-RU" smtClean="0"/>
-              <a:t>08.12.2024</a:t>
+              <a:t>09.12.2024</a:t>
             </a:fld>
             <a:endParaRPr lang="ru-RU"/>
           </a:p>
@@ -422,7 +424,7 @@
           <a:p>
             <a:fld id="{B19AC94C-8DDE-4B1A-BDD8-5078A1882F2A}" type="datetimeFigureOut">
               <a:rPr lang="ru-RU" smtClean="0"/>
-              <a:t>08.12.2024</a:t>
+              <a:t>09.12.2024</a:t>
             </a:fld>
             <a:endParaRPr lang="ru-RU"/>
           </a:p>
@@ -602,7 +604,7 @@
           <a:p>
             <a:fld id="{B19AC94C-8DDE-4B1A-BDD8-5078A1882F2A}" type="datetimeFigureOut">
               <a:rPr lang="ru-RU" smtClean="0"/>
-              <a:t>08.12.2024</a:t>
+              <a:t>09.12.2024</a:t>
             </a:fld>
             <a:endParaRPr lang="ru-RU"/>
           </a:p>
@@ -772,7 +774,7 @@
           <a:p>
             <a:fld id="{B19AC94C-8DDE-4B1A-BDD8-5078A1882F2A}" type="datetimeFigureOut">
               <a:rPr lang="ru-RU" smtClean="0"/>
-              <a:t>08.12.2024</a:t>
+              <a:t>09.12.2024</a:t>
             </a:fld>
             <a:endParaRPr lang="ru-RU"/>
           </a:p>
@@ -1018,7 +1020,7 @@
           <a:p>
             <a:fld id="{B19AC94C-8DDE-4B1A-BDD8-5078A1882F2A}" type="datetimeFigureOut">
               <a:rPr lang="ru-RU" smtClean="0"/>
-              <a:t>08.12.2024</a:t>
+              <a:t>09.12.2024</a:t>
             </a:fld>
             <a:endParaRPr lang="ru-RU"/>
           </a:p>
@@ -1250,7 +1252,7 @@
           <a:p>
             <a:fld id="{B19AC94C-8DDE-4B1A-BDD8-5078A1882F2A}" type="datetimeFigureOut">
               <a:rPr lang="ru-RU" smtClean="0"/>
-              <a:t>08.12.2024</a:t>
+              <a:t>09.12.2024</a:t>
             </a:fld>
             <a:endParaRPr lang="ru-RU"/>
           </a:p>
@@ -1617,7 +1619,7 @@
           <a:p>
             <a:fld id="{B19AC94C-8DDE-4B1A-BDD8-5078A1882F2A}" type="datetimeFigureOut">
               <a:rPr lang="ru-RU" smtClean="0"/>
-              <a:t>08.12.2024</a:t>
+              <a:t>09.12.2024</a:t>
             </a:fld>
             <a:endParaRPr lang="ru-RU"/>
           </a:p>
@@ -1735,7 +1737,7 @@
           <a:p>
             <a:fld id="{B19AC94C-8DDE-4B1A-BDD8-5078A1882F2A}" type="datetimeFigureOut">
               <a:rPr lang="ru-RU" smtClean="0"/>
-              <a:t>08.12.2024</a:t>
+              <a:t>09.12.2024</a:t>
             </a:fld>
             <a:endParaRPr lang="ru-RU"/>
           </a:p>
@@ -1830,7 +1832,7 @@
           <a:p>
             <a:fld id="{B19AC94C-8DDE-4B1A-BDD8-5078A1882F2A}" type="datetimeFigureOut">
               <a:rPr lang="ru-RU" smtClean="0"/>
-              <a:t>08.12.2024</a:t>
+              <a:t>09.12.2024</a:t>
             </a:fld>
             <a:endParaRPr lang="ru-RU"/>
           </a:p>
@@ -2107,7 +2109,7 @@
           <a:p>
             <a:fld id="{B19AC94C-8DDE-4B1A-BDD8-5078A1882F2A}" type="datetimeFigureOut">
               <a:rPr lang="ru-RU" smtClean="0"/>
-              <a:t>08.12.2024</a:t>
+              <a:t>09.12.2024</a:t>
             </a:fld>
             <a:endParaRPr lang="ru-RU"/>
           </a:p>
@@ -2360,7 +2362,7 @@
           <a:p>
             <a:fld id="{B19AC94C-8DDE-4B1A-BDD8-5078A1882F2A}" type="datetimeFigureOut">
               <a:rPr lang="ru-RU" smtClean="0"/>
-              <a:t>08.12.2024</a:t>
+              <a:t>09.12.2024</a:t>
             </a:fld>
             <a:endParaRPr lang="ru-RU"/>
           </a:p>
@@ -2573,7 +2575,7 @@
           <a:p>
             <a:fld id="{B19AC94C-8DDE-4B1A-BDD8-5078A1882F2A}" type="datetimeFigureOut">
               <a:rPr lang="ru-RU" smtClean="0"/>
-              <a:t>08.12.2024</a:t>
+              <a:t>09.12.2024</a:t>
             </a:fld>
             <a:endParaRPr lang="ru-RU"/>
           </a:p>
@@ -3217,7 +3219,6 @@
               <a:rPr lang="ru-RU" dirty="0"/>
               <a:t>.</a:t>
             </a:r>
-            <a:endParaRPr lang="ru-RU" dirty="0"/>
           </a:p>
         </p:txBody>
       </p:sp>
@@ -3273,6 +3274,342 @@
     <p:extLst>
       <p:ext uri="{BB962C8B-B14F-4D97-AF65-F5344CB8AC3E}">
         <p14:creationId xmlns:p14="http://schemas.microsoft.com/office/powerpoint/2010/main" val="4164377854"/>
+      </p:ext>
+    </p:extLst>
+  </p:cSld>
+  <p:clrMapOvr>
+    <a:masterClrMapping/>
+  </p:clrMapOvr>
+</p:sld>
+</file>
+
+<file path=ppt/slides/slide11.xml><?xml version="1.0" encoding="utf-8"?>
+<p:sld xmlns:a="http://schemas.openxmlformats.org/drawingml/2006/main" xmlns:r="http://schemas.openxmlformats.org/officeDocument/2006/relationships" xmlns:p="http://schemas.openxmlformats.org/presentationml/2006/main">
+  <p:cSld>
+    <p:spTree>
+      <p:nvGrpSpPr>
+        <p:cNvPr id="1" name=""/>
+        <p:cNvGrpSpPr/>
+        <p:nvPr/>
+      </p:nvGrpSpPr>
+      <p:grpSpPr>
+        <a:xfrm>
+          <a:off x="0" y="0"/>
+          <a:ext cx="0" cy="0"/>
+          <a:chOff x="0" y="0"/>
+          <a:chExt cx="0" cy="0"/>
+        </a:xfrm>
+      </p:grpSpPr>
+      <p:sp>
+        <p:nvSpPr>
+          <p:cNvPr id="2" name="Заголовок 1"/>
+          <p:cNvSpPr>
+            <a:spLocks noGrp="1"/>
+          </p:cNvSpPr>
+          <p:nvPr>
+            <p:ph type="title"/>
+          </p:nvPr>
+        </p:nvSpPr>
+        <p:spPr/>
+        <p:txBody>
+          <a:bodyPr/>
+          <a:lstStyle/>
+          <a:p>
+            <a:r>
+              <a:rPr lang="ru-RU" dirty="0" smtClean="0"/>
+              <a:t>Прочий функционал</a:t>
+            </a:r>
+            <a:endParaRPr lang="ru-RU" dirty="0"/>
+          </a:p>
+        </p:txBody>
+      </p:sp>
+      <p:sp>
+        <p:nvSpPr>
+          <p:cNvPr id="3" name="Объект 2"/>
+          <p:cNvSpPr>
+            <a:spLocks noGrp="1"/>
+          </p:cNvSpPr>
+          <p:nvPr>
+            <p:ph idx="1"/>
+          </p:nvPr>
+        </p:nvSpPr>
+        <p:spPr/>
+        <p:txBody>
+          <a:bodyPr/>
+          <a:lstStyle/>
+          <a:p>
+            <a:r>
+              <a:rPr lang="ru-RU" dirty="0" smtClean="0"/>
+              <a:t>Работа с циклами </a:t>
+            </a:r>
+            <a:r>
+              <a:rPr lang="en-US" dirty="0" smtClean="0"/>
+              <a:t>@for, @while, @each</a:t>
+            </a:r>
+          </a:p>
+          <a:p>
+            <a:r>
+              <a:rPr lang="ru-RU" dirty="0" smtClean="0"/>
+              <a:t>Работа с операторами </a:t>
+            </a:r>
+            <a:r>
+              <a:rPr lang="en-US" dirty="0" smtClean="0"/>
+              <a:t>@if @else</a:t>
+            </a:r>
+          </a:p>
+          <a:p>
+            <a:r>
+              <a:rPr lang="ru-RU" dirty="0" smtClean="0"/>
+              <a:t>Работа с функциями </a:t>
+            </a:r>
+            <a:r>
+              <a:rPr lang="en-US" dirty="0" smtClean="0"/>
+              <a:t>@function</a:t>
+            </a:r>
+            <a:endParaRPr lang="ru-RU" dirty="0" smtClean="0"/>
+          </a:p>
+          <a:p>
+            <a:r>
+              <a:rPr lang="ru-RU" dirty="0" smtClean="0"/>
+              <a:t>Улучшенная работа с калькулятором</a:t>
+            </a:r>
+          </a:p>
+          <a:p>
+            <a:r>
+              <a:rPr lang="ru-RU" dirty="0" smtClean="0"/>
+              <a:t>Встроенные библиотеки, например математика и прочее</a:t>
+            </a:r>
+            <a:endParaRPr lang="en-US" dirty="0" smtClean="0"/>
+          </a:p>
+        </p:txBody>
+      </p:sp>
+    </p:spTree>
+    <p:extLst>
+      <p:ext uri="{BB962C8B-B14F-4D97-AF65-F5344CB8AC3E}">
+        <p14:creationId xmlns:p14="http://schemas.microsoft.com/office/powerpoint/2010/main" val="4034511706"/>
+      </p:ext>
+    </p:extLst>
+  </p:cSld>
+  <p:clrMapOvr>
+    <a:masterClrMapping/>
+  </p:clrMapOvr>
+</p:sld>
+</file>
+
+<file path=ppt/slides/slide12.xml><?xml version="1.0" encoding="utf-8"?>
+<p:sld xmlns:a="http://schemas.openxmlformats.org/drawingml/2006/main" xmlns:r="http://schemas.openxmlformats.org/officeDocument/2006/relationships" xmlns:p="http://schemas.openxmlformats.org/presentationml/2006/main">
+  <p:cSld>
+    <p:spTree>
+      <p:nvGrpSpPr>
+        <p:cNvPr id="1" name=""/>
+        <p:cNvGrpSpPr/>
+        <p:nvPr/>
+      </p:nvGrpSpPr>
+      <p:grpSpPr>
+        <a:xfrm>
+          <a:off x="0" y="0"/>
+          <a:ext cx="0" cy="0"/>
+          <a:chOff x="0" y="0"/>
+          <a:chExt cx="0" cy="0"/>
+        </a:xfrm>
+      </p:grpSpPr>
+      <p:sp>
+        <p:nvSpPr>
+          <p:cNvPr id="2" name="Заголовок 1"/>
+          <p:cNvSpPr>
+            <a:spLocks noGrp="1"/>
+          </p:cNvSpPr>
+          <p:nvPr>
+            <p:ph type="title"/>
+          </p:nvPr>
+        </p:nvSpPr>
+        <p:spPr/>
+        <p:txBody>
+          <a:bodyPr/>
+          <a:lstStyle/>
+          <a:p>
+            <a:r>
+              <a:rPr lang="ru-RU" dirty="0" smtClean="0"/>
+              <a:t>Методы компиляции</a:t>
+            </a:r>
+            <a:endParaRPr lang="ru-RU" dirty="0"/>
+          </a:p>
+        </p:txBody>
+      </p:sp>
+      <p:sp>
+        <p:nvSpPr>
+          <p:cNvPr id="3" name="Объект 2"/>
+          <p:cNvSpPr>
+            <a:spLocks noGrp="1"/>
+          </p:cNvSpPr>
+          <p:nvPr>
+            <p:ph idx="1"/>
+          </p:nvPr>
+        </p:nvSpPr>
+        <p:spPr/>
+        <p:txBody>
+          <a:bodyPr/>
+          <a:lstStyle/>
+          <a:p>
+            <a:r>
+              <a:rPr lang="en-US" b="1" dirty="0" smtClean="0"/>
+              <a:t>Live Sass Compiler - </a:t>
+            </a:r>
+            <a:r>
+              <a:rPr lang="ru-RU" dirty="0" smtClean="0"/>
+              <a:t>плагин</a:t>
+            </a:r>
+            <a:r>
+              <a:rPr lang="en-US" b="1" dirty="0" smtClean="0"/>
+              <a:t> </a:t>
+            </a:r>
+            <a:r>
+              <a:rPr lang="ru-RU" dirty="0" smtClean="0"/>
+              <a:t>в </a:t>
+            </a:r>
+            <a:r>
+              <a:rPr lang="en-US" dirty="0" smtClean="0"/>
+              <a:t>VSCODE</a:t>
+            </a:r>
+          </a:p>
+          <a:p>
+            <a:r>
+              <a:rPr lang="en-US" b="1" dirty="0" smtClean="0"/>
+              <a:t>File Watchers </a:t>
+            </a:r>
+            <a:r>
+              <a:rPr lang="ru-RU" b="1" dirty="0" smtClean="0"/>
+              <a:t>– </a:t>
+            </a:r>
+            <a:r>
+              <a:rPr lang="ru-RU" dirty="0" smtClean="0"/>
+              <a:t>утилита в </a:t>
+            </a:r>
+            <a:r>
+              <a:rPr lang="en-US" dirty="0" err="1" smtClean="0"/>
+              <a:t>PHPStorm</a:t>
+            </a:r>
+            <a:r>
+              <a:rPr lang="ru-RU" dirty="0" smtClean="0"/>
+              <a:t>, работает с </a:t>
+            </a:r>
+            <a:r>
+              <a:rPr lang="en-US" dirty="0" err="1" smtClean="0"/>
+              <a:t>npm</a:t>
+            </a:r>
+            <a:r>
+              <a:rPr lang="en-US" dirty="0" smtClean="0"/>
+              <a:t> </a:t>
+            </a:r>
+            <a:r>
+              <a:rPr lang="ru-RU" dirty="0" smtClean="0"/>
+              <a:t>пакетом</a:t>
+            </a:r>
+            <a:endParaRPr lang="en-US" dirty="0" smtClean="0"/>
+          </a:p>
+          <a:p>
+            <a:r>
+              <a:rPr lang="en-US" dirty="0" err="1" smtClean="0"/>
+              <a:t>Npm</a:t>
+            </a:r>
+            <a:r>
+              <a:rPr lang="ru-RU" dirty="0" smtClean="0"/>
+              <a:t>:</a:t>
+            </a:r>
+          </a:p>
+          <a:p>
+            <a:pPr lvl="1">
+              <a:buFont typeface="Courier New" panose="02070309020205020404" pitchFamily="49" charset="0"/>
+              <a:buChar char="o"/>
+            </a:pPr>
+            <a:r>
+              <a:rPr lang="en-US" sz="2800" b="1" dirty="0" smtClean="0"/>
+              <a:t>Sass cli</a:t>
+            </a:r>
+            <a:r>
+              <a:rPr lang="ru-RU" sz="2800" b="1" dirty="0" smtClean="0"/>
+              <a:t> </a:t>
+            </a:r>
+            <a:r>
+              <a:rPr lang="ru-RU" sz="2800" dirty="0" smtClean="0"/>
+              <a:t>глобально или локально через </a:t>
+            </a:r>
+            <a:r>
+              <a:rPr lang="en-US" sz="2800" dirty="0" err="1" smtClean="0"/>
+              <a:t>npm</a:t>
+            </a:r>
+            <a:r>
+              <a:rPr lang="en-US" sz="2800" dirty="0" smtClean="0"/>
+              <a:t> script</a:t>
+            </a:r>
+            <a:endParaRPr lang="ru-RU" sz="2800" dirty="0" smtClean="0"/>
+          </a:p>
+          <a:p>
+            <a:pPr lvl="1">
+              <a:buFont typeface="Courier New" panose="02070309020205020404" pitchFamily="49" charset="0"/>
+              <a:buChar char="o"/>
+            </a:pPr>
+            <a:r>
+              <a:rPr lang="ru-RU" sz="2800" b="1" dirty="0" smtClean="0"/>
+              <a:t>Сборщики</a:t>
+            </a:r>
+            <a:r>
+              <a:rPr lang="ru-RU" sz="2800" dirty="0" smtClean="0"/>
+              <a:t>: </a:t>
+            </a:r>
+            <a:r>
+              <a:rPr lang="en-US" sz="2800" dirty="0" smtClean="0"/>
+              <a:t>Gulp, </a:t>
+            </a:r>
+            <a:r>
+              <a:rPr lang="en-US" sz="2800" dirty="0" err="1" smtClean="0"/>
+              <a:t>Webpack</a:t>
+            </a:r>
+            <a:r>
+              <a:rPr lang="en-US" sz="2800" dirty="0" smtClean="0"/>
+              <a:t>, </a:t>
+            </a:r>
+            <a:r>
+              <a:rPr lang="en-US" sz="2800" dirty="0" err="1" smtClean="0"/>
+              <a:t>Vite</a:t>
+            </a:r>
+            <a:r>
+              <a:rPr lang="ru-RU" sz="2800" dirty="0" smtClean="0"/>
+              <a:t>…</a:t>
+            </a:r>
+          </a:p>
+          <a:p>
+            <a:pPr lvl="1">
+              <a:buFont typeface="Courier New" panose="02070309020205020404" pitchFamily="49" charset="0"/>
+              <a:buChar char="o"/>
+            </a:pPr>
+            <a:r>
+              <a:rPr lang="ru-RU" sz="2800" b="1" dirty="0" smtClean="0"/>
+              <a:t>Внешние программы-сборщики</a:t>
+            </a:r>
+            <a:r>
+              <a:rPr lang="ru-RU" sz="2800" dirty="0" smtClean="0"/>
+              <a:t>: </a:t>
+            </a:r>
+            <a:r>
+              <a:rPr lang="en-US" sz="2800" dirty="0" err="1" smtClean="0"/>
+              <a:t>Prepros</a:t>
+            </a:r>
+            <a:r>
+              <a:rPr lang="en-US" sz="2800" dirty="0" smtClean="0"/>
+              <a:t>…</a:t>
+            </a:r>
+            <a:endParaRPr lang="ru-RU" sz="2800" dirty="0" smtClean="0"/>
+          </a:p>
+          <a:p>
+            <a:endParaRPr lang="ru-RU" dirty="0"/>
+          </a:p>
+        </p:txBody>
+      </p:sp>
+    </p:spTree>
+    <p:extLst>
+      <p:ext uri="{BB962C8B-B14F-4D97-AF65-F5344CB8AC3E}">
+        <p14:creationId xmlns:p14="http://schemas.microsoft.com/office/powerpoint/2010/main" val="1095075837"/>
       </p:ext>
     </p:extLst>
   </p:cSld>
@@ -3906,11 +4243,7 @@
           <a:p>
             <a:r>
               <a:rPr lang="ru-RU" b="1" dirty="0" smtClean="0"/>
-              <a:t>П</a:t>
-            </a:r>
-            <a:r>
-              <a:rPr lang="ru-RU" b="1" dirty="0" smtClean="0"/>
-              <a:t>еременные: </a:t>
+              <a:t>Переменные: </a:t>
             </a:r>
             <a:r>
               <a:rPr lang="ru-RU" dirty="0"/>
@@ -3918,11 +4251,7 @@
             </a:r>
             <a:r>
               <a:rPr lang="ru-RU" dirty="0" smtClean="0"/>
-              <a:t>озможность </a:t>
-            </a:r>
-            <a:r>
-              <a:rPr lang="ru-RU" dirty="0" smtClean="0"/>
-              <a:t>определять </a:t>
+              <a:t>озможность определять </a:t>
             </a:r>
             <a:r>
               <a:rPr lang="ru-RU" dirty="0"/>
@@ -3952,15 +4281,7 @@
             </a:r>
             <a:r>
               <a:rPr lang="ru-RU" dirty="0" smtClean="0"/>
-              <a:t>озможность </a:t>
-            </a:r>
-            <a:r>
-              <a:rPr lang="ru-RU" dirty="0" smtClean="0"/>
-              <a:t>вкладывать правила CSS друг в друга. Благодаря этому становится проще редактировать стили</a:t>
-            </a:r>
-            <a:r>
-              <a:rPr lang="ru-RU" dirty="0" smtClean="0"/>
-              <a:t>.</a:t>
+              <a:t>озможность вкладывать правила CSS друг в друга. Благодаря этому становится проще редактировать стили.</a:t>
             </a:r>
           </a:p>
           <a:p>
@@ -4026,7 +4347,6 @@
               <a:rPr lang="ru-RU" dirty="0" smtClean="0"/>
               <a:t>кода.</a:t>
             </a:r>
-            <a:endParaRPr lang="ru-RU" dirty="0" smtClean="0"/>
           </a:p>
         </p:txBody>
       </p:sp>
@@ -6518,7 +6838,7 @@
         </p:spPr>
         <p:txBody>
           <a:bodyPr>
-            <a:normAutofit fontScale="85000" lnSpcReduction="20000"/>
+            <a:normAutofit fontScale="92500" lnSpcReduction="20000"/>
           </a:bodyPr>
           <a:lstStyle/>
           <a:p>
@@ -6551,7 +6871,15 @@
             </a:r>
             <a:r>
               <a:rPr lang="ru-RU" dirty="0"/>
-              <a:t>кода (или примеси-шаблоны), которые могут принимать аргументы (опционально) и позволяют значительно расширить возможности написания стилей и сократить затраты времени на применении однотипных правил и даже целых CSS блоков. Это что-то вроде функции, которая может принять аргумент, выполнить огромный объем работы и выдать результат в зависимости от входного параметра</a:t>
+              <a:t>кода (или примеси-шаблоны), которые могут принимать аргументы (опционально) и </a:t>
+            </a:r>
+            <a:r>
+              <a:rPr lang="ru-RU" dirty="0" smtClean="0"/>
+              <a:t>помогают </a:t>
+            </a:r>
+            <a:r>
+              <a:rPr lang="ru-RU" dirty="0"/>
+              <a:t>группировать нужные стили и повторно использовать их в нескольких местах кода или в разных CSS-файлах</a:t>
             </a:r>
             <a:r>
               <a:rPr lang="ru-RU" dirty="0" smtClean="0"/>
@@ -6609,8 +6937,34 @@
             </a:r>
             <a:r>
               <a:rPr lang="ru-RU" dirty="0"/>
-              <a:t> и передаваемые аргументы, если такие имеют место быть.</a:t>
-            </a:r>
+              <a:t> и передаваемые аргументы, </a:t>
+            </a:r>
+            <a:r>
+              <a:rPr lang="ru-RU" dirty="0" smtClean="0"/>
+              <a:t>если</a:t>
+            </a:r>
+            <a:r>
+              <a:rPr lang="en-US" dirty="0" smtClean="0"/>
+              <a:t> </a:t>
+            </a:r>
+            <a:r>
+              <a:rPr lang="ru-RU" dirty="0" smtClean="0"/>
+              <a:t>нужно.</a:t>
+            </a:r>
+          </a:p>
+          <a:p>
+            <a:pPr marL="0" indent="0">
+              <a:buNone/>
+            </a:pPr>
+            <a:r>
+              <a:rPr lang="ru-RU" dirty="0" err="1" smtClean="0"/>
+              <a:t>Миксины</a:t>
+            </a:r>
+            <a:r>
+              <a:rPr lang="ru-RU" dirty="0" smtClean="0"/>
+              <a:t> похожи на функции в языках программирования.</a:t>
+            </a:r>
+            <a:endParaRPr lang="ru-RU" dirty="0"/>
           </a:p>
         </p:txBody>
       </p:sp>

</xml_diff>

<commit_message>
working on presentation 3
</commit_message>
<xml_diff>
--- a/sass.pptx
+++ b/sass.pptx
@@ -8,15 +8,18 @@
     <p:sldId id="256" r:id="rId2"/>
     <p:sldId id="280" r:id="rId3"/>
     <p:sldId id="282" r:id="rId4"/>
-    <p:sldId id="281" r:id="rId5"/>
-    <p:sldId id="258" r:id="rId6"/>
-    <p:sldId id="283" r:id="rId7"/>
-    <p:sldId id="284" r:id="rId8"/>
-    <p:sldId id="285" r:id="rId9"/>
-    <p:sldId id="286" r:id="rId10"/>
-    <p:sldId id="287" r:id="rId11"/>
-    <p:sldId id="288" r:id="rId12"/>
-    <p:sldId id="289" r:id="rId13"/>
+    <p:sldId id="291" r:id="rId5"/>
+    <p:sldId id="281" r:id="rId6"/>
+    <p:sldId id="258" r:id="rId7"/>
+    <p:sldId id="283" r:id="rId8"/>
+    <p:sldId id="284" r:id="rId9"/>
+    <p:sldId id="285" r:id="rId10"/>
+    <p:sldId id="290" r:id="rId11"/>
+    <p:sldId id="286" r:id="rId12"/>
+    <p:sldId id="292" r:id="rId13"/>
+    <p:sldId id="287" r:id="rId14"/>
+    <p:sldId id="288" r:id="rId15"/>
+    <p:sldId id="289" r:id="rId16"/>
   </p:sldIdLst>
   <p:sldSz cx="12192000" cy="6858000"/>
   <p:notesSz cx="6858000" cy="9144000"/>
@@ -254,7 +257,7 @@
           <a:p>
             <a:fld id="{B19AC94C-8DDE-4B1A-BDD8-5078A1882F2A}" type="datetimeFigureOut">
               <a:rPr lang="ru-RU" smtClean="0"/>
-              <a:t>09.12.2024</a:t>
+              <a:t>10.12.2024</a:t>
             </a:fld>
             <a:endParaRPr lang="ru-RU"/>
           </a:p>
@@ -424,7 +427,7 @@
           <a:p>
             <a:fld id="{B19AC94C-8DDE-4B1A-BDD8-5078A1882F2A}" type="datetimeFigureOut">
               <a:rPr lang="ru-RU" smtClean="0"/>
-              <a:t>09.12.2024</a:t>
+              <a:t>10.12.2024</a:t>
             </a:fld>
             <a:endParaRPr lang="ru-RU"/>
           </a:p>
@@ -604,7 +607,7 @@
           <a:p>
             <a:fld id="{B19AC94C-8DDE-4B1A-BDD8-5078A1882F2A}" type="datetimeFigureOut">
               <a:rPr lang="ru-RU" smtClean="0"/>
-              <a:t>09.12.2024</a:t>
+              <a:t>10.12.2024</a:t>
             </a:fld>
             <a:endParaRPr lang="ru-RU"/>
           </a:p>
@@ -774,7 +777,7 @@
           <a:p>
             <a:fld id="{B19AC94C-8DDE-4B1A-BDD8-5078A1882F2A}" type="datetimeFigureOut">
               <a:rPr lang="ru-RU" smtClean="0"/>
-              <a:t>09.12.2024</a:t>
+              <a:t>10.12.2024</a:t>
             </a:fld>
             <a:endParaRPr lang="ru-RU"/>
           </a:p>
@@ -1020,7 +1023,7 @@
           <a:p>
             <a:fld id="{B19AC94C-8DDE-4B1A-BDD8-5078A1882F2A}" type="datetimeFigureOut">
               <a:rPr lang="ru-RU" smtClean="0"/>
-              <a:t>09.12.2024</a:t>
+              <a:t>10.12.2024</a:t>
             </a:fld>
             <a:endParaRPr lang="ru-RU"/>
           </a:p>
@@ -1252,7 +1255,7 @@
           <a:p>
             <a:fld id="{B19AC94C-8DDE-4B1A-BDD8-5078A1882F2A}" type="datetimeFigureOut">
               <a:rPr lang="ru-RU" smtClean="0"/>
-              <a:t>09.12.2024</a:t>
+              <a:t>10.12.2024</a:t>
             </a:fld>
             <a:endParaRPr lang="ru-RU"/>
           </a:p>
@@ -1619,7 +1622,7 @@
           <a:p>
             <a:fld id="{B19AC94C-8DDE-4B1A-BDD8-5078A1882F2A}" type="datetimeFigureOut">
               <a:rPr lang="ru-RU" smtClean="0"/>
-              <a:t>09.12.2024</a:t>
+              <a:t>10.12.2024</a:t>
             </a:fld>
             <a:endParaRPr lang="ru-RU"/>
           </a:p>
@@ -1737,7 +1740,7 @@
           <a:p>
             <a:fld id="{B19AC94C-8DDE-4B1A-BDD8-5078A1882F2A}" type="datetimeFigureOut">
               <a:rPr lang="ru-RU" smtClean="0"/>
-              <a:t>09.12.2024</a:t>
+              <a:t>10.12.2024</a:t>
             </a:fld>
             <a:endParaRPr lang="ru-RU"/>
           </a:p>
@@ -1832,7 +1835,7 @@
           <a:p>
             <a:fld id="{B19AC94C-8DDE-4B1A-BDD8-5078A1882F2A}" type="datetimeFigureOut">
               <a:rPr lang="ru-RU" smtClean="0"/>
-              <a:t>09.12.2024</a:t>
+              <a:t>10.12.2024</a:t>
             </a:fld>
             <a:endParaRPr lang="ru-RU"/>
           </a:p>
@@ -2109,7 +2112,7 @@
           <a:p>
             <a:fld id="{B19AC94C-8DDE-4B1A-BDD8-5078A1882F2A}" type="datetimeFigureOut">
               <a:rPr lang="ru-RU" smtClean="0"/>
-              <a:t>09.12.2024</a:t>
+              <a:t>10.12.2024</a:t>
             </a:fld>
             <a:endParaRPr lang="ru-RU"/>
           </a:p>
@@ -2362,7 +2365,7 @@
           <a:p>
             <a:fld id="{B19AC94C-8DDE-4B1A-BDD8-5078A1882F2A}" type="datetimeFigureOut">
               <a:rPr lang="ru-RU" smtClean="0"/>
-              <a:t>09.12.2024</a:t>
+              <a:t>10.12.2024</a:t>
             </a:fld>
             <a:endParaRPr lang="ru-RU"/>
           </a:p>
@@ -2575,7 +2578,7 @@
           <a:p>
             <a:fld id="{B19AC94C-8DDE-4B1A-BDD8-5078A1882F2A}" type="datetimeFigureOut">
               <a:rPr lang="ru-RU" smtClean="0"/>
-              <a:t>09.12.2024</a:t>
+              <a:t>10.12.2024</a:t>
             </a:fld>
             <a:endParaRPr lang="ru-RU"/>
           </a:p>
@@ -3081,6 +3084,551 @@
           <a:lstStyle/>
           <a:p>
             <a:r>
+              <a:rPr lang="ru-RU" dirty="0" err="1" smtClean="0"/>
+              <a:t>Миксины</a:t>
+            </a:r>
+            <a:endParaRPr lang="ru-RU" dirty="0"/>
+          </a:p>
+        </p:txBody>
+      </p:sp>
+      <p:sp>
+        <p:nvSpPr>
+          <p:cNvPr id="3" name="Объект 2"/>
+          <p:cNvSpPr>
+            <a:spLocks noGrp="1"/>
+          </p:cNvSpPr>
+          <p:nvPr>
+            <p:ph idx="1"/>
+          </p:nvPr>
+        </p:nvSpPr>
+        <p:spPr>
+          <a:xfrm>
+            <a:off x="838200" y="1825625"/>
+            <a:ext cx="5698067" cy="4351338"/>
+          </a:xfrm>
+        </p:spPr>
+        <p:txBody>
+          <a:bodyPr>
+            <a:normAutofit/>
+          </a:bodyPr>
+          <a:lstStyle/>
+          <a:p>
+            <a:pPr marL="0" indent="0">
+              <a:buNone/>
+            </a:pPr>
+            <a:r>
+              <a:rPr lang="ru-RU" dirty="0" err="1" smtClean="0"/>
+              <a:t>Миксин</a:t>
+            </a:r>
+            <a:r>
+              <a:rPr lang="ru-RU" dirty="0" smtClean="0"/>
+              <a:t> </a:t>
+            </a:r>
+            <a:r>
+              <a:rPr lang="ru-RU" dirty="0"/>
+              <a:t>объявляется директивой </a:t>
+            </a:r>
+            <a:r>
+              <a:rPr lang="ru-RU" b="1" dirty="0"/>
+              <a:t>@</a:t>
+            </a:r>
+            <a:r>
+              <a:rPr lang="ru-RU" b="1" dirty="0" err="1" smtClean="0"/>
+              <a:t>mixin</a:t>
+            </a:r>
+            <a:r>
+              <a:rPr lang="ru-RU" dirty="0" smtClean="0"/>
+              <a:t>. </a:t>
+            </a:r>
+            <a:r>
+              <a:rPr lang="ru-RU" dirty="0"/>
+              <a:t>Вызывается </a:t>
+            </a:r>
+            <a:r>
+              <a:rPr lang="ru-RU" dirty="0" smtClean="0"/>
+              <a:t>директивой </a:t>
+            </a:r>
+            <a:r>
+              <a:rPr lang="ru-RU" b="1" dirty="0"/>
+              <a:t>@</a:t>
+            </a:r>
+            <a:r>
+              <a:rPr lang="ru-RU" b="1" dirty="0" err="1"/>
+              <a:t>include</a:t>
+            </a:r>
+            <a:r>
+              <a:rPr lang="ru-RU" dirty="0"/>
+              <a:t>, которая принимает имя </a:t>
+            </a:r>
+            <a:r>
+              <a:rPr lang="ru-RU" dirty="0" err="1"/>
+              <a:t>миксина</a:t>
+            </a:r>
+            <a:r>
+              <a:rPr lang="ru-RU" dirty="0"/>
+              <a:t> и передаваемые аргументы, </a:t>
+            </a:r>
+            <a:r>
+              <a:rPr lang="ru-RU" dirty="0" smtClean="0"/>
+              <a:t>если</a:t>
+            </a:r>
+            <a:r>
+              <a:rPr lang="en-US" dirty="0" smtClean="0"/>
+              <a:t> </a:t>
+            </a:r>
+            <a:r>
+              <a:rPr lang="ru-RU" dirty="0" smtClean="0"/>
+              <a:t>нужно.</a:t>
+            </a:r>
+          </a:p>
+          <a:p>
+            <a:pPr marL="0" indent="0">
+              <a:buNone/>
+            </a:pPr>
+            <a:r>
+              <a:rPr lang="ru-RU" dirty="0" err="1" smtClean="0"/>
+              <a:t>Миксины</a:t>
+            </a:r>
+            <a:r>
+              <a:rPr lang="ru-RU" dirty="0" smtClean="0"/>
+              <a:t> похожи на функции в языках программирования.</a:t>
+            </a:r>
+            <a:endParaRPr lang="ru-RU" dirty="0"/>
+          </a:p>
+        </p:txBody>
+      </p:sp>
+      <p:pic>
+        <p:nvPicPr>
+          <p:cNvPr id="4" name="Рисунок 3"/>
+          <p:cNvPicPr>
+            <a:picLocks noChangeAspect="1"/>
+          </p:cNvPicPr>
+          <p:nvPr/>
+        </p:nvPicPr>
+        <p:blipFill>
+          <a:blip r:embed="rId2"/>
+          <a:stretch>
+            <a:fillRect/>
+          </a:stretch>
+        </p:blipFill>
+        <p:spPr>
+          <a:xfrm>
+            <a:off x="7240329" y="365125"/>
+            <a:ext cx="4333604" cy="6294309"/>
+          </a:xfrm>
+          <a:prstGeom prst="rect">
+            <a:avLst/>
+          </a:prstGeom>
+        </p:spPr>
+      </p:pic>
+    </p:spTree>
+    <p:extLst>
+      <p:ext uri="{BB962C8B-B14F-4D97-AF65-F5344CB8AC3E}">
+        <p14:creationId xmlns:p14="http://schemas.microsoft.com/office/powerpoint/2010/main" val="1711590112"/>
+      </p:ext>
+    </p:extLst>
+  </p:cSld>
+  <p:clrMapOvr>
+    <a:masterClrMapping/>
+  </p:clrMapOvr>
+  <p:timing>
+    <p:tnLst>
+      <p:par>
+        <p:cTn id="1" dur="indefinite" restart="never" nodeType="tmRoot"/>
+      </p:par>
+    </p:tnLst>
+  </p:timing>
+</p:sld>
+</file>
+
+<file path=ppt/slides/slide11.xml><?xml version="1.0" encoding="utf-8"?>
+<p:sld xmlns:a="http://schemas.openxmlformats.org/drawingml/2006/main" xmlns:r="http://schemas.openxmlformats.org/officeDocument/2006/relationships" xmlns:p="http://schemas.openxmlformats.org/presentationml/2006/main">
+  <p:cSld>
+    <p:spTree>
+      <p:nvGrpSpPr>
+        <p:cNvPr id="1" name=""/>
+        <p:cNvGrpSpPr/>
+        <p:nvPr/>
+      </p:nvGrpSpPr>
+      <p:grpSpPr>
+        <a:xfrm>
+          <a:off x="0" y="0"/>
+          <a:ext cx="0" cy="0"/>
+          <a:chOff x="0" y="0"/>
+          <a:chExt cx="0" cy="0"/>
+        </a:xfrm>
+      </p:grpSpPr>
+      <p:sp>
+        <p:nvSpPr>
+          <p:cNvPr id="2" name="Заголовок 1"/>
+          <p:cNvSpPr>
+            <a:spLocks noGrp="1"/>
+          </p:cNvSpPr>
+          <p:nvPr>
+            <p:ph type="title"/>
+          </p:nvPr>
+        </p:nvSpPr>
+        <p:spPr/>
+        <p:txBody>
+          <a:bodyPr/>
+          <a:lstStyle/>
+          <a:p>
+            <a:r>
+              <a:rPr lang="ru-RU" dirty="0" err="1" smtClean="0"/>
+              <a:t>Партиалы</a:t>
+            </a:r>
+            <a:r>
+              <a:rPr lang="en-US" dirty="0" smtClean="0"/>
+              <a:t>|</a:t>
+            </a:r>
+            <a:r>
+              <a:rPr lang="ru-RU" dirty="0" err="1" smtClean="0"/>
+              <a:t>Компонентность</a:t>
+            </a:r>
+            <a:endParaRPr lang="ru-RU" dirty="0"/>
+          </a:p>
+        </p:txBody>
+      </p:sp>
+      <p:sp>
+        <p:nvSpPr>
+          <p:cNvPr id="3" name="Объект 2"/>
+          <p:cNvSpPr>
+            <a:spLocks noGrp="1"/>
+          </p:cNvSpPr>
+          <p:nvPr>
+            <p:ph idx="1"/>
+          </p:nvPr>
+        </p:nvSpPr>
+        <p:spPr>
+          <a:xfrm>
+            <a:off x="838200" y="1825625"/>
+            <a:ext cx="6409267" cy="4351338"/>
+          </a:xfrm>
+        </p:spPr>
+        <p:txBody>
+          <a:bodyPr>
+            <a:normAutofit fontScale="92500"/>
+          </a:bodyPr>
+          <a:lstStyle/>
+          <a:p>
+            <a:pPr marL="0" indent="0">
+              <a:buNone/>
+            </a:pPr>
+            <a:r>
+              <a:rPr lang="ru-RU" dirty="0" err="1"/>
+              <a:t>Компонентность</a:t>
+            </a:r>
+            <a:r>
+              <a:rPr lang="ru-RU" dirty="0"/>
+              <a:t> в </a:t>
+            </a:r>
+            <a:r>
+              <a:rPr lang="ru-RU" dirty="0"/>
+              <a:t>SCSS — это </a:t>
+            </a:r>
+            <a:r>
+              <a:rPr lang="ru-RU" dirty="0" smtClean="0"/>
+              <a:t>подход, </a:t>
+            </a:r>
+            <a:r>
+              <a:rPr lang="ru-RU" dirty="0"/>
+              <a:t>который </a:t>
+            </a:r>
+            <a:r>
+              <a:rPr lang="ru-RU" dirty="0" smtClean="0"/>
+              <a:t>позволяет разделить стили на отдельные </a:t>
+            </a:r>
+            <a:r>
+              <a:rPr lang="ru-RU" dirty="0" smtClean="0"/>
+              <a:t>файлы, </a:t>
+            </a:r>
+            <a:r>
+              <a:rPr lang="ru-RU" dirty="0"/>
+              <a:t>каждый из которых </a:t>
+            </a:r>
+            <a:r>
+              <a:rPr lang="ru-RU" dirty="0" smtClean="0"/>
+              <a:t>может отвечать за определённый функционал, хранить переменные и т.д.</a:t>
+            </a:r>
+            <a:endParaRPr lang="ru-RU" dirty="0" smtClean="0"/>
+          </a:p>
+          <a:p>
+            <a:pPr marL="0" indent="0">
+              <a:buNone/>
+            </a:pPr>
+            <a:r>
+              <a:rPr lang="ru-RU" dirty="0" smtClean="0"/>
+              <a:t>Эти </a:t>
+            </a:r>
+            <a:r>
+              <a:rPr lang="ru-RU" dirty="0"/>
+              <a:t>отдельные файлы называются </a:t>
+            </a:r>
+            <a:r>
+              <a:rPr lang="ru-RU" b="1" dirty="0" err="1"/>
+              <a:t>партиалами</a:t>
+            </a:r>
+            <a:r>
+              <a:rPr lang="ru-RU" b="1" dirty="0"/>
+              <a:t> (</a:t>
+            </a:r>
+            <a:r>
+              <a:rPr lang="ru-RU" b="1" dirty="0" err="1"/>
+              <a:t>partials</a:t>
+            </a:r>
+            <a:r>
+              <a:rPr lang="ru-RU" b="1" dirty="0" smtClean="0"/>
+              <a:t>), </a:t>
+            </a:r>
+            <a:r>
+              <a:rPr lang="ru-RU" dirty="0" smtClean="0"/>
+              <a:t>именуются с</a:t>
+            </a:r>
+            <a:r>
+              <a:rPr lang="ru-RU" dirty="0" smtClean="0"/>
+              <a:t> </a:t>
+            </a:r>
+            <a:r>
+              <a:rPr lang="ru-RU" b="1" dirty="0" smtClean="0"/>
+              <a:t>нижним подчёркиванием</a:t>
+            </a:r>
+            <a:r>
+              <a:rPr lang="ru-RU" dirty="0" smtClean="0"/>
+              <a:t> </a:t>
+            </a:r>
+            <a:r>
+              <a:rPr lang="ru-RU" dirty="0" smtClean="0"/>
+              <a:t>в начале </a:t>
+            </a:r>
+            <a:r>
+              <a:rPr lang="ru-RU" dirty="0" smtClean="0"/>
+              <a:t>и таким образом становятся </a:t>
+            </a:r>
+            <a:r>
+              <a:rPr lang="ru-RU" dirty="0" smtClean="0"/>
+              <a:t>«</a:t>
+            </a:r>
+            <a:r>
+              <a:rPr lang="ru-RU" dirty="0" smtClean="0"/>
+              <a:t>служебными».</a:t>
+            </a:r>
+            <a:endParaRPr lang="ru-RU" dirty="0"/>
+          </a:p>
+          <a:p>
+            <a:pPr marL="0" indent="0">
+              <a:buNone/>
+            </a:pPr>
+            <a:r>
+              <a:rPr lang="ru-RU" dirty="0" err="1" smtClean="0"/>
+              <a:t>Партиалы</a:t>
+            </a:r>
+            <a:r>
+              <a:rPr lang="ru-RU" dirty="0" smtClean="0"/>
+              <a:t> можно импортировать в простом </a:t>
+            </a:r>
+            <a:r>
+              <a:rPr lang="en-US" dirty="0" err="1" smtClean="0"/>
+              <a:t>scss</a:t>
+            </a:r>
+            <a:r>
+              <a:rPr lang="en-US" dirty="0" smtClean="0"/>
+              <a:t> </a:t>
+            </a:r>
+            <a:r>
+              <a:rPr lang="ru-RU" dirty="0" smtClean="0"/>
+              <a:t>файле.</a:t>
+            </a:r>
+            <a:endParaRPr lang="ru-RU" dirty="0" smtClean="0"/>
+          </a:p>
+        </p:txBody>
+      </p:sp>
+      <p:pic>
+        <p:nvPicPr>
+          <p:cNvPr id="4" name="Рисунок 3"/>
+          <p:cNvPicPr>
+            <a:picLocks noChangeAspect="1"/>
+          </p:cNvPicPr>
+          <p:nvPr/>
+        </p:nvPicPr>
+        <p:blipFill>
+          <a:blip r:embed="rId2"/>
+          <a:stretch>
+            <a:fillRect/>
+          </a:stretch>
+        </p:blipFill>
+        <p:spPr>
+          <a:xfrm>
+            <a:off x="7518400" y="1104503"/>
+            <a:ext cx="4161486" cy="5072460"/>
+          </a:xfrm>
+          <a:prstGeom prst="rect">
+            <a:avLst/>
+          </a:prstGeom>
+        </p:spPr>
+      </p:pic>
+    </p:spTree>
+    <p:extLst>
+      <p:ext uri="{BB962C8B-B14F-4D97-AF65-F5344CB8AC3E}">
+        <p14:creationId xmlns:p14="http://schemas.microsoft.com/office/powerpoint/2010/main" val="4021521894"/>
+      </p:ext>
+    </p:extLst>
+  </p:cSld>
+  <p:clrMapOvr>
+    <a:masterClrMapping/>
+  </p:clrMapOvr>
+  <p:timing>
+    <p:tnLst>
+      <p:par>
+        <p:cTn id="1" dur="indefinite" restart="never" nodeType="tmRoot"/>
+      </p:par>
+    </p:tnLst>
+  </p:timing>
+</p:sld>
+</file>
+
+<file path=ppt/slides/slide12.xml><?xml version="1.0" encoding="utf-8"?>
+<p:sld xmlns:a="http://schemas.openxmlformats.org/drawingml/2006/main" xmlns:r="http://schemas.openxmlformats.org/officeDocument/2006/relationships" xmlns:p="http://schemas.openxmlformats.org/presentationml/2006/main">
+  <p:cSld>
+    <p:spTree>
+      <p:nvGrpSpPr>
+        <p:cNvPr id="1" name=""/>
+        <p:cNvGrpSpPr/>
+        <p:nvPr/>
+      </p:nvGrpSpPr>
+      <p:grpSpPr>
+        <a:xfrm>
+          <a:off x="0" y="0"/>
+          <a:ext cx="0" cy="0"/>
+          <a:chOff x="0" y="0"/>
+          <a:chExt cx="0" cy="0"/>
+        </a:xfrm>
+      </p:grpSpPr>
+      <p:sp>
+        <p:nvSpPr>
+          <p:cNvPr id="2" name="Заголовок 1"/>
+          <p:cNvSpPr>
+            <a:spLocks noGrp="1"/>
+          </p:cNvSpPr>
+          <p:nvPr>
+            <p:ph type="title"/>
+          </p:nvPr>
+        </p:nvSpPr>
+        <p:spPr/>
+        <p:txBody>
+          <a:bodyPr/>
+          <a:lstStyle/>
+          <a:p>
+            <a:r>
+              <a:rPr lang="en-US" dirty="0" smtClean="0"/>
+              <a:t>@import</a:t>
+            </a:r>
+            <a:endParaRPr lang="ru-RU" dirty="0"/>
+          </a:p>
+        </p:txBody>
+      </p:sp>
+      <p:sp>
+        <p:nvSpPr>
+          <p:cNvPr id="3" name="Объект 2"/>
+          <p:cNvSpPr>
+            <a:spLocks noGrp="1"/>
+          </p:cNvSpPr>
+          <p:nvPr>
+            <p:ph idx="1"/>
+          </p:nvPr>
+        </p:nvSpPr>
+        <p:spPr/>
+        <p:txBody>
+          <a:bodyPr/>
+          <a:lstStyle/>
+          <a:p>
+            <a:pPr marL="0" indent="0">
+              <a:buNone/>
+            </a:pPr>
+            <a:r>
+              <a:rPr lang="ru-RU" dirty="0" smtClean="0"/>
+              <a:t>Метод </a:t>
+            </a:r>
+            <a:r>
+              <a:rPr lang="en-US" dirty="0" smtClean="0"/>
+              <a:t>@import</a:t>
+            </a:r>
+            <a:r>
+              <a:rPr lang="ru-RU" dirty="0" smtClean="0"/>
+              <a:t> позволяет подключать </a:t>
+            </a:r>
+            <a:r>
+              <a:rPr lang="en-US" dirty="0" smtClean="0"/>
+              <a:t>sass </a:t>
+            </a:r>
+            <a:r>
+              <a:rPr lang="ru-RU" dirty="0" err="1" smtClean="0"/>
+              <a:t>патриалы</a:t>
+            </a:r>
+            <a:r>
+              <a:rPr lang="ru-RU" dirty="0"/>
+              <a:t> </a:t>
+            </a:r>
+            <a:r>
+              <a:rPr lang="ru-RU" smtClean="0"/>
+              <a:t>и использовать </a:t>
+            </a:r>
+            <a:endParaRPr lang="ru-RU" dirty="0"/>
+          </a:p>
+        </p:txBody>
+      </p:sp>
+    </p:spTree>
+    <p:extLst>
+      <p:ext uri="{BB962C8B-B14F-4D97-AF65-F5344CB8AC3E}">
+        <p14:creationId xmlns:p14="http://schemas.microsoft.com/office/powerpoint/2010/main" val="555393070"/>
+      </p:ext>
+    </p:extLst>
+  </p:cSld>
+  <p:clrMapOvr>
+    <a:masterClrMapping/>
+  </p:clrMapOvr>
+  <p:timing>
+    <p:tnLst>
+      <p:par>
+        <p:cTn id="1" dur="indefinite" restart="never" nodeType="tmRoot"/>
+      </p:par>
+    </p:tnLst>
+  </p:timing>
+</p:sld>
+</file>
+
+<file path=ppt/slides/slide13.xml><?xml version="1.0" encoding="utf-8"?>
+<p:sld xmlns:a="http://schemas.openxmlformats.org/drawingml/2006/main" xmlns:r="http://schemas.openxmlformats.org/officeDocument/2006/relationships" xmlns:p="http://schemas.openxmlformats.org/presentationml/2006/main">
+  <p:cSld>
+    <p:spTree>
+      <p:nvGrpSpPr>
+        <p:cNvPr id="1" name=""/>
+        <p:cNvGrpSpPr/>
+        <p:nvPr/>
+      </p:nvGrpSpPr>
+      <p:grpSpPr>
+        <a:xfrm>
+          <a:off x="0" y="0"/>
+          <a:ext cx="0" cy="0"/>
+          <a:chOff x="0" y="0"/>
+          <a:chExt cx="0" cy="0"/>
+        </a:xfrm>
+      </p:grpSpPr>
+      <p:sp>
+        <p:nvSpPr>
+          <p:cNvPr id="2" name="Заголовок 1"/>
+          <p:cNvSpPr>
+            <a:spLocks noGrp="1"/>
+          </p:cNvSpPr>
+          <p:nvPr>
+            <p:ph type="title"/>
+          </p:nvPr>
+        </p:nvSpPr>
+        <p:spPr/>
+        <p:txBody>
+          <a:bodyPr/>
+          <a:lstStyle/>
+          <a:p>
+            <a:r>
               <a:rPr lang="ru-RU" dirty="0" smtClean="0"/>
               <a:t>Наследование и </a:t>
             </a:r>
@@ -3280,10 +3828,17 @@
   <p:clrMapOvr>
     <a:masterClrMapping/>
   </p:clrMapOvr>
+  <p:timing>
+    <p:tnLst>
+      <p:par>
+        <p:cTn id="1" dur="indefinite" restart="never" nodeType="tmRoot"/>
+      </p:par>
+    </p:tnLst>
+  </p:timing>
 </p:sld>
 </file>
 
-<file path=ppt/slides/slide11.xml><?xml version="1.0" encoding="utf-8"?>
+<file path=ppt/slides/slide14.xml><?xml version="1.0" encoding="utf-8"?>
 <p:sld xmlns:a="http://schemas.openxmlformats.org/drawingml/2006/main" xmlns:r="http://schemas.openxmlformats.org/officeDocument/2006/relationships" xmlns:p="http://schemas.openxmlformats.org/presentationml/2006/main">
   <p:cSld>
     <p:spTree>
@@ -3340,7 +3895,11 @@
           <a:p>
             <a:r>
               <a:rPr lang="ru-RU" dirty="0" smtClean="0"/>
-              <a:t>Работа с циклами </a:t>
+              <a:t>Работа </a:t>
+            </a:r>
+            <a:r>
+              <a:rPr lang="ru-RU" dirty="0" smtClean="0"/>
+              <a:t>с циклами </a:t>
             </a:r>
             <a:r>
               <a:rPr lang="en-US" dirty="0" smtClean="0"/>
@@ -3364,15 +3923,39 @@
             </a:r>
             <a:r>
               <a:rPr lang="en-US" dirty="0" smtClean="0"/>
-              <a:t>@function</a:t>
+              <a:t>@</a:t>
+            </a:r>
+            <a:r>
+              <a:rPr lang="en-US" dirty="0" smtClean="0"/>
+              <a:t>function</a:t>
             </a:r>
             <a:endParaRPr lang="ru-RU" dirty="0" smtClean="0"/>
           </a:p>
           <a:p>
             <a:r>
               <a:rPr lang="ru-RU" dirty="0" smtClean="0"/>
-              <a:t>Улучшенная работа с калькулятором</a:t>
-            </a:r>
+              <a:t>Отладка стилей через </a:t>
+            </a:r>
+            <a:r>
+              <a:rPr lang="en-US" dirty="0" smtClean="0"/>
+              <a:t>@error, @warn, </a:t>
+            </a:r>
+            <a:r>
+              <a:rPr lang="en-US" dirty="0"/>
+              <a:t>@debug</a:t>
+            </a:r>
+            <a:endParaRPr lang="ru-RU" dirty="0" smtClean="0"/>
+          </a:p>
+          <a:p>
+            <a:r>
+              <a:rPr lang="ru-RU" dirty="0" smtClean="0"/>
+              <a:t>Улучшенная работа </a:t>
+            </a:r>
+            <a:r>
+              <a:rPr lang="ru-RU" dirty="0" smtClean="0"/>
+              <a:t>со строками, вычислениями и т.д.</a:t>
+            </a:r>
+            <a:endParaRPr lang="ru-RU" dirty="0" smtClean="0"/>
           </a:p>
           <a:p>
             <a:r>
@@ -3393,10 +3976,17 @@
   <p:clrMapOvr>
     <a:masterClrMapping/>
   </p:clrMapOvr>
+  <p:timing>
+    <p:tnLst>
+      <p:par>
+        <p:cTn id="1" dur="indefinite" restart="never" nodeType="tmRoot"/>
+      </p:par>
+    </p:tnLst>
+  </p:timing>
 </p:sld>
 </file>
 
-<file path=ppt/slides/slide12.xml><?xml version="1.0" encoding="utf-8"?>
+<file path=ppt/slides/slide15.xml><?xml version="1.0" encoding="utf-8"?>
 <p:sld xmlns:a="http://schemas.openxmlformats.org/drawingml/2006/main" xmlns:r="http://schemas.openxmlformats.org/officeDocument/2006/relationships" xmlns:p="http://schemas.openxmlformats.org/presentationml/2006/main">
   <p:cSld>
     <p:spTree>
@@ -3799,6 +4389,13 @@
   <p:clrMapOvr>
     <a:masterClrMapping/>
   </p:clrMapOvr>
+  <p:timing>
+    <p:tnLst>
+      <p:par>
+        <p:cTn id="1" dur="indefinite" restart="never" nodeType="tmRoot"/>
+      </p:par>
+    </p:tnLst>
+  </p:timing>
 </p:sld>
 </file>
 
@@ -3856,10 +4453,15 @@
             <p:ph idx="1"/>
           </p:nvPr>
         </p:nvSpPr>
-        <p:spPr/>
+        <p:spPr>
+          <a:xfrm>
+            <a:off x="838200" y="1825625"/>
+            <a:ext cx="10515600" cy="4351338"/>
+          </a:xfrm>
+        </p:spPr>
         <p:txBody>
           <a:bodyPr>
-            <a:normAutofit fontScale="92500" lnSpcReduction="10000"/>
+            <a:normAutofit/>
           </a:bodyPr>
           <a:lstStyle/>
           <a:p>
@@ -3949,101 +4551,44 @@
             </a:r>
             <a:r>
               <a:rPr lang="ru-RU" dirty="0" smtClean="0"/>
-              <a:t>тот же препроцессор, синтаксис которого похож на CSS.</a:t>
-            </a:r>
-            <a:endParaRPr lang="ru-RU" dirty="0"/>
+              <a:t>тот же препроцессор, синтаксис которого похож на CSS</a:t>
+            </a:r>
+            <a:r>
+              <a:rPr lang="ru-RU" dirty="0" smtClean="0"/>
+              <a:t>.</a:t>
+            </a:r>
+            <a:endParaRPr lang="en-US" dirty="0" smtClean="0"/>
           </a:p>
           <a:p>
             <a:pPr marL="0" indent="0">
               <a:buNone/>
             </a:pPr>
             <a:r>
-              <a:rPr lang="ru-RU" dirty="0"/>
-              <a:t>Отличительная особенность </a:t>
+              <a:rPr lang="ru-RU" dirty="0" smtClean="0"/>
+              <a:t>Препроцессор сначала был выпущен на языке </a:t>
+            </a:r>
+            <a:r>
+              <a:rPr lang="en-US" b="1" dirty="0" smtClean="0"/>
+              <a:t>Ruby (Ruby Sass)</a:t>
+            </a:r>
+            <a:r>
+              <a:rPr lang="ru-RU" dirty="0" smtClean="0"/>
+              <a:t>,</a:t>
+            </a:r>
+            <a:r>
+              <a:rPr lang="en-US" dirty="0"/>
+              <a:t> </a:t>
+            </a:r>
+            <a:r>
+              <a:rPr lang="ru-RU" dirty="0" smtClean="0"/>
+              <a:t>на сегодняшний день работает и обновляется на </a:t>
+            </a:r>
+            <a:r>
+              <a:rPr lang="en-US" b="1" dirty="0" smtClean="0"/>
+              <a:t>Dart (Dart Sass)</a:t>
             </a:r>
             <a:r>
               <a:rPr lang="en-US" dirty="0" smtClean="0"/>
-              <a:t>Sass</a:t>
-            </a:r>
-            <a:r>
-              <a:rPr lang="ru-RU" dirty="0" smtClean="0"/>
-              <a:t> в препроцессорах</a:t>
-            </a:r>
-            <a:r>
-              <a:rPr lang="en-US" dirty="0" smtClean="0"/>
-              <a:t> </a:t>
-            </a:r>
-            <a:r>
-              <a:rPr lang="en-US" dirty="0"/>
-              <a:t>— </a:t>
-            </a:r>
-            <a:r>
-              <a:rPr lang="ru-RU" dirty="0"/>
-              <a:t>наличие двух </a:t>
-            </a:r>
-            <a:r>
-              <a:rPr lang="ru-RU" dirty="0" smtClean="0"/>
-              <a:t>синтаксисов:</a:t>
-            </a:r>
-            <a:endParaRPr lang="ru-RU" dirty="0"/>
-          </a:p>
-          <a:p>
-            <a:r>
-              <a:rPr lang="en-US" b="1" dirty="0" smtClean="0"/>
-              <a:t>SASS</a:t>
-            </a:r>
-            <a:r>
-              <a:rPr lang="en-US" dirty="0" smtClean="0"/>
-              <a:t> </a:t>
-            </a:r>
-            <a:r>
-              <a:rPr lang="ru-RU" dirty="0"/>
-              <a:t>не использует фигурные скобки, характерные для стилей </a:t>
-            </a:r>
-            <a:r>
-              <a:rPr lang="en-US" dirty="0"/>
-              <a:t>CSS. </a:t>
-            </a:r>
-            <a:r>
-              <a:rPr lang="ru-RU" dirty="0"/>
-              <a:t>Вместо них применяются отступы. Расширение файла — </a:t>
-            </a:r>
-            <a:r>
-              <a:rPr lang="ru-RU" b="1" dirty="0"/>
-              <a:t>.</a:t>
-            </a:r>
-            <a:r>
-              <a:rPr lang="en-US" b="1" dirty="0"/>
-              <a:t>sass</a:t>
-            </a:r>
-            <a:r>
-              <a:rPr lang="en-US" dirty="0"/>
-              <a:t>.</a:t>
-            </a:r>
-          </a:p>
-          <a:p>
-            <a:r>
-              <a:rPr lang="en-US" b="1" dirty="0" smtClean="0"/>
-              <a:t>SCSS</a:t>
-            </a:r>
-            <a:r>
-              <a:rPr lang="en-US" dirty="0" smtClean="0"/>
-              <a:t> </a:t>
-            </a:r>
-            <a:r>
-              <a:rPr lang="ru-RU" dirty="0"/>
-              <a:t>использует фигурные скобки. Расширение файла — </a:t>
-            </a:r>
-            <a:r>
-              <a:rPr lang="ru-RU" b="1" dirty="0"/>
-              <a:t>.</a:t>
-            </a:r>
-            <a:r>
-              <a:rPr lang="en-US" b="1" dirty="0" err="1"/>
-              <a:t>scss</a:t>
-            </a:r>
-            <a:r>
-              <a:rPr lang="en-US" dirty="0"/>
               <a:t>.</a:t>
             </a:r>
             <a:endParaRPr lang="ru-RU" dirty="0"/>
@@ -4102,6 +4647,187 @@
           <a:bodyPr/>
           <a:lstStyle/>
           <a:p>
+            <a:r>
+              <a:rPr lang="ru-RU" dirty="0"/>
+              <a:t>Что такое </a:t>
+            </a:r>
+            <a:r>
+              <a:rPr lang="en-US" dirty="0" smtClean="0"/>
+              <a:t>SASS?</a:t>
+            </a:r>
+            <a:endParaRPr lang="ru-RU" dirty="0"/>
+          </a:p>
+        </p:txBody>
+      </p:sp>
+      <p:sp>
+        <p:nvSpPr>
+          <p:cNvPr id="3" name="Объект 2"/>
+          <p:cNvSpPr>
+            <a:spLocks noGrp="1"/>
+          </p:cNvSpPr>
+          <p:nvPr>
+            <p:ph idx="1"/>
+          </p:nvPr>
+        </p:nvSpPr>
+        <p:spPr/>
+        <p:txBody>
+          <a:bodyPr>
+            <a:normAutofit/>
+          </a:bodyPr>
+          <a:lstStyle/>
+          <a:p>
+            <a:pPr marL="0" indent="0">
+              <a:buNone/>
+            </a:pPr>
+            <a:r>
+              <a:rPr lang="ru-RU" smtClean="0"/>
+              <a:t>Отличительная </a:t>
+            </a:r>
+            <a:r>
+              <a:rPr lang="ru-RU" dirty="0"/>
+              <a:t>особенность </a:t>
+            </a:r>
+            <a:r>
+              <a:rPr lang="en-US" dirty="0" smtClean="0"/>
+              <a:t>Sass</a:t>
+            </a:r>
+            <a:r>
+              <a:rPr lang="ru-RU" dirty="0" smtClean="0"/>
+              <a:t> в препроцессорах</a:t>
+            </a:r>
+            <a:r>
+              <a:rPr lang="en-US" dirty="0" smtClean="0"/>
+              <a:t> </a:t>
+            </a:r>
+            <a:r>
+              <a:rPr lang="en-US" dirty="0"/>
+              <a:t>— </a:t>
+            </a:r>
+            <a:r>
+              <a:rPr lang="ru-RU" dirty="0"/>
+              <a:t>наличие двух </a:t>
+            </a:r>
+            <a:r>
+              <a:rPr lang="ru-RU" dirty="0" smtClean="0"/>
+              <a:t>синтаксисов:</a:t>
+            </a:r>
+            <a:endParaRPr lang="ru-RU" dirty="0"/>
+          </a:p>
+          <a:p>
+            <a:r>
+              <a:rPr lang="en-US" b="1" dirty="0" smtClean="0"/>
+              <a:t>SASS</a:t>
+            </a:r>
+            <a:r>
+              <a:rPr lang="en-US" dirty="0" smtClean="0"/>
+              <a:t> </a:t>
+            </a:r>
+            <a:r>
+              <a:rPr lang="ru-RU" dirty="0"/>
+              <a:t>не использует фигурные скобки, характерные для стилей </a:t>
+            </a:r>
+            <a:r>
+              <a:rPr lang="en-US" dirty="0"/>
+              <a:t>CSS. </a:t>
+            </a:r>
+            <a:r>
+              <a:rPr lang="ru-RU" dirty="0"/>
+              <a:t>Вместо них применяются отступы. Расширение файла — </a:t>
+            </a:r>
+            <a:r>
+              <a:rPr lang="ru-RU" b="1" dirty="0"/>
+              <a:t>.</a:t>
+            </a:r>
+            <a:r>
+              <a:rPr lang="en-US" b="1" dirty="0"/>
+              <a:t>sass</a:t>
+            </a:r>
+            <a:r>
+              <a:rPr lang="en-US" dirty="0"/>
+              <a:t>.</a:t>
+            </a:r>
+          </a:p>
+          <a:p>
+            <a:r>
+              <a:rPr lang="en-US" b="1" dirty="0" smtClean="0"/>
+              <a:t>SCSS</a:t>
+            </a:r>
+            <a:r>
+              <a:rPr lang="en-US" dirty="0" smtClean="0"/>
+              <a:t> </a:t>
+            </a:r>
+            <a:r>
+              <a:rPr lang="ru-RU" dirty="0"/>
+              <a:t>использует фигурные скобки. Расширение файла — </a:t>
+            </a:r>
+            <a:r>
+              <a:rPr lang="ru-RU" b="1" dirty="0"/>
+              <a:t>.</a:t>
+            </a:r>
+            <a:r>
+              <a:rPr lang="en-US" b="1" dirty="0" err="1"/>
+              <a:t>scss</a:t>
+            </a:r>
+            <a:r>
+              <a:rPr lang="en-US" dirty="0"/>
+              <a:t>.</a:t>
+            </a:r>
+            <a:endParaRPr lang="ru-RU" dirty="0"/>
+          </a:p>
+        </p:txBody>
+      </p:sp>
+    </p:spTree>
+    <p:extLst>
+      <p:ext uri="{BB962C8B-B14F-4D97-AF65-F5344CB8AC3E}">
+        <p14:creationId xmlns:p14="http://schemas.microsoft.com/office/powerpoint/2010/main" val="2292879604"/>
+      </p:ext>
+    </p:extLst>
+  </p:cSld>
+  <p:clrMapOvr>
+    <a:masterClrMapping/>
+  </p:clrMapOvr>
+  <p:timing>
+    <p:tnLst>
+      <p:par>
+        <p:cTn id="1" dur="indefinite" restart="never" nodeType="tmRoot"/>
+      </p:par>
+    </p:tnLst>
+  </p:timing>
+</p:sld>
+</file>
+
+<file path=ppt/slides/slide5.xml><?xml version="1.0" encoding="utf-8"?>
+<p:sld xmlns:a="http://schemas.openxmlformats.org/drawingml/2006/main" xmlns:r="http://schemas.openxmlformats.org/officeDocument/2006/relationships" xmlns:p="http://schemas.openxmlformats.org/presentationml/2006/main">
+  <p:cSld>
+    <p:spTree>
+      <p:nvGrpSpPr>
+        <p:cNvPr id="1" name=""/>
+        <p:cNvGrpSpPr/>
+        <p:nvPr/>
+      </p:nvGrpSpPr>
+      <p:grpSpPr>
+        <a:xfrm>
+          <a:off x="0" y="0"/>
+          <a:ext cx="0" cy="0"/>
+          <a:chOff x="0" y="0"/>
+          <a:chExt cx="0" cy="0"/>
+        </a:xfrm>
+      </p:grpSpPr>
+      <p:sp>
+        <p:nvSpPr>
+          <p:cNvPr id="2" name="Заголовок 1"/>
+          <p:cNvSpPr>
+            <a:spLocks noGrp="1"/>
+          </p:cNvSpPr>
+          <p:nvPr>
+            <p:ph type="title"/>
+          </p:nvPr>
+        </p:nvSpPr>
+        <p:spPr/>
+        <p:txBody>
+          <a:bodyPr/>
+          <a:lstStyle/>
+          <a:p>
             <a:endParaRPr lang="ru-RU"/>
           </a:p>
         </p:txBody>
@@ -4148,8 +4874,8 @@
         </p:blipFill>
         <p:spPr bwMode="auto">
           <a:xfrm>
-            <a:off x="1272209" y="405040"/>
-            <a:ext cx="9647582" cy="6047920"/>
+            <a:off x="838200" y="132967"/>
+            <a:ext cx="10515600" cy="6592067"/>
           </a:xfrm>
           <a:prstGeom prst="rect">
             <a:avLst/>
@@ -4170,190 +4896,6 @@
     <p:extLst>
       <p:ext uri="{BB962C8B-B14F-4D97-AF65-F5344CB8AC3E}">
         <p14:creationId xmlns:p14="http://schemas.microsoft.com/office/powerpoint/2010/main" val="1596811204"/>
-      </p:ext>
-    </p:extLst>
-  </p:cSld>
-  <p:clrMapOvr>
-    <a:masterClrMapping/>
-  </p:clrMapOvr>
-</p:sld>
-</file>
-
-<file path=ppt/slides/slide5.xml><?xml version="1.0" encoding="utf-8"?>
-<p:sld xmlns:a="http://schemas.openxmlformats.org/drawingml/2006/main" xmlns:r="http://schemas.openxmlformats.org/officeDocument/2006/relationships" xmlns:p="http://schemas.openxmlformats.org/presentationml/2006/main">
-  <p:cSld>
-    <p:spTree>
-      <p:nvGrpSpPr>
-        <p:cNvPr id="1" name=""/>
-        <p:cNvGrpSpPr/>
-        <p:nvPr/>
-      </p:nvGrpSpPr>
-      <p:grpSpPr>
-        <a:xfrm>
-          <a:off x="0" y="0"/>
-          <a:ext cx="0" cy="0"/>
-          <a:chOff x="0" y="0"/>
-          <a:chExt cx="0" cy="0"/>
-        </a:xfrm>
-      </p:grpSpPr>
-      <p:sp>
-        <p:nvSpPr>
-          <p:cNvPr id="2" name="Заголовок 1"/>
-          <p:cNvSpPr>
-            <a:spLocks noGrp="1"/>
-          </p:cNvSpPr>
-          <p:nvPr>
-            <p:ph type="title"/>
-          </p:nvPr>
-        </p:nvSpPr>
-        <p:spPr/>
-        <p:txBody>
-          <a:bodyPr/>
-          <a:lstStyle/>
-          <a:p>
-            <a:r>
-              <a:rPr lang="ru-RU" dirty="0" smtClean="0"/>
-              <a:t>Основные возможности</a:t>
-            </a:r>
-            <a:endParaRPr lang="ru-RU" dirty="0"/>
-          </a:p>
-        </p:txBody>
-      </p:sp>
-      <p:sp>
-        <p:nvSpPr>
-          <p:cNvPr id="3" name="Объект 2"/>
-          <p:cNvSpPr>
-            <a:spLocks noGrp="1"/>
-          </p:cNvSpPr>
-          <p:nvPr>
-            <p:ph idx="1"/>
-          </p:nvPr>
-        </p:nvSpPr>
-        <p:spPr>
-          <a:xfrm>
-            <a:off x="838200" y="1825625"/>
-            <a:ext cx="10515600" cy="4397376"/>
-          </a:xfrm>
-        </p:spPr>
-        <p:txBody>
-          <a:bodyPr>
-            <a:normAutofit fontScale="92500" lnSpcReduction="20000"/>
-          </a:bodyPr>
-          <a:lstStyle/>
-          <a:p>
-            <a:r>
-              <a:rPr lang="ru-RU" b="1" dirty="0" smtClean="0"/>
-              <a:t>Переменные: </a:t>
-            </a:r>
-            <a:r>
-              <a:rPr lang="ru-RU" dirty="0"/>
-              <a:t>В</a:t>
-            </a:r>
-            <a:r>
-              <a:rPr lang="ru-RU" dirty="0" smtClean="0"/>
-              <a:t>озможность определять </a:t>
-            </a:r>
-            <a:r>
-              <a:rPr lang="ru-RU" dirty="0"/>
-              <a:t>переменные, которые можно использовать в таблицах </a:t>
-            </a:r>
-            <a:r>
-              <a:rPr lang="ru-RU" dirty="0" smtClean="0"/>
-              <a:t>стилей, что </a:t>
-            </a:r>
-            <a:r>
-              <a:rPr lang="ru-RU" dirty="0"/>
-              <a:t>позволяет повторно использовать и изменять значения в одном месте, а не обновлять их по всему коду</a:t>
-            </a:r>
-            <a:r>
-              <a:rPr lang="ru-RU" dirty="0" smtClean="0"/>
-              <a:t>.</a:t>
-            </a:r>
-          </a:p>
-          <a:p>
-            <a:r>
-              <a:rPr lang="ru-RU" b="1" dirty="0" smtClean="0"/>
-              <a:t>Вложенность: </a:t>
-            </a:r>
-            <a:r>
-              <a:rPr lang="ru-RU" dirty="0"/>
-              <a:t>В</a:t>
-            </a:r>
-            <a:r>
-              <a:rPr lang="ru-RU" dirty="0" smtClean="0"/>
-              <a:t>озможность вкладывать правила CSS друг в друга. Благодаря этому становится проще редактировать стили.</a:t>
-            </a:r>
-          </a:p>
-          <a:p>
-            <a:r>
-              <a:rPr lang="ru-RU" b="1" dirty="0" err="1"/>
-              <a:t>Миксины</a:t>
-            </a:r>
-            <a:r>
-              <a:rPr lang="ru-RU" dirty="0"/>
-              <a:t>: Позволяют создавать повторно используемые блоки кода, которые можно вызывать с различными параметрами.</a:t>
-            </a:r>
-            <a:endParaRPr lang="ru-RU" b="1" dirty="0" smtClean="0"/>
-          </a:p>
-          <a:p>
-            <a:r>
-              <a:rPr lang="ru-RU" b="1" dirty="0" smtClean="0"/>
-              <a:t>Модульность</a:t>
-            </a:r>
-            <a:r>
-              <a:rPr lang="ru-RU" b="1" dirty="0"/>
-              <a:t>: </a:t>
-            </a:r>
-            <a:r>
-              <a:rPr lang="ru-RU" dirty="0"/>
-              <a:t>Разделение </a:t>
-            </a:r>
-            <a:r>
-              <a:rPr lang="en-US" dirty="0"/>
-              <a:t>SCSS </a:t>
-            </a:r>
-            <a:r>
-              <a:rPr lang="ru-RU" dirty="0"/>
-              <a:t>по </a:t>
-            </a:r>
-            <a:r>
-              <a:rPr lang="ru-RU" dirty="0" smtClean="0"/>
-              <a:t>файлам, каждый из которых может хранить переменные, </a:t>
-            </a:r>
-            <a:r>
-              <a:rPr lang="ru-RU" dirty="0" err="1" smtClean="0"/>
-              <a:t>миксины</a:t>
-            </a:r>
-            <a:r>
-              <a:rPr lang="ru-RU" dirty="0"/>
-              <a:t> </a:t>
-            </a:r>
-            <a:r>
-              <a:rPr lang="ru-RU" dirty="0" smtClean="0"/>
-              <a:t>и т.д., для организации и повторного использования кода.</a:t>
-            </a:r>
-            <a:endParaRPr lang="ru-RU" dirty="0"/>
-          </a:p>
-          <a:p>
-            <a:r>
-              <a:rPr lang="ru-RU" b="1" dirty="0" smtClean="0"/>
-              <a:t>Наследование: </a:t>
-            </a:r>
-            <a:r>
-              <a:rPr lang="ru-RU" dirty="0"/>
-              <a:t>Позволяет одному селектору наследовать стили другого, что помогает избежать дублирования </a:t>
-            </a:r>
-            <a:r>
-              <a:rPr lang="ru-RU" dirty="0" smtClean="0"/>
-              <a:t>кода.</a:t>
-            </a:r>
-          </a:p>
-        </p:txBody>
-      </p:sp>
-    </p:spTree>
-    <p:extLst>
-      <p:ext uri="{BB962C8B-B14F-4D97-AF65-F5344CB8AC3E}">
-        <p14:creationId xmlns:p14="http://schemas.microsoft.com/office/powerpoint/2010/main" val="4270753609"/>
       </p:ext>
     </p:extLst>
   </p:cSld>
@@ -4403,9 +4945,10 @@
           <a:lstStyle/>
           <a:p>
             <a:r>
-              <a:rPr lang="ru-RU" dirty="0"/>
-              <a:t>Переменные</a:t>
-            </a:r>
+              <a:rPr lang="ru-RU" dirty="0" smtClean="0"/>
+              <a:t>Основные возможности</a:t>
+            </a:r>
+            <a:endParaRPr lang="ru-RU" dirty="0"/>
           </a:p>
         </p:txBody>
       </p:sp>
@@ -4422,110 +4965,200 @@
         <p:spPr>
           <a:xfrm>
             <a:off x="838200" y="1825625"/>
-            <a:ext cx="4472414" cy="4351338"/>
+            <a:ext cx="10515600" cy="4397376"/>
           </a:xfrm>
         </p:spPr>
         <p:txBody>
           <a:bodyPr>
-            <a:normAutofit lnSpcReduction="10000"/>
+            <a:normAutofit fontScale="92500" lnSpcReduction="20000"/>
           </a:bodyPr>
           <a:lstStyle/>
           <a:p>
-            <a:pPr marL="0" indent="0">
-              <a:buNone/>
-            </a:pPr>
+            <a:r>
+              <a:rPr lang="ru-RU" b="1" dirty="0" smtClean="0"/>
+              <a:t>Переменные: </a:t>
+            </a:r>
             <a:r>
               <a:rPr lang="ru-RU" dirty="0"/>
-              <a:t>Переменные </a:t>
-            </a:r>
-            <a:r>
-              <a:rPr lang="ru-RU" dirty="0" smtClean="0"/>
-              <a:t>в </a:t>
-            </a:r>
-            <a:r>
-              <a:rPr lang="en-US" dirty="0" err="1" smtClean="0"/>
-              <a:t>Scss</a:t>
-            </a:r>
-            <a:r>
-              <a:rPr lang="en-US" dirty="0" smtClean="0"/>
+              <a:t>В</a:t>
+            </a:r>
+            <a:r>
+              <a:rPr lang="ru-RU" dirty="0" smtClean="0"/>
+              <a:t>озможность определять </a:t>
+            </a:r>
+            <a:r>
+              <a:rPr lang="ru-RU" dirty="0"/>
+              <a:t>переменные, которые можно использовать в таблицах </a:t>
+            </a:r>
+            <a:r>
+              <a:rPr lang="ru-RU" dirty="0" smtClean="0"/>
+              <a:t>стилей, что </a:t>
+            </a:r>
+            <a:r>
+              <a:rPr lang="ru-RU" dirty="0"/>
+              <a:t>позволяет повторно использовать и изменять значения в одном месте, а не обновлять их по всему коду</a:t>
+            </a:r>
+            <a:r>
+              <a:rPr lang="ru-RU" dirty="0" smtClean="0"/>
+              <a:t>.</a:t>
+            </a:r>
+          </a:p>
+          <a:p>
+            <a:r>
+              <a:rPr lang="ru-RU" b="1" dirty="0" smtClean="0"/>
+              <a:t>Вложенность: </a:t>
+            </a:r>
+            <a:r>
+              <a:rPr lang="ru-RU" dirty="0"/>
+              <a:t>В</a:t>
+            </a:r>
+            <a:r>
+              <a:rPr lang="ru-RU" dirty="0" smtClean="0"/>
+              <a:t>озможность вкладывать правила CSS друг в друга. Благодаря этому становится проще редактировать стили.</a:t>
+            </a:r>
+          </a:p>
+          <a:p>
+            <a:r>
+              <a:rPr lang="ru-RU" b="1" dirty="0" err="1"/>
+              <a:t>Миксины</a:t>
+            </a:r>
+            <a:r>
+              <a:rPr lang="ru-RU" dirty="0"/>
+              <a:t>: Позволяют создавать повторно используемые блоки кода, которые можно вызывать с различными параметрами.</a:t>
+            </a:r>
+            <a:endParaRPr lang="ru-RU" b="1" dirty="0" smtClean="0"/>
+          </a:p>
+          <a:p>
+            <a:r>
+              <a:rPr lang="ru-RU" b="1" dirty="0" smtClean="0"/>
+              <a:t>Модульность</a:t>
+            </a:r>
+            <a:r>
+              <a:rPr lang="ru-RU" b="1" dirty="0"/>
+              <a:t>: </a:t>
+            </a:r>
+            <a:r>
+              <a:rPr lang="ru-RU" dirty="0"/>
+              <a:t>Разделение </a:t>
+            </a:r>
+            <a:r>
+              <a:rPr lang="en-US" dirty="0"/>
+              <a:t>SCSS </a:t>
+            </a:r>
+            <a:r>
+              <a:rPr lang="ru-RU" dirty="0"/>
+              <a:t>по </a:t>
+            </a:r>
+            <a:r>
+              <a:rPr lang="ru-RU" dirty="0" smtClean="0"/>
+              <a:t>файлам, каждый из которых может хранить переменные, </a:t>
+            </a:r>
+            <a:r>
+              <a:rPr lang="ru-RU" dirty="0" err="1" smtClean="0"/>
+              <a:t>миксины</a:t>
+            </a:r>
+            <a:r>
+              <a:rPr lang="ru-RU" dirty="0"/>
               <a:t> </a:t>
             </a:r>
             <a:r>
               <a:rPr lang="ru-RU" dirty="0" smtClean="0"/>
-              <a:t>объявляются </a:t>
+              <a:t>и т.д., для организации и повторного использования кода.</a:t>
+            </a:r>
+            <a:endParaRPr lang="ru-RU" dirty="0"/>
+          </a:p>
+          <a:p>
+            <a:r>
+              <a:rPr lang="ru-RU" b="1" dirty="0" smtClean="0"/>
+              <a:t>Наследование: </a:t>
             </a:r>
             <a:r>
               <a:rPr lang="ru-RU" dirty="0"/>
-              <a:t>с помощью знака доллара </a:t>
-            </a:r>
-            <a:r>
-              <a:rPr lang="ru-RU" dirty="0" smtClean="0"/>
-              <a:t>$</a:t>
-            </a:r>
-            <a:r>
-              <a:rPr lang="en-US" dirty="0" smtClean="0"/>
-              <a:t>.</a:t>
-            </a:r>
-            <a:endParaRPr lang="ru-RU" dirty="0" smtClean="0"/>
-          </a:p>
-          <a:p>
-            <a:pPr marL="0" indent="0">
-              <a:buNone/>
-            </a:pPr>
-            <a:r>
-              <a:rPr lang="ru-RU" dirty="0" smtClean="0"/>
-              <a:t>В них можно хранить цвета, размеры, шрифты </a:t>
-            </a:r>
+              <a:t>Позволяет одному селектору наследовать стили другого, что помогает избежать дублирования </a:t>
+            </a:r>
+            <a:r>
+              <a:rPr lang="ru-RU" dirty="0" smtClean="0"/>
+              <a:t>кода.</a:t>
+            </a:r>
+          </a:p>
+        </p:txBody>
+      </p:sp>
+    </p:spTree>
+    <p:extLst>
+      <p:ext uri="{BB962C8B-B14F-4D97-AF65-F5344CB8AC3E}">
+        <p14:creationId xmlns:p14="http://schemas.microsoft.com/office/powerpoint/2010/main" val="4270753609"/>
+      </p:ext>
+    </p:extLst>
+  </p:cSld>
+  <p:clrMapOvr>
+    <a:masterClrMapping/>
+  </p:clrMapOvr>
+  <p:timing>
+    <p:tnLst>
+      <p:par>
+        <p:cTn id="1" dur="indefinite" restart="never" nodeType="tmRoot"/>
+      </p:par>
+    </p:tnLst>
+  </p:timing>
+</p:sld>
+</file>
+
+<file path=ppt/slides/slide7.xml><?xml version="1.0" encoding="utf-8"?>
+<p:sld xmlns:a="http://schemas.openxmlformats.org/drawingml/2006/main" xmlns:r="http://schemas.openxmlformats.org/officeDocument/2006/relationships" xmlns:p="http://schemas.openxmlformats.org/presentationml/2006/main">
+  <p:cSld>
+    <p:spTree>
+      <p:nvGrpSpPr>
+        <p:cNvPr id="1" name=""/>
+        <p:cNvGrpSpPr/>
+        <p:nvPr/>
+      </p:nvGrpSpPr>
+      <p:grpSpPr>
+        <a:xfrm>
+          <a:off x="0" y="0"/>
+          <a:ext cx="0" cy="0"/>
+          <a:chOff x="0" y="0"/>
+          <a:chExt cx="0" cy="0"/>
+        </a:xfrm>
+      </p:grpSpPr>
+      <p:sp>
+        <p:nvSpPr>
+          <p:cNvPr id="2" name="Заголовок 1"/>
+          <p:cNvSpPr>
+            <a:spLocks noGrp="1"/>
+          </p:cNvSpPr>
+          <p:nvPr>
+            <p:ph type="title"/>
+          </p:nvPr>
+        </p:nvSpPr>
+        <p:spPr/>
+        <p:txBody>
+          <a:bodyPr/>
+          <a:lstStyle/>
+          <a:p>
             <a:r>
               <a:rPr lang="ru-RU" dirty="0"/>
-              <a:t>и </a:t>
-            </a:r>
-            <a:r>
-              <a:rPr lang="ru-RU" dirty="0" smtClean="0"/>
-              <a:t>другие значения.</a:t>
-            </a:r>
-          </a:p>
-          <a:p>
-            <a:pPr marL="0" indent="0">
-              <a:buNone/>
-            </a:pPr>
-            <a:r>
-              <a:rPr lang="ru-RU" dirty="0" smtClean="0"/>
-              <a:t>При компиляции они не переносятся в </a:t>
-            </a:r>
-            <a:r>
-              <a:rPr lang="en-US" dirty="0" err="1" smtClean="0"/>
-              <a:t>css</a:t>
-            </a:r>
-            <a:r>
-              <a:rPr lang="en-US" dirty="0" smtClean="0"/>
-              <a:t>, </a:t>
-            </a:r>
-            <a:r>
-              <a:rPr lang="ru-RU" dirty="0" smtClean="0"/>
-              <a:t>т.е. в местах применения будет написано значение переменной.</a:t>
-            </a:r>
-            <a:endParaRPr lang="ru-RU" dirty="0"/>
+              <a:t>Переменные</a:t>
+            </a:r>
           </a:p>
         </p:txBody>
       </p:sp>
       <p:grpSp>
         <p:nvGrpSpPr>
-          <p:cNvPr id="9" name="Shape 202"/>
+          <p:cNvPr id="12" name="Shape 202"/>
           <p:cNvGrpSpPr/>
           <p:nvPr/>
         </p:nvGrpSpPr>
         <p:grpSpPr>
           <a:xfrm>
-            <a:off x="5398981" y="1623562"/>
-            <a:ext cx="3611017" cy="3252276"/>
+            <a:off x="7901508" y="1177925"/>
+            <a:ext cx="3452292" cy="2242608"/>
             <a:chOff x="1075100" y="2220925"/>
             <a:chExt cx="6945600" cy="2037000"/>
           </a:xfrm>
         </p:grpSpPr>
         <p:sp>
           <p:nvSpPr>
-            <p:cNvPr id="10" name="Shape 203"/>
+            <p:cNvPr id="16" name="Shape 203"/>
             <p:cNvSpPr/>
             <p:nvPr/>
           </p:nvSpPr>
@@ -4763,7 +5396,7 @@
         </p:sp>
         <p:sp>
           <p:nvSpPr>
-            <p:cNvPr id="11" name="Shape 204"/>
+            <p:cNvPr id="17" name="Shape 204"/>
             <p:cNvSpPr/>
             <p:nvPr/>
           </p:nvSpPr>
@@ -5005,7 +5638,7 @@
                 <a:buNone/>
               </a:pPr>
               <a:r>
-                <a:rPr lang="en" sz="1600" i="1" dirty="0">
+                <a:rPr lang="en" sz="2000" i="1" dirty="0">
                   <a:solidFill>
                     <a:srgbClr val="89DDFF"/>
                   </a:solidFill>
@@ -5016,7 +5649,7 @@
                 <a:t>$color</a:t>
               </a:r>
               <a:r>
-                <a:rPr lang="en" sz="1600" dirty="0">
+                <a:rPr lang="en" sz="2000" dirty="0">
                   <a:solidFill>
                     <a:srgbClr val="CDD3DE"/>
                   </a:solidFill>
@@ -5027,7 +5660,7 @@
                 <a:t>: </a:t>
               </a:r>
               <a:r>
-                <a:rPr lang="en" sz="1600" dirty="0">
+                <a:rPr lang="en" sz="2000" dirty="0">
                   <a:solidFill>
                     <a:srgbClr val="6897BB"/>
                   </a:solidFill>
@@ -5038,7 +5671,7 @@
                 <a:t>#fff</a:t>
               </a:r>
               <a:r>
-                <a:rPr lang="en" sz="1600" dirty="0">
+                <a:rPr lang="en" sz="2000" dirty="0">
                   <a:solidFill>
                     <a:srgbClr val="CDD3DE"/>
                   </a:solidFill>
@@ -5062,7 +5695,7 @@
                 <a:buNone/>
               </a:pPr>
               <a:r>
-                <a:rPr lang="en" sz="1600" i="1" dirty="0">
+                <a:rPr lang="en" sz="2000" i="1" dirty="0">
                   <a:solidFill>
                     <a:srgbClr val="89DDFF"/>
                   </a:solidFill>
@@ -5073,7 +5706,7 @@
                 <a:t>$width</a:t>
               </a:r>
               <a:r>
-                <a:rPr lang="en" sz="1600" dirty="0">
+                <a:rPr lang="en" sz="2000" dirty="0">
                   <a:solidFill>
                     <a:srgbClr val="CDD3DE"/>
                   </a:solidFill>
@@ -5084,7 +5717,7 @@
                 <a:t>: </a:t>
               </a:r>
               <a:r>
-                <a:rPr lang="en" sz="1600" dirty="0">
+                <a:rPr lang="en" sz="2000" dirty="0">
                   <a:solidFill>
                     <a:srgbClr val="F77669"/>
                   </a:solidFill>
@@ -5095,7 +5728,7 @@
                 <a:t>200</a:t>
               </a:r>
               <a:r>
-                <a:rPr lang="en" sz="1600" dirty="0">
+                <a:rPr lang="en" sz="2000" dirty="0">
                   <a:solidFill>
                     <a:srgbClr val="C3E88D"/>
                   </a:solidFill>
@@ -5106,7 +5739,7 @@
                 <a:t>px</a:t>
               </a:r>
               <a:r>
-                <a:rPr lang="en" sz="1600" dirty="0">
+                <a:rPr lang="en" sz="2000" dirty="0">
                   <a:solidFill>
                     <a:srgbClr val="CDD3DE"/>
                   </a:solidFill>
@@ -5130,7 +5763,7 @@
                 <a:buNone/>
               </a:pPr>
               <a:r>
-                <a:rPr lang="en" sz="1600" dirty="0">
+                <a:rPr lang="en" sz="2000" dirty="0">
                   <a:solidFill>
                     <a:srgbClr val="CDD3DE"/>
                   </a:solidFill>
@@ -5141,7 +5774,7 @@
                 <a:t>.</a:t>
               </a:r>
               <a:r>
-                <a:rPr lang="en" sz="1600" dirty="0">
+                <a:rPr lang="en" sz="2000" dirty="0">
                   <a:solidFill>
                     <a:srgbClr val="FF5370"/>
                   </a:solidFill>
@@ -5152,7 +5785,7 @@
                 <a:t>class </a:t>
               </a:r>
               <a:r>
-                <a:rPr lang="en" sz="1600" dirty="0">
+                <a:rPr lang="en" sz="2000" dirty="0">
                   <a:solidFill>
                     <a:srgbClr val="CDD3DE"/>
                   </a:solidFill>
@@ -5176,7 +5809,7 @@
                 <a:buNone/>
               </a:pPr>
               <a:r>
-                <a:rPr lang="en" sz="1600" dirty="0">
+                <a:rPr lang="en" sz="2000" dirty="0">
                   <a:solidFill>
                     <a:srgbClr val="CDD3DE"/>
                   </a:solidFill>
@@ -5187,7 +5820,7 @@
                 <a:t>  </a:t>
               </a:r>
               <a:r>
-                <a:rPr lang="en" sz="1600" dirty="0">
+                <a:rPr lang="en" sz="2000" dirty="0">
                   <a:solidFill>
                     <a:srgbClr val="80CBC4"/>
                   </a:solidFill>
@@ -5198,7 +5831,7 @@
                 <a:t>color</a:t>
               </a:r>
               <a:r>
-                <a:rPr lang="en" sz="1600" dirty="0">
+                <a:rPr lang="en" sz="2000" dirty="0">
                   <a:solidFill>
                     <a:srgbClr val="CDD3DE"/>
                   </a:solidFill>
@@ -5209,7 +5842,7 @@
                 <a:t>:  </a:t>
               </a:r>
               <a:r>
-                <a:rPr lang="en" sz="1600" i="1" dirty="0">
+                <a:rPr lang="en" sz="2000" i="1" dirty="0">
                   <a:solidFill>
                     <a:srgbClr val="89DDFF"/>
                   </a:solidFill>
@@ -5220,7 +5853,7 @@
                 <a:t>$color</a:t>
               </a:r>
               <a:r>
-                <a:rPr lang="en" sz="1600" dirty="0">
+                <a:rPr lang="en" sz="2000" dirty="0">
                   <a:solidFill>
                     <a:srgbClr val="CDD3DE"/>
                   </a:solidFill>
@@ -5244,7 +5877,7 @@
                 <a:buNone/>
               </a:pPr>
               <a:r>
-                <a:rPr lang="en" sz="1600" dirty="0">
+                <a:rPr lang="en" sz="2000" dirty="0">
                   <a:solidFill>
                     <a:srgbClr val="CDD3DE"/>
                   </a:solidFill>
@@ -5255,7 +5888,7 @@
                 <a:t>  </a:t>
               </a:r>
               <a:r>
-                <a:rPr lang="en" sz="1600" dirty="0">
+                <a:rPr lang="en" sz="2000" dirty="0">
                   <a:solidFill>
                     <a:srgbClr val="80CBC4"/>
                   </a:solidFill>
@@ -5266,7 +5899,7 @@
                 <a:t>width</a:t>
               </a:r>
               <a:r>
-                <a:rPr lang="en" sz="1600" dirty="0">
+                <a:rPr lang="en" sz="2000" dirty="0">
                   <a:solidFill>
                     <a:srgbClr val="CDD3DE"/>
                   </a:solidFill>
@@ -5277,7 +5910,7 @@
                 <a:t>: </a:t>
               </a:r>
               <a:r>
-                <a:rPr lang="en" sz="1600" i="1" dirty="0">
+                <a:rPr lang="en" sz="2000" i="1" dirty="0">
                   <a:solidFill>
                     <a:srgbClr val="89DDFF"/>
                   </a:solidFill>
@@ -5288,7 +5921,7 @@
                 <a:t>$width </a:t>
               </a:r>
               <a:r>
-                <a:rPr lang="en" sz="1600" dirty="0">
+                <a:rPr lang="en" sz="2000" dirty="0">
                   <a:solidFill>
                     <a:srgbClr val="CDD3DE"/>
                   </a:solidFill>
@@ -5299,7 +5932,7 @@
                 <a:t>- </a:t>
               </a:r>
               <a:r>
-                <a:rPr lang="en" sz="1600" dirty="0">
+                <a:rPr lang="en" sz="2000" dirty="0">
                   <a:solidFill>
                     <a:srgbClr val="F77669"/>
                   </a:solidFill>
@@ -5310,7 +5943,7 @@
                 <a:t>50</a:t>
               </a:r>
               <a:r>
-                <a:rPr lang="en" sz="1600" dirty="0">
+                <a:rPr lang="en" sz="2000" dirty="0">
                   <a:solidFill>
                     <a:srgbClr val="CDD3DE"/>
                   </a:solidFill>
@@ -5334,7 +5967,7 @@
                 <a:buNone/>
               </a:pPr>
               <a:r>
-                <a:rPr lang="en" sz="1600" dirty="0">
+                <a:rPr lang="en" sz="2000" dirty="0">
                   <a:solidFill>
                     <a:srgbClr val="CDD3DE"/>
                   </a:solidFill>
@@ -5353,293 +5986,10 @@
                 <a:buClr>
                   <a:schemeClr val="dk1"/>
                 </a:buClr>
-                <a:buFont typeface="Arial"/>
-                <a:buNone/>
-              </a:pPr>
-              <a:endParaRPr sz="1600" dirty="0">
-                <a:solidFill>
-                  <a:srgbClr val="CDD3DE"/>
-                </a:solidFill>
-                <a:highlight>
-                  <a:srgbClr val="263238"/>
-                </a:highlight>
-              </a:endParaRPr>
-            </a:p>
-            <a:p>
-              <a:pPr lvl="0" rtl="0">
-                <a:spcBef>
-                  <a:spcPts val="0"/>
-                </a:spcBef>
-                <a:buClr>
-                  <a:schemeClr val="dk1"/>
-                </a:buClr>
                 <a:buSzPct val="73333"/>
                 <a:buFont typeface="Arial"/>
                 <a:buNone/>
               </a:pPr>
-              <a:r>
-                <a:rPr lang="en" sz="1600" i="1" dirty="0">
-                  <a:solidFill>
-                    <a:srgbClr val="89DDFF"/>
-                  </a:solidFill>
-                  <a:highlight>
-                    <a:srgbClr val="344134"/>
-                  </a:highlight>
-                </a:rPr>
-                <a:t>$content-text</a:t>
-              </a:r>
-              <a:r>
-                <a:rPr lang="en" sz="1600" dirty="0">
-                  <a:solidFill>
-                    <a:srgbClr val="CDD3DE"/>
-                  </a:solidFill>
-                  <a:highlight>
-                    <a:srgbClr val="263238"/>
-                  </a:highlight>
-                </a:rPr>
-                <a:t>: </a:t>
-              </a:r>
-              <a:r>
-                <a:rPr lang="en" sz="1600" dirty="0">
-                  <a:solidFill>
-                    <a:srgbClr val="C3E88D"/>
-                  </a:solidFill>
-                  <a:highlight>
-                    <a:srgbClr val="263238"/>
-                  </a:highlight>
-                </a:rPr>
-                <a:t>'контент'</a:t>
-              </a:r>
-              <a:r>
-                <a:rPr lang="en" sz="1600" dirty="0">
-                  <a:solidFill>
-                    <a:srgbClr val="CDD3DE"/>
-                  </a:solidFill>
-                  <a:highlight>
-                    <a:srgbClr val="263238"/>
-                  </a:highlight>
-                </a:rPr>
-                <a:t>;</a:t>
-              </a:r>
-            </a:p>
-            <a:p>
-              <a:pPr lvl="0" rtl="0">
-                <a:spcBef>
-                  <a:spcPts val="0"/>
-                </a:spcBef>
-                <a:buClr>
-                  <a:schemeClr val="dk1"/>
-                </a:buClr>
-                <a:buSzPct val="73333"/>
-                <a:buFont typeface="Arial"/>
-                <a:buNone/>
-              </a:pPr>
-              <a:r>
-                <a:rPr lang="en" sz="1600" dirty="0">
-                  <a:solidFill>
-                    <a:srgbClr val="CDD3DE"/>
-                  </a:solidFill>
-                  <a:highlight>
-                    <a:srgbClr val="263238"/>
-                  </a:highlight>
-                </a:rPr>
-                <a:t>.</a:t>
-              </a:r>
-              <a:r>
-                <a:rPr lang="en" sz="1600" dirty="0">
-                  <a:solidFill>
-                    <a:srgbClr val="FF5370"/>
-                  </a:solidFill>
-                  <a:highlight>
-                    <a:srgbClr val="263238"/>
-                  </a:highlight>
-                </a:rPr>
-                <a:t>class </a:t>
-              </a:r>
-              <a:r>
-                <a:rPr lang="en" sz="1600" dirty="0">
-                  <a:solidFill>
-                    <a:srgbClr val="CDD3DE"/>
-                  </a:solidFill>
-                  <a:highlight>
-                    <a:srgbClr val="263238"/>
-                  </a:highlight>
-                </a:rPr>
-                <a:t>{</a:t>
-              </a:r>
-            </a:p>
-            <a:p>
-              <a:pPr lvl="0" rtl="0">
-                <a:spcBef>
-                  <a:spcPts val="0"/>
-                </a:spcBef>
-                <a:buClr>
-                  <a:schemeClr val="dk1"/>
-                </a:buClr>
-                <a:buSzPct val="73333"/>
-                <a:buFont typeface="Arial"/>
-                <a:buNone/>
-              </a:pPr>
-              <a:r>
-                <a:rPr lang="en" sz="1600" dirty="0">
-                  <a:solidFill>
-                    <a:srgbClr val="CDD3DE"/>
-                  </a:solidFill>
-                  <a:highlight>
-                    <a:srgbClr val="263238"/>
-                  </a:highlight>
-                </a:rPr>
-                <a:t>  &amp;:</a:t>
-              </a:r>
-              <a:r>
-                <a:rPr lang="en" sz="1600" dirty="0">
-                  <a:solidFill>
-                    <a:srgbClr val="FF5370"/>
-                  </a:solidFill>
-                  <a:highlight>
-                    <a:srgbClr val="263238"/>
-                  </a:highlight>
-                </a:rPr>
-                <a:t>after </a:t>
-              </a:r>
-              <a:r>
-                <a:rPr lang="en" sz="1600" dirty="0">
-                  <a:solidFill>
-                    <a:srgbClr val="CDD3DE"/>
-                  </a:solidFill>
-                  <a:highlight>
-                    <a:srgbClr val="263238"/>
-                  </a:highlight>
-                </a:rPr>
-                <a:t>{</a:t>
-              </a:r>
-            </a:p>
-            <a:p>
-              <a:pPr lvl="0" rtl="0">
-                <a:spcBef>
-                  <a:spcPts val="0"/>
-                </a:spcBef>
-                <a:buClr>
-                  <a:schemeClr val="dk1"/>
-                </a:buClr>
-                <a:buSzPct val="73333"/>
-                <a:buFont typeface="Arial"/>
-                <a:buNone/>
-              </a:pPr>
-              <a:r>
-                <a:rPr lang="en" sz="1600" dirty="0">
-                  <a:solidFill>
-                    <a:srgbClr val="CDD3DE"/>
-                  </a:solidFill>
-                  <a:highlight>
-                    <a:srgbClr val="263238"/>
-                  </a:highlight>
-                </a:rPr>
-                <a:t>     </a:t>
-              </a:r>
-              <a:r>
-                <a:rPr lang="en" sz="1600" dirty="0">
-                  <a:solidFill>
-                    <a:srgbClr val="80CBC4"/>
-                  </a:solidFill>
-                  <a:highlight>
-                    <a:srgbClr val="263238"/>
-                  </a:highlight>
-                </a:rPr>
-                <a:t>content</a:t>
-              </a:r>
-              <a:r>
-                <a:rPr lang="en" sz="1600" dirty="0">
-                  <a:solidFill>
-                    <a:srgbClr val="CDD3DE"/>
-                  </a:solidFill>
-                  <a:highlight>
-                    <a:srgbClr val="263238"/>
-                  </a:highlight>
-                </a:rPr>
-                <a:t>: </a:t>
-              </a:r>
-              <a:r>
-                <a:rPr lang="en" sz="1600" i="1" dirty="0">
-                  <a:solidFill>
-                    <a:srgbClr val="89DDFF"/>
-                  </a:solidFill>
-                  <a:highlight>
-                    <a:srgbClr val="263238"/>
-                  </a:highlight>
-                </a:rPr>
-                <a:t>$</a:t>
-              </a:r>
-              <a:r>
-                <a:rPr lang="en" sz="1600" i="1" dirty="0">
-                  <a:solidFill>
-                    <a:srgbClr val="89DDFF"/>
-                  </a:solidFill>
-                  <a:highlight>
-                    <a:srgbClr val="344134"/>
-                  </a:highlight>
-                </a:rPr>
-                <a:t>content-text</a:t>
-              </a:r>
-              <a:r>
-                <a:rPr lang="en" sz="1600" dirty="0">
-                  <a:solidFill>
-                    <a:srgbClr val="CDD3DE"/>
-                  </a:solidFill>
-                  <a:highlight>
-                    <a:srgbClr val="263238"/>
-                  </a:highlight>
-                </a:rPr>
-                <a:t>;</a:t>
-              </a:r>
-            </a:p>
-            <a:p>
-              <a:pPr lvl="0" rtl="0">
-                <a:spcBef>
-                  <a:spcPts val="0"/>
-                </a:spcBef>
-                <a:buClr>
-                  <a:schemeClr val="dk1"/>
-                </a:buClr>
-                <a:buSzPct val="73333"/>
-                <a:buFont typeface="Arial"/>
-                <a:buNone/>
-              </a:pPr>
-              <a:r>
-                <a:rPr lang="en" sz="1600" dirty="0">
-                  <a:solidFill>
-                    <a:srgbClr val="CDD3DE"/>
-                  </a:solidFill>
-                  <a:highlight>
-                    <a:srgbClr val="263238"/>
-                  </a:highlight>
-                </a:rPr>
-                <a:t>  }</a:t>
-              </a:r>
-            </a:p>
-            <a:p>
-              <a:pPr lvl="0" rtl="0">
-                <a:spcBef>
-                  <a:spcPts val="0"/>
-                </a:spcBef>
-                <a:buClr>
-                  <a:schemeClr val="dk1"/>
-                </a:buClr>
-                <a:buSzPct val="73333"/>
-                <a:buFont typeface="Arial"/>
-                <a:buNone/>
-              </a:pPr>
-              <a:r>
-                <a:rPr lang="en" sz="1600" dirty="0">
-                  <a:solidFill>
-                    <a:srgbClr val="CDD3DE"/>
-                  </a:solidFill>
-                  <a:highlight>
-                    <a:srgbClr val="263238"/>
-                  </a:highlight>
-                </a:rPr>
-                <a:t>}</a:t>
-              </a:r>
               <a:endParaRPr lang="en" sz="1500" dirty="0">
                 <a:solidFill>
                   <a:srgbClr val="CDD3DE"/>
@@ -5654,21 +6004,21 @@
       </p:grpSp>
       <p:grpSp>
         <p:nvGrpSpPr>
-          <p:cNvPr id="13" name="Shape 207"/>
+          <p:cNvPr id="18" name="Shape 207"/>
           <p:cNvGrpSpPr/>
           <p:nvPr/>
         </p:nvGrpSpPr>
         <p:grpSpPr>
           <a:xfrm>
-            <a:off x="8131273" y="2913891"/>
-            <a:ext cx="3611017" cy="3263071"/>
+            <a:off x="7951846" y="3831961"/>
+            <a:ext cx="3401954" cy="2047575"/>
             <a:chOff x="1075100" y="2220925"/>
             <a:chExt cx="6945600" cy="2037000"/>
           </a:xfrm>
         </p:grpSpPr>
         <p:sp>
           <p:nvSpPr>
-            <p:cNvPr id="14" name="Shape 208"/>
+            <p:cNvPr id="19" name="Shape 208"/>
             <p:cNvSpPr/>
             <p:nvPr/>
           </p:nvSpPr>
@@ -5906,7 +6256,7 @@
         </p:sp>
         <p:sp>
           <p:nvSpPr>
-            <p:cNvPr id="15" name="Shape 209"/>
+            <p:cNvPr id="20" name="Shape 209"/>
             <p:cNvSpPr/>
             <p:nvPr/>
           </p:nvSpPr>
@@ -6148,7 +6498,31 @@
                 <a:buNone/>
               </a:pPr>
               <a:r>
-                <a:rPr lang="en" sz="1800" dirty="0">
+                <a:rPr lang="en" sz="2000" dirty="0" smtClean="0">
+                  <a:solidFill>
+                    <a:srgbClr val="CDD3DE"/>
+                  </a:solidFill>
+                  <a:highlight>
+                    <a:srgbClr val="263238"/>
+                  </a:highlight>
+                </a:rPr>
+                <a:t>// CSS</a:t>
+              </a:r>
+            </a:p>
+            <a:p>
+              <a:pPr lvl="0" rtl="0">
+                <a:spcBef>
+                  <a:spcPts val="0"/>
+                </a:spcBef>
+                <a:buClr>
+                  <a:schemeClr val="dk1"/>
+                </a:buClr>
+                <a:buSzPct val="61111"/>
+                <a:buFont typeface="Arial"/>
+                <a:buNone/>
+              </a:pPr>
+              <a:r>
+                <a:rPr lang="en" sz="2000" dirty="0" smtClean="0">
                   <a:solidFill>
                     <a:srgbClr val="CDD3DE"/>
                   </a:solidFill>
@@ -6159,7 +6533,7 @@
                 <a:t>.</a:t>
               </a:r>
               <a:r>
-                <a:rPr lang="en" sz="1800" dirty="0">
+                <a:rPr lang="en" sz="2000" dirty="0">
                   <a:solidFill>
                     <a:srgbClr val="FF5370"/>
                   </a:solidFill>
@@ -6170,7 +6544,7 @@
                 <a:t>class </a:t>
               </a:r>
               <a:r>
-                <a:rPr lang="en" sz="1800" dirty="0">
+                <a:rPr lang="en" sz="2000" dirty="0">
                   <a:solidFill>
                     <a:srgbClr val="CDD3DE"/>
                   </a:solidFill>
@@ -6194,7 +6568,7 @@
                 <a:buNone/>
               </a:pPr>
               <a:r>
-                <a:rPr lang="en" sz="1800" dirty="0">
+                <a:rPr lang="en" sz="2000" dirty="0">
                   <a:solidFill>
                     <a:srgbClr val="CDD3DE"/>
                   </a:solidFill>
@@ -6205,7 +6579,7 @@
                 <a:t> </a:t>
               </a:r>
               <a:r>
-                <a:rPr lang="en" sz="1800" dirty="0">
+                <a:rPr lang="en" sz="2000" dirty="0">
                   <a:solidFill>
                     <a:srgbClr val="80CBC4"/>
                   </a:solidFill>
@@ -6216,7 +6590,7 @@
                 <a:t>color</a:t>
               </a:r>
               <a:r>
-                <a:rPr lang="en" sz="1800" dirty="0">
+                <a:rPr lang="en" sz="2000" dirty="0">
                   <a:solidFill>
                     <a:srgbClr val="CDD3DE"/>
                   </a:solidFill>
@@ -6227,7 +6601,7 @@
                 <a:t>: </a:t>
               </a:r>
               <a:r>
-                <a:rPr lang="en" sz="1800" dirty="0">
+                <a:rPr lang="en" sz="2000" dirty="0">
                   <a:solidFill>
                     <a:srgbClr val="6897BB"/>
                   </a:solidFill>
@@ -6238,7 +6612,7 @@
                 <a:t>#fff</a:t>
               </a:r>
               <a:r>
-                <a:rPr lang="en" sz="1800" dirty="0">
+                <a:rPr lang="en" sz="2000" dirty="0">
                   <a:solidFill>
                     <a:srgbClr val="CDD3DE"/>
                   </a:solidFill>
@@ -6262,7 +6636,7 @@
                 <a:buNone/>
               </a:pPr>
               <a:r>
-                <a:rPr lang="en" sz="1800" dirty="0">
+                <a:rPr lang="en" sz="2000" dirty="0">
                   <a:solidFill>
                     <a:srgbClr val="CDD3DE"/>
                   </a:solidFill>
@@ -6273,7 +6647,7 @@
                 <a:t> </a:t>
               </a:r>
               <a:r>
-                <a:rPr lang="en" sz="1800" dirty="0">
+                <a:rPr lang="en" sz="2000" dirty="0">
                   <a:solidFill>
                     <a:srgbClr val="80CBC4"/>
                   </a:solidFill>
@@ -6284,7 +6658,7 @@
                 <a:t>width</a:t>
               </a:r>
               <a:r>
-                <a:rPr lang="en" sz="1800" dirty="0">
+                <a:rPr lang="en" sz="2000" dirty="0">
                   <a:solidFill>
                     <a:srgbClr val="CDD3DE"/>
                   </a:solidFill>
@@ -6295,7 +6669,7 @@
                 <a:t>: </a:t>
               </a:r>
               <a:r>
-                <a:rPr lang="en" sz="1800" dirty="0">
+                <a:rPr lang="en" sz="2000" dirty="0">
                   <a:solidFill>
                     <a:srgbClr val="F77669"/>
                   </a:solidFill>
@@ -6306,7 +6680,7 @@
                 <a:t>150</a:t>
               </a:r>
               <a:r>
-                <a:rPr lang="en" sz="1800" dirty="0">
+                <a:rPr lang="en" sz="2000" dirty="0">
                   <a:solidFill>
                     <a:srgbClr val="C3E88D"/>
                   </a:solidFill>
@@ -6317,7 +6691,7 @@
                 <a:t>px</a:t>
               </a:r>
               <a:r>
-                <a:rPr lang="en" sz="1800" dirty="0">
+                <a:rPr lang="en" sz="2000" dirty="0">
                   <a:solidFill>
                     <a:srgbClr val="CDD3DE"/>
                   </a:solidFill>
@@ -6341,7 +6715,7 @@
                 <a:buNone/>
               </a:pPr>
               <a:r>
-                <a:rPr lang="en" sz="1800" dirty="0">
+                <a:rPr lang="en" sz="2000" dirty="0" smtClean="0">
                   <a:solidFill>
                     <a:srgbClr val="CDD3DE"/>
                   </a:solidFill>
@@ -6351,199 +6725,7 @@
                 </a:rPr>
                 <a:t>}</a:t>
               </a:r>
-            </a:p>
-            <a:p>
-              <a:pPr lvl="0" rtl="0">
-                <a:spcBef>
-                  <a:spcPts val="0"/>
-                </a:spcBef>
-                <a:buClr>
-                  <a:schemeClr val="dk1"/>
-                </a:buClr>
-                <a:buFont typeface="Arial"/>
-                <a:buNone/>
-              </a:pPr>
-              <a:endParaRPr sz="1800" dirty="0">
-                <a:solidFill>
-                  <a:srgbClr val="CDD3DE"/>
-                </a:solidFill>
-                <a:highlight>
-                  <a:srgbClr val="263238"/>
-                </a:highlight>
-              </a:endParaRPr>
-            </a:p>
-            <a:p>
-              <a:pPr lvl="0" rtl="0">
-                <a:spcBef>
-                  <a:spcPts val="0"/>
-                </a:spcBef>
-                <a:buClr>
-                  <a:schemeClr val="dk1"/>
-                </a:buClr>
-                <a:buSzPct val="61111"/>
-                <a:buFont typeface="Arial"/>
-                <a:buNone/>
-              </a:pPr>
-              <a:r>
-                <a:rPr lang="en" sz="1800" dirty="0">
-                  <a:solidFill>
-                    <a:srgbClr val="CDD3DE"/>
-                  </a:solidFill>
-                  <a:highlight>
-                    <a:srgbClr val="263238"/>
-                  </a:highlight>
-                </a:rPr>
-                <a:t>.</a:t>
-              </a:r>
-              <a:r>
-                <a:rPr lang="en" sz="1800" dirty="0">
-                  <a:solidFill>
-                    <a:srgbClr val="FF5370"/>
-                  </a:solidFill>
-                  <a:highlight>
-                    <a:srgbClr val="263238"/>
-                  </a:highlight>
-                </a:rPr>
-                <a:t>class</a:t>
-              </a:r>
-              <a:r>
-                <a:rPr lang="en" sz="1800" dirty="0">
-                  <a:solidFill>
-                    <a:srgbClr val="CDD3DE"/>
-                  </a:solidFill>
-                  <a:highlight>
-                    <a:srgbClr val="263238"/>
-                  </a:highlight>
-                </a:rPr>
-                <a:t>:</a:t>
-              </a:r>
-              <a:r>
-                <a:rPr lang="en" sz="1800" dirty="0">
-                  <a:solidFill>
-                    <a:srgbClr val="FF5370"/>
-                  </a:solidFill>
-                  <a:highlight>
-                    <a:srgbClr val="263238"/>
-                  </a:highlight>
-                </a:rPr>
-                <a:t>after </a:t>
-              </a:r>
-              <a:r>
-                <a:rPr lang="en" sz="1800" dirty="0">
-                  <a:solidFill>
-                    <a:srgbClr val="CDD3DE"/>
-                  </a:solidFill>
-                  <a:highlight>
-                    <a:srgbClr val="263238"/>
-                  </a:highlight>
-                </a:rPr>
-                <a:t>{</a:t>
-              </a:r>
-            </a:p>
-            <a:p>
-              <a:pPr lvl="0" rtl="0">
-                <a:spcBef>
-                  <a:spcPts val="0"/>
-                </a:spcBef>
-                <a:buClr>
-                  <a:schemeClr val="dk1"/>
-                </a:buClr>
-                <a:buSzPct val="61111"/>
-                <a:buFont typeface="Arial"/>
-                <a:buNone/>
-              </a:pPr>
-              <a:r>
-                <a:rPr lang="en" sz="1800" dirty="0">
-                  <a:solidFill>
-                    <a:srgbClr val="CDD3DE"/>
-                  </a:solidFill>
-                  <a:highlight>
-                    <a:srgbClr val="263238"/>
-                  </a:highlight>
-                </a:rPr>
-                <a:t> </a:t>
-              </a:r>
-              <a:r>
-                <a:rPr lang="en" sz="1800" dirty="0">
-                  <a:solidFill>
-                    <a:srgbClr val="80CBC4"/>
-                  </a:solidFill>
-                  <a:highlight>
-                    <a:srgbClr val="263238"/>
-                  </a:highlight>
-                </a:rPr>
-                <a:t>content</a:t>
-              </a:r>
-              <a:r>
-                <a:rPr lang="en" sz="1800" dirty="0">
-                  <a:solidFill>
-                    <a:srgbClr val="CDD3DE"/>
-                  </a:solidFill>
-                  <a:highlight>
-                    <a:srgbClr val="263238"/>
-                  </a:highlight>
-                </a:rPr>
-                <a:t>: </a:t>
-              </a:r>
-              <a:r>
-                <a:rPr lang="en" sz="1800" dirty="0">
-                  <a:solidFill>
-                    <a:srgbClr val="C3E88D"/>
-                  </a:solidFill>
-                  <a:highlight>
-                    <a:srgbClr val="263238"/>
-                  </a:highlight>
-                </a:rPr>
-                <a:t>"контент"</a:t>
-              </a:r>
-              <a:r>
-                <a:rPr lang="en" sz="1800" dirty="0">
-                  <a:solidFill>
-                    <a:srgbClr val="CDD3DE"/>
-                  </a:solidFill>
-                  <a:highlight>
-                    <a:srgbClr val="263238"/>
-                  </a:highlight>
-                </a:rPr>
-                <a:t>;</a:t>
-              </a:r>
-            </a:p>
-            <a:p>
-              <a:pPr lvl="0" rtl="0">
-                <a:spcBef>
-                  <a:spcPts val="0"/>
-                </a:spcBef>
-                <a:buClr>
-                  <a:schemeClr val="dk1"/>
-                </a:buClr>
-                <a:buSzPct val="61111"/>
-                <a:buFont typeface="Arial"/>
-                <a:buNone/>
-              </a:pPr>
-              <a:r>
-                <a:rPr lang="en" sz="1800" dirty="0">
-                  <a:solidFill>
-                    <a:srgbClr val="CDD3DE"/>
-                  </a:solidFill>
-                  <a:highlight>
-                    <a:srgbClr val="263238"/>
-                  </a:highlight>
-                </a:rPr>
-                <a:t>}</a:t>
-              </a:r>
-            </a:p>
-            <a:p>
-              <a:pPr lvl="0" rtl="0">
-                <a:spcBef>
-                  <a:spcPts val="0"/>
-                </a:spcBef>
-                <a:buClr>
-                  <a:schemeClr val="dk1"/>
-                </a:buClr>
-                <a:buFont typeface="Arial"/>
-                <a:buNone/>
-              </a:pPr>
-              <a:endParaRPr sz="1800" dirty="0">
+              <a:endParaRPr lang="en" sz="2000" dirty="0">
                 <a:solidFill>
                   <a:srgbClr val="CDD3DE"/>
                 </a:solidFill>
@@ -6555,6 +6737,253 @@
           </p:txBody>
         </p:sp>
       </p:grpSp>
+      <p:sp>
+        <p:nvSpPr>
+          <p:cNvPr id="21" name="Объект 2"/>
+          <p:cNvSpPr txBox="1">
+            <a:spLocks/>
+          </p:cNvSpPr>
+          <p:nvPr/>
+        </p:nvSpPr>
+        <p:spPr>
+          <a:xfrm>
+            <a:off x="838199" y="1825625"/>
+            <a:ext cx="6764867" cy="4351338"/>
+          </a:xfrm>
+          <a:prstGeom prst="rect">
+            <a:avLst/>
+          </a:prstGeom>
+        </p:spPr>
+        <p:txBody>
+          <a:bodyPr vert="horz" lIns="91440" tIns="45720" rIns="91440" bIns="45720" rtlCol="0">
+            <a:normAutofit/>
+          </a:bodyPr>
+          <a:lstStyle>
+            <a:lvl1pPr marL="228600" indent="-228600" algn="l" defTabSz="914400" rtl="0" eaLnBrk="1" latinLnBrk="0" hangingPunct="1">
+              <a:lnSpc>
+                <a:spcPct val="90000"/>
+              </a:lnSpc>
+              <a:spcBef>
+                <a:spcPts val="1000"/>
+              </a:spcBef>
+              <a:buFont typeface="Arial" panose="020B0604020202020204" pitchFamily="34" charset="0"/>
+              <a:buChar char="•"/>
+              <a:defRPr sz="2800" kern="1200">
+                <a:solidFill>
+                  <a:schemeClr val="tx1"/>
+                </a:solidFill>
+                <a:latin typeface="+mn-lt"/>
+                <a:ea typeface="+mn-ea"/>
+                <a:cs typeface="+mn-cs"/>
+              </a:defRPr>
+            </a:lvl1pPr>
+            <a:lvl2pPr marL="685800" indent="-228600" algn="l" defTabSz="914400" rtl="0" eaLnBrk="1" latinLnBrk="0" hangingPunct="1">
+              <a:lnSpc>
+                <a:spcPct val="90000"/>
+              </a:lnSpc>
+              <a:spcBef>
+                <a:spcPts val="500"/>
+              </a:spcBef>
+              <a:buFont typeface="Arial" panose="020B0604020202020204" pitchFamily="34" charset="0"/>
+              <a:buChar char="•"/>
+              <a:defRPr sz="2400" kern="1200">
+                <a:solidFill>
+                  <a:schemeClr val="tx1"/>
+                </a:solidFill>
+                <a:latin typeface="+mn-lt"/>
+                <a:ea typeface="+mn-ea"/>
+                <a:cs typeface="+mn-cs"/>
+              </a:defRPr>
+            </a:lvl2pPr>
+            <a:lvl3pPr marL="1143000" indent="-228600" algn="l" defTabSz="914400" rtl="0" eaLnBrk="1" latinLnBrk="0" hangingPunct="1">
+              <a:lnSpc>
+                <a:spcPct val="90000"/>
+              </a:lnSpc>
+              <a:spcBef>
+                <a:spcPts val="500"/>
+              </a:spcBef>
+              <a:buFont typeface="Arial" panose="020B0604020202020204" pitchFamily="34" charset="0"/>
+              <a:buChar char="•"/>
+              <a:defRPr sz="2000" kern="1200">
+                <a:solidFill>
+                  <a:schemeClr val="tx1"/>
+                </a:solidFill>
+                <a:latin typeface="+mn-lt"/>
+                <a:ea typeface="+mn-ea"/>
+                <a:cs typeface="+mn-cs"/>
+              </a:defRPr>
+            </a:lvl3pPr>
+            <a:lvl4pPr marL="1600200" indent="-228600" algn="l" defTabSz="914400" rtl="0" eaLnBrk="1" latinLnBrk="0" hangingPunct="1">
+              <a:lnSpc>
+                <a:spcPct val="90000"/>
+              </a:lnSpc>
+              <a:spcBef>
+                <a:spcPts val="500"/>
+              </a:spcBef>
+              <a:buFont typeface="Arial" panose="020B0604020202020204" pitchFamily="34" charset="0"/>
+              <a:buChar char="•"/>
+              <a:defRPr sz="1800" kern="1200">
+                <a:solidFill>
+                  <a:schemeClr val="tx1"/>
+                </a:solidFill>
+                <a:latin typeface="+mn-lt"/>
+                <a:ea typeface="+mn-ea"/>
+                <a:cs typeface="+mn-cs"/>
+              </a:defRPr>
+            </a:lvl4pPr>
+            <a:lvl5pPr marL="2057400" indent="-228600" algn="l" defTabSz="914400" rtl="0" eaLnBrk="1" latinLnBrk="0" hangingPunct="1">
+              <a:lnSpc>
+                <a:spcPct val="90000"/>
+              </a:lnSpc>
+              <a:spcBef>
+                <a:spcPts val="500"/>
+              </a:spcBef>
+              <a:buFont typeface="Arial" panose="020B0604020202020204" pitchFamily="34" charset="0"/>
+              <a:buChar char="•"/>
+              <a:defRPr sz="1800" kern="1200">
+                <a:solidFill>
+                  <a:schemeClr val="tx1"/>
+                </a:solidFill>
+                <a:latin typeface="+mn-lt"/>
+                <a:ea typeface="+mn-ea"/>
+                <a:cs typeface="+mn-cs"/>
+              </a:defRPr>
+            </a:lvl5pPr>
+            <a:lvl6pPr marL="2514600" indent="-228600" algn="l" defTabSz="914400" rtl="0" eaLnBrk="1" latinLnBrk="0" hangingPunct="1">
+              <a:lnSpc>
+                <a:spcPct val="90000"/>
+              </a:lnSpc>
+              <a:spcBef>
+                <a:spcPts val="500"/>
+              </a:spcBef>
+              <a:buFont typeface="Arial" panose="020B0604020202020204" pitchFamily="34" charset="0"/>
+              <a:buChar char="•"/>
+              <a:defRPr sz="1800" kern="1200">
+                <a:solidFill>
+                  <a:schemeClr val="tx1"/>
+                </a:solidFill>
+                <a:latin typeface="+mn-lt"/>
+                <a:ea typeface="+mn-ea"/>
+                <a:cs typeface="+mn-cs"/>
+              </a:defRPr>
+            </a:lvl6pPr>
+            <a:lvl7pPr marL="2971800" indent="-228600" algn="l" defTabSz="914400" rtl="0" eaLnBrk="1" latinLnBrk="0" hangingPunct="1">
+              <a:lnSpc>
+                <a:spcPct val="90000"/>
+              </a:lnSpc>
+              <a:spcBef>
+                <a:spcPts val="500"/>
+              </a:spcBef>
+              <a:buFont typeface="Arial" panose="020B0604020202020204" pitchFamily="34" charset="0"/>
+              <a:buChar char="•"/>
+              <a:defRPr sz="1800" kern="1200">
+                <a:solidFill>
+                  <a:schemeClr val="tx1"/>
+                </a:solidFill>
+                <a:latin typeface="+mn-lt"/>
+                <a:ea typeface="+mn-ea"/>
+                <a:cs typeface="+mn-cs"/>
+              </a:defRPr>
+            </a:lvl7pPr>
+            <a:lvl8pPr marL="3429000" indent="-228600" algn="l" defTabSz="914400" rtl="0" eaLnBrk="1" latinLnBrk="0" hangingPunct="1">
+              <a:lnSpc>
+                <a:spcPct val="90000"/>
+              </a:lnSpc>
+              <a:spcBef>
+                <a:spcPts val="500"/>
+              </a:spcBef>
+              <a:buFont typeface="Arial" panose="020B0604020202020204" pitchFamily="34" charset="0"/>
+              <a:buChar char="•"/>
+              <a:defRPr sz="1800" kern="1200">
+                <a:solidFill>
+                  <a:schemeClr val="tx1"/>
+                </a:solidFill>
+                <a:latin typeface="+mn-lt"/>
+                <a:ea typeface="+mn-ea"/>
+                <a:cs typeface="+mn-cs"/>
+              </a:defRPr>
+            </a:lvl8pPr>
+            <a:lvl9pPr marL="3886200" indent="-228600" algn="l" defTabSz="914400" rtl="0" eaLnBrk="1" latinLnBrk="0" hangingPunct="1">
+              <a:lnSpc>
+                <a:spcPct val="90000"/>
+              </a:lnSpc>
+              <a:spcBef>
+                <a:spcPts val="500"/>
+              </a:spcBef>
+              <a:buFont typeface="Arial" panose="020B0604020202020204" pitchFamily="34" charset="0"/>
+              <a:buChar char="•"/>
+              <a:defRPr sz="1800" kern="1200">
+                <a:solidFill>
+                  <a:schemeClr val="tx1"/>
+                </a:solidFill>
+                <a:latin typeface="+mn-lt"/>
+                <a:ea typeface="+mn-ea"/>
+                <a:cs typeface="+mn-cs"/>
+              </a:defRPr>
+            </a:lvl9pPr>
+          </a:lstStyle>
+          <a:p>
+            <a:pPr marL="0" indent="0">
+              <a:buFont typeface="Arial" panose="020B0604020202020204" pitchFamily="34" charset="0"/>
+              <a:buNone/>
+            </a:pPr>
+            <a:r>
+              <a:rPr lang="ru-RU" dirty="0" smtClean="0"/>
+              <a:t>Переменные в </a:t>
+            </a:r>
+            <a:r>
+              <a:rPr lang="en-US" dirty="0" err="1" smtClean="0"/>
+              <a:t>Scss</a:t>
+            </a:r>
+            <a:r>
+              <a:rPr lang="en-US" dirty="0" smtClean="0"/>
+              <a:t> </a:t>
+            </a:r>
+            <a:r>
+              <a:rPr lang="ru-RU" dirty="0" smtClean="0"/>
+              <a:t>объявляются с помощью знака доллара $</a:t>
+            </a:r>
+            <a:r>
+              <a:rPr lang="en-US" dirty="0" smtClean="0"/>
+              <a:t>.</a:t>
+            </a:r>
+            <a:endParaRPr lang="ru-RU" dirty="0" smtClean="0"/>
+          </a:p>
+          <a:p>
+            <a:pPr marL="0" indent="0">
+              <a:buFont typeface="Arial" panose="020B0604020202020204" pitchFamily="34" charset="0"/>
+              <a:buNone/>
+            </a:pPr>
+            <a:r>
+              <a:rPr lang="ru-RU" dirty="0" smtClean="0"/>
+              <a:t>В них можно хранить цвета, размеры, шрифты и другие значения, вплоть до сложных вычислений.</a:t>
+            </a:r>
+          </a:p>
+          <a:p>
+            <a:pPr marL="0" indent="0">
+              <a:buFont typeface="Arial" panose="020B0604020202020204" pitchFamily="34" charset="0"/>
+              <a:buNone/>
+            </a:pPr>
+            <a:r>
+              <a:rPr lang="ru-RU" dirty="0" smtClean="0"/>
+              <a:t>При компиляции они не переносятся в </a:t>
+            </a:r>
+            <a:r>
+              <a:rPr lang="en-US" dirty="0" err="1" smtClean="0"/>
+              <a:t>css</a:t>
+            </a:r>
+            <a:r>
+              <a:rPr lang="en-US" dirty="0" smtClean="0"/>
+              <a:t>, </a:t>
+            </a:r>
+            <a:r>
+              <a:rPr lang="ru-RU" dirty="0" smtClean="0"/>
+              <a:t>т.е. в местах применения будет написано значение переменной.</a:t>
+            </a:r>
+            <a:endParaRPr lang="ru-RU" dirty="0"/>
+          </a:p>
+        </p:txBody>
+      </p:sp>
     </p:spTree>
     <p:extLst>
       <p:ext uri="{BB962C8B-B14F-4D97-AF65-F5344CB8AC3E}">
@@ -6565,218 +6994,13 @@
   <p:clrMapOvr>
     <a:masterClrMapping/>
   </p:clrMapOvr>
-</p:sld>
-</file>
-
-<file path=ppt/slides/slide7.xml><?xml version="1.0" encoding="utf-8"?>
-<p:sld xmlns:a="http://schemas.openxmlformats.org/drawingml/2006/main" xmlns:r="http://schemas.openxmlformats.org/officeDocument/2006/relationships" xmlns:p="http://schemas.openxmlformats.org/presentationml/2006/main">
-  <p:cSld>
-    <p:spTree>
-      <p:nvGrpSpPr>
-        <p:cNvPr id="1" name=""/>
-        <p:cNvGrpSpPr/>
-        <p:nvPr/>
-      </p:nvGrpSpPr>
-      <p:grpSpPr>
-        <a:xfrm>
-          <a:off x="0" y="0"/>
-          <a:ext cx="0" cy="0"/>
-          <a:chOff x="0" y="0"/>
-          <a:chExt cx="0" cy="0"/>
-        </a:xfrm>
-      </p:grpSpPr>
-      <p:sp>
-        <p:nvSpPr>
-          <p:cNvPr id="2" name="Заголовок 1"/>
-          <p:cNvSpPr>
-            <a:spLocks noGrp="1"/>
-          </p:cNvSpPr>
-          <p:nvPr>
-            <p:ph type="title"/>
-          </p:nvPr>
-        </p:nvSpPr>
-        <p:spPr/>
-        <p:txBody>
-          <a:bodyPr/>
-          <a:lstStyle/>
-          <a:p>
-            <a:r>
-              <a:rPr lang="ru-RU" dirty="0" smtClean="0"/>
-              <a:t>Вложенность</a:t>
-            </a:r>
-            <a:endParaRPr lang="ru-RU" dirty="0"/>
-          </a:p>
-        </p:txBody>
-      </p:sp>
-      <p:sp>
-        <p:nvSpPr>
-          <p:cNvPr id="3" name="Объект 2"/>
-          <p:cNvSpPr>
-            <a:spLocks noGrp="1"/>
-          </p:cNvSpPr>
-          <p:nvPr>
-            <p:ph idx="1"/>
-          </p:nvPr>
-        </p:nvSpPr>
-        <p:spPr>
-          <a:xfrm>
-            <a:off x="838200" y="1825625"/>
-            <a:ext cx="5596467" cy="4351338"/>
-          </a:xfrm>
-        </p:spPr>
-        <p:txBody>
-          <a:bodyPr>
-            <a:normAutofit fontScale="92500" lnSpcReduction="20000"/>
-          </a:bodyPr>
-          <a:lstStyle/>
-          <a:p>
-            <a:pPr marL="0" indent="0">
-              <a:buNone/>
-            </a:pPr>
-            <a:r>
-              <a:rPr lang="ru-RU" dirty="0" smtClean="0"/>
-              <a:t>В S</a:t>
-            </a:r>
-            <a:r>
-              <a:rPr lang="en-US" dirty="0" smtClean="0"/>
-              <a:t>c</a:t>
-            </a:r>
-            <a:r>
-              <a:rPr lang="ru-RU" dirty="0" err="1" smtClean="0"/>
-              <a:t>ss</a:t>
-            </a:r>
-            <a:r>
-              <a:rPr lang="ru-RU" dirty="0" smtClean="0"/>
-              <a:t> есть возможность </a:t>
-            </a:r>
-            <a:r>
-              <a:rPr lang="ru-RU" dirty="0"/>
-              <a:t>использовать вложение одних CSS правил в другие, тем самым сокращая время на написание/копирование длинных селекторов и делая код более </a:t>
-            </a:r>
-            <a:r>
-              <a:rPr lang="ru-RU" dirty="0" smtClean="0"/>
-              <a:t>структурированным.</a:t>
-            </a:r>
-            <a:endParaRPr lang="en-US" dirty="0" smtClean="0"/>
-          </a:p>
-          <a:p>
-            <a:pPr marL="0" indent="0">
-              <a:buNone/>
-            </a:pPr>
-            <a:r>
-              <a:rPr lang="ru-RU" dirty="0" smtClean="0"/>
-              <a:t>Селектор можно расширить. Не </a:t>
-            </a:r>
-            <a:r>
-              <a:rPr lang="ru-RU" dirty="0"/>
-              <a:t>создавая нового правила, вы можете привязать к готовому селектору </a:t>
-            </a:r>
-            <a:r>
-              <a:rPr lang="ru-RU" dirty="0" smtClean="0"/>
-              <a:t>дополнительные, </a:t>
-            </a:r>
-            <a:r>
-              <a:rPr lang="ru-RU" dirty="0"/>
-              <a:t>используя знак </a:t>
-            </a:r>
-            <a:r>
-              <a:rPr lang="ru-RU" b="1" dirty="0" smtClean="0"/>
-              <a:t>&amp;</a:t>
-            </a:r>
-            <a:r>
-              <a:rPr lang="ru-RU" dirty="0" smtClean="0"/>
-              <a:t>. За счёт этого можно написать стили для </a:t>
-            </a:r>
-            <a:r>
-              <a:rPr lang="ru-RU" b="1" dirty="0" smtClean="0"/>
-              <a:t>БЭМ</a:t>
-            </a:r>
-            <a:r>
-              <a:rPr lang="ru-RU" dirty="0" smtClean="0"/>
-              <a:t> классов.</a:t>
-            </a:r>
-          </a:p>
-          <a:p>
-            <a:pPr marL="0" indent="0">
-              <a:buNone/>
-            </a:pPr>
-            <a:r>
-              <a:rPr lang="ru-RU" dirty="0" smtClean="0"/>
-              <a:t>Также есть вложенность для </a:t>
-            </a:r>
-            <a:r>
-              <a:rPr lang="en-US" dirty="0" err="1" smtClean="0"/>
-              <a:t>css</a:t>
-            </a:r>
-            <a:r>
-              <a:rPr lang="en-US" dirty="0" smtClean="0"/>
-              <a:t> </a:t>
-            </a:r>
-            <a:r>
-              <a:rPr lang="ru-RU" dirty="0" smtClean="0"/>
-              <a:t>свойств.</a:t>
-            </a:r>
-            <a:endParaRPr lang="ru-RU" dirty="0"/>
-          </a:p>
-        </p:txBody>
-      </p:sp>
-      <p:pic>
-        <p:nvPicPr>
-          <p:cNvPr id="4" name="Рисунок 3"/>
-          <p:cNvPicPr>
-            <a:picLocks noChangeAspect="1"/>
-          </p:cNvPicPr>
-          <p:nvPr/>
-        </p:nvPicPr>
-        <p:blipFill>
-          <a:blip r:embed="rId2"/>
-          <a:stretch>
-            <a:fillRect/>
-          </a:stretch>
-        </p:blipFill>
-        <p:spPr>
-          <a:xfrm>
-            <a:off x="6925733" y="4631808"/>
-            <a:ext cx="4555066" cy="1990449"/>
-          </a:xfrm>
-          <a:prstGeom prst="rect">
-            <a:avLst/>
-          </a:prstGeom>
-        </p:spPr>
-      </p:pic>
-      <p:pic>
-        <p:nvPicPr>
-          <p:cNvPr id="5" name="Рисунок 4"/>
-          <p:cNvPicPr>
-            <a:picLocks noChangeAspect="1"/>
-          </p:cNvPicPr>
-          <p:nvPr/>
-        </p:nvPicPr>
-        <p:blipFill rotWithShape="1">
-          <a:blip r:embed="rId3"/>
-          <a:srcRect b="48892"/>
-          <a:stretch/>
-        </p:blipFill>
-        <p:spPr>
-          <a:xfrm>
-            <a:off x="7501466" y="564299"/>
-            <a:ext cx="3979333" cy="4067509"/>
-          </a:xfrm>
-          <a:prstGeom prst="rect">
-            <a:avLst/>
-          </a:prstGeom>
-        </p:spPr>
-      </p:pic>
-    </p:spTree>
-    <p:extLst>
-      <p:ext uri="{BB962C8B-B14F-4D97-AF65-F5344CB8AC3E}">
-        <p14:creationId xmlns:p14="http://schemas.microsoft.com/office/powerpoint/2010/main" val="854023092"/>
-      </p:ext>
-    </p:extLst>
-  </p:cSld>
-  <p:clrMapOvr>
-    <a:masterClrMapping/>
-  </p:clrMapOvr>
+  <p:timing>
+    <p:tnLst>
+      <p:par>
+        <p:cTn id="1" dur="indefinite" restart="never" nodeType="tmRoot"/>
+      </p:par>
+    </p:tnLst>
+  </p:timing>
 </p:sld>
 </file>
 
@@ -6813,6 +7037,212 @@
           <a:lstStyle/>
           <a:p>
             <a:r>
+              <a:rPr lang="ru-RU" dirty="0" smtClean="0"/>
+              <a:t>Вложенность</a:t>
+            </a:r>
+            <a:endParaRPr lang="ru-RU" dirty="0"/>
+          </a:p>
+        </p:txBody>
+      </p:sp>
+      <p:sp>
+        <p:nvSpPr>
+          <p:cNvPr id="3" name="Объект 2"/>
+          <p:cNvSpPr>
+            <a:spLocks noGrp="1"/>
+          </p:cNvSpPr>
+          <p:nvPr>
+            <p:ph idx="1"/>
+          </p:nvPr>
+        </p:nvSpPr>
+        <p:spPr>
+          <a:xfrm>
+            <a:off x="838200" y="1825625"/>
+            <a:ext cx="5596467" cy="4351338"/>
+          </a:xfrm>
+        </p:spPr>
+        <p:txBody>
+          <a:bodyPr>
+            <a:normAutofit fontScale="92500" lnSpcReduction="20000"/>
+          </a:bodyPr>
+          <a:lstStyle/>
+          <a:p>
+            <a:pPr marL="0" indent="0">
+              <a:buNone/>
+            </a:pPr>
+            <a:r>
+              <a:rPr lang="ru-RU" dirty="0" smtClean="0"/>
+              <a:t>В S</a:t>
+            </a:r>
+            <a:r>
+              <a:rPr lang="en-US" dirty="0" smtClean="0"/>
+              <a:t>c</a:t>
+            </a:r>
+            <a:r>
+              <a:rPr lang="ru-RU" dirty="0" err="1" smtClean="0"/>
+              <a:t>ss</a:t>
+            </a:r>
+            <a:r>
+              <a:rPr lang="ru-RU" dirty="0" smtClean="0"/>
+              <a:t> есть возможность </a:t>
+            </a:r>
+            <a:r>
+              <a:rPr lang="ru-RU" dirty="0"/>
+              <a:t>использовать вложение одних CSS правил в другие, тем самым сокращая время на написание/копирование длинных селекторов и делая код более </a:t>
+            </a:r>
+            <a:r>
+              <a:rPr lang="ru-RU" dirty="0" smtClean="0"/>
+              <a:t>структурированным</a:t>
+            </a:r>
+            <a:r>
+              <a:rPr lang="ru-RU" dirty="0" smtClean="0"/>
+              <a:t>.</a:t>
+            </a:r>
+          </a:p>
+          <a:p>
+            <a:pPr marL="0" indent="0">
+              <a:buNone/>
+            </a:pPr>
+            <a:r>
+              <a:rPr lang="ru-RU" smtClean="0"/>
+              <a:t>Селектор можно расширить. Не создавая нового правила, вы можете привязать к готовому селектору дополнительные, используя знак </a:t>
+            </a:r>
+            <a:r>
+              <a:rPr lang="ru-RU" b="1" smtClean="0"/>
+              <a:t>&amp;</a:t>
+            </a:r>
+            <a:r>
+              <a:rPr lang="ru-RU" smtClean="0"/>
+              <a:t>. За счёт этого можно написать стили для </a:t>
+            </a:r>
+            <a:r>
+              <a:rPr lang="ru-RU" b="1" smtClean="0"/>
+              <a:t>БЭМ</a:t>
+            </a:r>
+            <a:r>
+              <a:rPr lang="ru-RU" smtClean="0"/>
+              <a:t> классов.</a:t>
+            </a:r>
+          </a:p>
+          <a:p>
+            <a:pPr marL="0" indent="0">
+              <a:buNone/>
+            </a:pPr>
+            <a:r>
+              <a:rPr lang="ru-RU" smtClean="0"/>
+              <a:t>Также есть вложенность для </a:t>
+            </a:r>
+            <a:r>
+              <a:rPr lang="en-US" smtClean="0"/>
+              <a:t>css </a:t>
+            </a:r>
+            <a:r>
+              <a:rPr lang="ru-RU" smtClean="0"/>
+              <a:t>свойств.</a:t>
+            </a:r>
+            <a:endParaRPr lang="ru-RU" dirty="0"/>
+          </a:p>
+        </p:txBody>
+      </p:sp>
+      <p:pic>
+        <p:nvPicPr>
+          <p:cNvPr id="7" name="Рисунок 6"/>
+          <p:cNvPicPr>
+            <a:picLocks noChangeAspect="1"/>
+          </p:cNvPicPr>
+          <p:nvPr/>
+        </p:nvPicPr>
+        <p:blipFill rotWithShape="1">
+          <a:blip r:embed="rId2"/>
+          <a:srcRect b="48892"/>
+          <a:stretch/>
+        </p:blipFill>
+        <p:spPr>
+          <a:xfrm>
+            <a:off x="7459134" y="564300"/>
+            <a:ext cx="3894666" cy="3980966"/>
+          </a:xfrm>
+          <a:prstGeom prst="rect">
+            <a:avLst/>
+          </a:prstGeom>
+        </p:spPr>
+      </p:pic>
+      <p:pic>
+        <p:nvPicPr>
+          <p:cNvPr id="8" name="Рисунок 7"/>
+          <p:cNvPicPr>
+            <a:picLocks noChangeAspect="1"/>
+          </p:cNvPicPr>
+          <p:nvPr/>
+        </p:nvPicPr>
+        <p:blipFill>
+          <a:blip r:embed="rId3"/>
+          <a:stretch>
+            <a:fillRect/>
+          </a:stretch>
+        </p:blipFill>
+        <p:spPr>
+          <a:xfrm>
+            <a:off x="7264399" y="4779797"/>
+            <a:ext cx="4216399" cy="1842460"/>
+          </a:xfrm>
+          <a:prstGeom prst="rect">
+            <a:avLst/>
+          </a:prstGeom>
+        </p:spPr>
+      </p:pic>
+    </p:spTree>
+    <p:extLst>
+      <p:ext uri="{BB962C8B-B14F-4D97-AF65-F5344CB8AC3E}">
+        <p14:creationId xmlns:p14="http://schemas.microsoft.com/office/powerpoint/2010/main" val="854023092"/>
+      </p:ext>
+    </p:extLst>
+  </p:cSld>
+  <p:clrMapOvr>
+    <a:masterClrMapping/>
+  </p:clrMapOvr>
+  <p:timing>
+    <p:tnLst>
+      <p:par>
+        <p:cTn id="1" dur="indefinite" restart="never" nodeType="tmRoot"/>
+      </p:par>
+    </p:tnLst>
+  </p:timing>
+</p:sld>
+</file>
+
+<file path=ppt/slides/slide9.xml><?xml version="1.0" encoding="utf-8"?>
+<p:sld xmlns:a="http://schemas.openxmlformats.org/drawingml/2006/main" xmlns:r="http://schemas.openxmlformats.org/officeDocument/2006/relationships" xmlns:p="http://schemas.openxmlformats.org/presentationml/2006/main">
+  <p:cSld>
+    <p:spTree>
+      <p:nvGrpSpPr>
+        <p:cNvPr id="1" name=""/>
+        <p:cNvGrpSpPr/>
+        <p:nvPr/>
+      </p:nvGrpSpPr>
+      <p:grpSpPr>
+        <a:xfrm>
+          <a:off x="0" y="0"/>
+          <a:ext cx="0" cy="0"/>
+          <a:chOff x="0" y="0"/>
+          <a:chExt cx="0" cy="0"/>
+        </a:xfrm>
+      </p:grpSpPr>
+      <p:sp>
+        <p:nvSpPr>
+          <p:cNvPr id="2" name="Заголовок 1"/>
+          <p:cNvSpPr>
+            <a:spLocks noGrp="1"/>
+          </p:cNvSpPr>
+          <p:nvPr>
+            <p:ph type="title"/>
+          </p:nvPr>
+        </p:nvSpPr>
+        <p:spPr/>
+        <p:txBody>
+          <a:bodyPr/>
+          <a:lstStyle/>
+          <a:p>
+            <a:r>
               <a:rPr lang="ru-RU" dirty="0" err="1" smtClean="0"/>
               <a:t>Миксины</a:t>
             </a:r>
@@ -6838,7 +7268,7 @@
         </p:spPr>
         <p:txBody>
           <a:bodyPr>
-            <a:normAutofit fontScale="92500" lnSpcReduction="20000"/>
+            <a:normAutofit/>
           </a:bodyPr>
           <a:lstStyle/>
           <a:p>
@@ -6871,7 +7301,19 @@
             </a:r>
             <a:r>
               <a:rPr lang="ru-RU" dirty="0"/>
-              <a:t>кода (или примеси-шаблоны), которые могут принимать аргументы (опционально) и </a:t>
+              <a:t>кода (или примеси-шаблоны), которые могут принимать аргументы (опционально</a:t>
+            </a:r>
+            <a:r>
+              <a:rPr lang="ru-RU" dirty="0" smtClean="0"/>
+              <a:t>)</a:t>
+            </a:r>
+            <a:r>
+              <a:rPr lang="en-US" dirty="0" smtClean="0"/>
+              <a:t>,</a:t>
+            </a:r>
+            <a:r>
+              <a:rPr lang="ru-RU" dirty="0" smtClean="0"/>
+              <a:t> </a:t>
             </a:r>
             <a:r>
               <a:rPr lang="ru-RU" dirty="0" smtClean="0"/>
@@ -6884,85 +7326,6 @@
             <a:r>
               <a:rPr lang="ru-RU" dirty="0" smtClean="0"/>
               <a:t>.</a:t>
-            </a:r>
-            <a:endParaRPr lang="ru-RU" dirty="0"/>
-          </a:p>
-          <a:p>
-            <a:pPr marL="0" indent="0">
-              <a:buNone/>
-            </a:pPr>
-            <a:r>
-              <a:rPr lang="ru-RU" dirty="0" err="1"/>
-              <a:t>Миксин</a:t>
-            </a:r>
-            <a:r>
-              <a:rPr lang="ru-RU" dirty="0"/>
-              <a:t> объявляется директивой </a:t>
-            </a:r>
-            <a:r>
-              <a:rPr lang="ru-RU" b="1" dirty="0"/>
-              <a:t>@</a:t>
-            </a:r>
-            <a:r>
-              <a:rPr lang="ru-RU" b="1" dirty="0" err="1" smtClean="0"/>
-              <a:t>mixin</a:t>
-            </a:r>
-            <a:r>
-              <a:rPr lang="ru-RU" dirty="0" smtClean="0"/>
-              <a:t>. </a:t>
-            </a:r>
-            <a:r>
-              <a:rPr lang="ru-RU" dirty="0"/>
-              <a:t>Вызывается </a:t>
-            </a:r>
-            <a:r>
-              <a:rPr lang="ru-RU" dirty="0" smtClean="0"/>
-              <a:t>директивой </a:t>
-            </a:r>
-            <a:r>
-              <a:rPr lang="ru-RU" b="1" dirty="0"/>
-              <a:t>@</a:t>
-            </a:r>
-            <a:r>
-              <a:rPr lang="ru-RU" b="1" dirty="0" err="1"/>
-              <a:t>include</a:t>
-            </a:r>
-            <a:r>
-              <a:rPr lang="ru-RU" dirty="0"/>
-              <a:t>, которая принимает имя </a:t>
-            </a:r>
-            <a:r>
-              <a:rPr lang="ru-RU" dirty="0" err="1"/>
-              <a:t>миксина</a:t>
-            </a:r>
-            <a:r>
-              <a:rPr lang="ru-RU" dirty="0"/>
-              <a:t> и передаваемые аргументы, </a:t>
-            </a:r>
-            <a:r>
-              <a:rPr lang="ru-RU" dirty="0" smtClean="0"/>
-              <a:t>если</a:t>
-            </a:r>
-            <a:r>
-              <a:rPr lang="en-US" dirty="0" smtClean="0"/>
-              <a:t> </a:t>
-            </a:r>
-            <a:r>
-              <a:rPr lang="ru-RU" dirty="0" smtClean="0"/>
-              <a:t>нужно.</a:t>
-            </a:r>
-          </a:p>
-          <a:p>
-            <a:pPr marL="0" indent="0">
-              <a:buNone/>
-            </a:pPr>
-            <a:r>
-              <a:rPr lang="ru-RU" dirty="0" err="1" smtClean="0"/>
-              <a:t>Миксины</a:t>
-            </a:r>
-            <a:r>
-              <a:rPr lang="ru-RU" dirty="0" smtClean="0"/>
-              <a:t> похожи на функции в языках программирования.</a:t>
             </a:r>
             <a:endParaRPr lang="ru-RU" dirty="0"/>
           </a:p>
@@ -7002,161 +7365,13 @@
   <p:clrMapOvr>
     <a:masterClrMapping/>
   </p:clrMapOvr>
-</p:sld>
-</file>
-
-<file path=ppt/slides/slide9.xml><?xml version="1.0" encoding="utf-8"?>
-<p:sld xmlns:a="http://schemas.openxmlformats.org/drawingml/2006/main" xmlns:r="http://schemas.openxmlformats.org/officeDocument/2006/relationships" xmlns:p="http://schemas.openxmlformats.org/presentationml/2006/main">
-  <p:cSld>
-    <p:spTree>
-      <p:nvGrpSpPr>
-        <p:cNvPr id="1" name=""/>
-        <p:cNvGrpSpPr/>
-        <p:nvPr/>
-      </p:nvGrpSpPr>
-      <p:grpSpPr>
-        <a:xfrm>
-          <a:off x="0" y="0"/>
-          <a:ext cx="0" cy="0"/>
-          <a:chOff x="0" y="0"/>
-          <a:chExt cx="0" cy="0"/>
-        </a:xfrm>
-      </p:grpSpPr>
-      <p:sp>
-        <p:nvSpPr>
-          <p:cNvPr id="2" name="Заголовок 1"/>
-          <p:cNvSpPr>
-            <a:spLocks noGrp="1"/>
-          </p:cNvSpPr>
-          <p:nvPr>
-            <p:ph type="title"/>
-          </p:nvPr>
-        </p:nvSpPr>
-        <p:spPr/>
-        <p:txBody>
-          <a:bodyPr/>
-          <a:lstStyle/>
-          <a:p>
-            <a:r>
-              <a:rPr lang="ru-RU" dirty="0"/>
-              <a:t>Модульность</a:t>
-            </a:r>
-          </a:p>
-        </p:txBody>
-      </p:sp>
-      <p:sp>
-        <p:nvSpPr>
-          <p:cNvPr id="3" name="Объект 2"/>
-          <p:cNvSpPr>
-            <a:spLocks noGrp="1"/>
-          </p:cNvSpPr>
-          <p:nvPr>
-            <p:ph idx="1"/>
-          </p:nvPr>
-        </p:nvSpPr>
-        <p:spPr>
-          <a:xfrm>
-            <a:off x="838200" y="1825625"/>
-            <a:ext cx="6680200" cy="4351338"/>
-          </a:xfrm>
-        </p:spPr>
-        <p:txBody>
-          <a:bodyPr>
-            <a:normAutofit fontScale="92500" lnSpcReduction="10000"/>
-          </a:bodyPr>
-          <a:lstStyle/>
-          <a:p>
-            <a:pPr marL="0" indent="0">
-              <a:buNone/>
-            </a:pPr>
-            <a:r>
-              <a:rPr lang="ru-RU" dirty="0"/>
-              <a:t>Модульная структура SCSS — это подход к организации стилей, который </a:t>
-            </a:r>
-            <a:r>
-              <a:rPr lang="ru-RU" dirty="0" smtClean="0"/>
-              <a:t>позволяет разделить стили на отдельные файлы (модули), </a:t>
-            </a:r>
-            <a:r>
-              <a:rPr lang="ru-RU" dirty="0"/>
-              <a:t>каждый из которых отвечает за определённый компонент или функциональность</a:t>
-            </a:r>
-            <a:r>
-              <a:rPr lang="ru-RU" dirty="0" smtClean="0"/>
-              <a:t>.</a:t>
-            </a:r>
-          </a:p>
-          <a:p>
-            <a:pPr marL="0" indent="0">
-              <a:buNone/>
-            </a:pPr>
-            <a:r>
-              <a:rPr lang="ru-RU" dirty="0" smtClean="0"/>
-              <a:t>Можно создать  модуль с </a:t>
-            </a:r>
-            <a:r>
-              <a:rPr lang="ru-RU" b="1" dirty="0" smtClean="0"/>
-              <a:t>нижним подчёркиванием</a:t>
-            </a:r>
-            <a:r>
-              <a:rPr lang="ru-RU" dirty="0" smtClean="0"/>
-              <a:t> _ и тогда он будет «служебным».</a:t>
-            </a:r>
-            <a:endParaRPr lang="ru-RU" dirty="0"/>
-          </a:p>
-          <a:p>
-            <a:pPr marL="0" indent="0">
-              <a:buNone/>
-            </a:pPr>
-            <a:r>
-              <a:rPr lang="ru-RU" dirty="0" smtClean="0"/>
-              <a:t>Простые файлы компилируются в файл с названием из </a:t>
-            </a:r>
-            <a:r>
-              <a:rPr lang="en-US" dirty="0" err="1" smtClean="0"/>
-              <a:t>scss</a:t>
-            </a:r>
-            <a:r>
-              <a:rPr lang="ru-RU" dirty="0" smtClean="0"/>
-              <a:t>, а служебные – в местах импорта.</a:t>
-            </a:r>
-          </a:p>
-        </p:txBody>
-      </p:sp>
-      <p:pic>
-        <p:nvPicPr>
-          <p:cNvPr id="4" name="Рисунок 3"/>
-          <p:cNvPicPr>
-            <a:picLocks noChangeAspect="1"/>
-          </p:cNvPicPr>
-          <p:nvPr/>
-        </p:nvPicPr>
-        <p:blipFill>
-          <a:blip r:embed="rId2"/>
-          <a:stretch>
-            <a:fillRect/>
-          </a:stretch>
-        </p:blipFill>
-        <p:spPr>
-          <a:xfrm>
-            <a:off x="7518400" y="1104503"/>
-            <a:ext cx="4161486" cy="5072460"/>
-          </a:xfrm>
-          <a:prstGeom prst="rect">
-            <a:avLst/>
-          </a:prstGeom>
-        </p:spPr>
-      </p:pic>
-    </p:spTree>
-    <p:extLst>
-      <p:ext uri="{BB962C8B-B14F-4D97-AF65-F5344CB8AC3E}">
-        <p14:creationId xmlns:p14="http://schemas.microsoft.com/office/powerpoint/2010/main" val="4021521894"/>
-      </p:ext>
-    </p:extLst>
-  </p:cSld>
-  <p:clrMapOvr>
-    <a:masterClrMapping/>
-  </p:clrMapOvr>
+  <p:timing>
+    <p:tnLst>
+      <p:par>
+        <p:cTn id="1" dur="indefinite" restart="never" nodeType="tmRoot"/>
+      </p:par>
+    </p:tnLst>
+  </p:timing>
 </p:sld>
 </file>
 

</xml_diff>

<commit_message>
working on presentation 4
</commit_message>
<xml_diff>
--- a/sass.pptx
+++ b/sass.pptx
@@ -17,9 +17,16 @@
     <p:sldId id="290" r:id="rId11"/>
     <p:sldId id="286" r:id="rId12"/>
     <p:sldId id="292" r:id="rId13"/>
-    <p:sldId id="287" r:id="rId14"/>
-    <p:sldId id="288" r:id="rId15"/>
-    <p:sldId id="289" r:id="rId16"/>
+    <p:sldId id="293" r:id="rId14"/>
+    <p:sldId id="294" r:id="rId15"/>
+    <p:sldId id="296" r:id="rId16"/>
+    <p:sldId id="295" r:id="rId17"/>
+    <p:sldId id="297" r:id="rId18"/>
+    <p:sldId id="287" r:id="rId19"/>
+    <p:sldId id="298" r:id="rId20"/>
+    <p:sldId id="288" r:id="rId21"/>
+    <p:sldId id="289" r:id="rId22"/>
+    <p:sldId id="299" r:id="rId23"/>
   </p:sldIdLst>
   <p:sldSz cx="12192000" cy="6858000"/>
   <p:notesSz cx="6858000" cy="9144000"/>
@@ -257,7 +264,7 @@
           <a:p>
             <a:fld id="{B19AC94C-8DDE-4B1A-BDD8-5078A1882F2A}" type="datetimeFigureOut">
               <a:rPr lang="ru-RU" smtClean="0"/>
-              <a:t>10.12.2024</a:t>
+              <a:t>11.12.2024</a:t>
             </a:fld>
             <a:endParaRPr lang="ru-RU"/>
           </a:p>
@@ -427,7 +434,7 @@
           <a:p>
             <a:fld id="{B19AC94C-8DDE-4B1A-BDD8-5078A1882F2A}" type="datetimeFigureOut">
               <a:rPr lang="ru-RU" smtClean="0"/>
-              <a:t>10.12.2024</a:t>
+              <a:t>11.12.2024</a:t>
             </a:fld>
             <a:endParaRPr lang="ru-RU"/>
           </a:p>
@@ -607,7 +614,7 @@
           <a:p>
             <a:fld id="{B19AC94C-8DDE-4B1A-BDD8-5078A1882F2A}" type="datetimeFigureOut">
               <a:rPr lang="ru-RU" smtClean="0"/>
-              <a:t>10.12.2024</a:t>
+              <a:t>11.12.2024</a:t>
             </a:fld>
             <a:endParaRPr lang="ru-RU"/>
           </a:p>
@@ -777,7 +784,7 @@
           <a:p>
             <a:fld id="{B19AC94C-8DDE-4B1A-BDD8-5078A1882F2A}" type="datetimeFigureOut">
               <a:rPr lang="ru-RU" smtClean="0"/>
-              <a:t>10.12.2024</a:t>
+              <a:t>11.12.2024</a:t>
             </a:fld>
             <a:endParaRPr lang="ru-RU"/>
           </a:p>
@@ -1023,7 +1030,7 @@
           <a:p>
             <a:fld id="{B19AC94C-8DDE-4B1A-BDD8-5078A1882F2A}" type="datetimeFigureOut">
               <a:rPr lang="ru-RU" smtClean="0"/>
-              <a:t>10.12.2024</a:t>
+              <a:t>11.12.2024</a:t>
             </a:fld>
             <a:endParaRPr lang="ru-RU"/>
           </a:p>
@@ -1255,7 +1262,7 @@
           <a:p>
             <a:fld id="{B19AC94C-8DDE-4B1A-BDD8-5078A1882F2A}" type="datetimeFigureOut">
               <a:rPr lang="ru-RU" smtClean="0"/>
-              <a:t>10.12.2024</a:t>
+              <a:t>11.12.2024</a:t>
             </a:fld>
             <a:endParaRPr lang="ru-RU"/>
           </a:p>
@@ -1622,7 +1629,7 @@
           <a:p>
             <a:fld id="{B19AC94C-8DDE-4B1A-BDD8-5078A1882F2A}" type="datetimeFigureOut">
               <a:rPr lang="ru-RU" smtClean="0"/>
-              <a:t>10.12.2024</a:t>
+              <a:t>11.12.2024</a:t>
             </a:fld>
             <a:endParaRPr lang="ru-RU"/>
           </a:p>
@@ -1740,7 +1747,7 @@
           <a:p>
             <a:fld id="{B19AC94C-8DDE-4B1A-BDD8-5078A1882F2A}" type="datetimeFigureOut">
               <a:rPr lang="ru-RU" smtClean="0"/>
-              <a:t>10.12.2024</a:t>
+              <a:t>11.12.2024</a:t>
             </a:fld>
             <a:endParaRPr lang="ru-RU"/>
           </a:p>
@@ -1835,7 +1842,7 @@
           <a:p>
             <a:fld id="{B19AC94C-8DDE-4B1A-BDD8-5078A1882F2A}" type="datetimeFigureOut">
               <a:rPr lang="ru-RU" smtClean="0"/>
-              <a:t>10.12.2024</a:t>
+              <a:t>11.12.2024</a:t>
             </a:fld>
             <a:endParaRPr lang="ru-RU"/>
           </a:p>
@@ -2112,7 +2119,7 @@
           <a:p>
             <a:fld id="{B19AC94C-8DDE-4B1A-BDD8-5078A1882F2A}" type="datetimeFigureOut">
               <a:rPr lang="ru-RU" smtClean="0"/>
-              <a:t>10.12.2024</a:t>
+              <a:t>11.12.2024</a:t>
             </a:fld>
             <a:endParaRPr lang="ru-RU"/>
           </a:p>
@@ -2365,7 +2372,7 @@
           <a:p>
             <a:fld id="{B19AC94C-8DDE-4B1A-BDD8-5078A1882F2A}" type="datetimeFigureOut">
               <a:rPr lang="ru-RU" smtClean="0"/>
-              <a:t>10.12.2024</a:t>
+              <a:t>11.12.2024</a:t>
             </a:fld>
             <a:endParaRPr lang="ru-RU"/>
           </a:p>
@@ -2578,7 +2585,7 @@
           <a:p>
             <a:fld id="{B19AC94C-8DDE-4B1A-BDD8-5078A1882F2A}" type="datetimeFigureOut">
               <a:rPr lang="ru-RU" smtClean="0"/>
-              <a:t>10.12.2024</a:t>
+              <a:t>11.12.2024</a:t>
             </a:fld>
             <a:endParaRPr lang="ru-RU"/>
           </a:p>
@@ -3104,12 +3111,12 @@
         <p:spPr>
           <a:xfrm>
             <a:off x="838200" y="1825625"/>
-            <a:ext cx="5698067" cy="4351338"/>
+            <a:ext cx="10515600" cy="1747308"/>
           </a:xfrm>
         </p:spPr>
         <p:txBody>
           <a:bodyPr>
-            <a:normAutofit/>
+            <a:normAutofit lnSpcReduction="10000"/>
           </a:bodyPr>
           <a:lstStyle/>
           <a:p>
@@ -3205,16 +3212,15 @@
           </p:cNvPicPr>
           <p:nvPr/>
         </p:nvPicPr>
-        <p:blipFill>
+        <p:blipFill rotWithShape="1">
           <a:blip r:embed="rId2"/>
-          <a:stretch>
-            <a:fillRect/>
-          </a:stretch>
+          <a:srcRect t="69795"/>
+          <a:stretch/>
         </p:blipFill>
         <p:spPr>
           <a:xfrm>
-            <a:off x="7240329" y="365125"/>
-            <a:ext cx="4333604" cy="6294309"/>
+            <a:off x="2796270" y="3780457"/>
+            <a:ext cx="6466263" cy="2836772"/>
           </a:xfrm>
           <a:prstGeom prst="rect">
             <a:avLst/>
@@ -3282,8 +3288,8 @@
               <a:t>|</a:t>
             </a:r>
             <a:r>
-              <a:rPr lang="ru-RU" dirty="0" err="1" smtClean="0"/>
-              <a:t>Компонентность</a:t>
+              <a:rPr lang="ru-RU" dirty="0" smtClean="0"/>
+              <a:t>Модульность</a:t>
             </a:r>
             <a:endParaRPr lang="ru-RU" dirty="0"/>
           </a:p>
@@ -3315,16 +3321,12 @@
               <a:buNone/>
             </a:pPr>
             <a:r>
-              <a:rPr lang="ru-RU" dirty="0" err="1"/>
-              <a:t>Компонентность</a:t>
-            </a:r>
-            <a:r>
-              <a:rPr lang="ru-RU" dirty="0"/>
-              <a:t> в </a:t>
-            </a:r>
-            <a:r>
-              <a:rPr lang="ru-RU" dirty="0"/>
-              <a:t>SCSS — это </a:t>
+              <a:rPr lang="ru-RU" dirty="0"/>
+              <a:t>Модульность </a:t>
+            </a:r>
+            <a:r>
+              <a:rPr lang="ru-RU" dirty="0"/>
+              <a:t>в SCSS — это </a:t>
             </a:r>
             <a:r>
               <a:rPr lang="ru-RU" dirty="0" smtClean="0"/>
@@ -3336,11 +3338,7 @@
             </a:r>
             <a:r>
               <a:rPr lang="ru-RU" dirty="0" smtClean="0"/>
-              <a:t>позволяет разделить стили на отдельные </a:t>
-            </a:r>
-            <a:r>
-              <a:rPr lang="ru-RU" dirty="0" smtClean="0"/>
-              <a:t>файлы, </a:t>
+              <a:t>позволяет разделить стили на отдельные файлы, </a:t>
             </a:r>
             <a:r>
               <a:rPr lang="ru-RU" dirty="0"/>
@@ -3348,9 +3346,24 @@
             </a:r>
             <a:r>
               <a:rPr lang="ru-RU" dirty="0" smtClean="0"/>
-              <a:t>может отвечать за определённый функционал, хранить переменные и т.д.</a:t>
-            </a:r>
-            <a:endParaRPr lang="ru-RU" dirty="0" smtClean="0"/>
+              <a:t>может отвечать за определённый функционал, хранить </a:t>
+            </a:r>
+            <a:r>
+              <a:rPr lang="ru-RU" dirty="0" smtClean="0"/>
+              <a:t>переменные</a:t>
+            </a:r>
+            <a:r>
+              <a:rPr lang="en-US" dirty="0" smtClean="0"/>
+              <a:t>,</a:t>
+            </a:r>
+            <a:r>
+              <a:rPr lang="ru-RU" dirty="0" smtClean="0"/>
+              <a:t> стили для хедера </a:t>
+            </a:r>
+            <a:r>
+              <a:rPr lang="ru-RU" dirty="0" smtClean="0"/>
+              <a:t>и т.д.</a:t>
+            </a:r>
           </a:p>
           <a:p>
             <a:pPr marL="0" indent="0">
@@ -3382,11 +3395,7 @@
             </a:r>
             <a:r>
               <a:rPr lang="ru-RU" dirty="0" smtClean="0"/>
-              <a:t>именуются с</a:t>
-            </a:r>
-            <a:r>
-              <a:rPr lang="ru-RU" dirty="0" smtClean="0"/>
-              <a:t> </a:t>
+              <a:t>именуются с </a:t>
             </a:r>
             <a:r>
               <a:rPr lang="ru-RU" b="1" dirty="0" smtClean="0"/>
@@ -3394,23 +3403,7 @@
             </a:r>
             <a:r>
               <a:rPr lang="ru-RU" dirty="0" smtClean="0"/>
-              <a:t> </a:t>
-            </a:r>
-            <a:r>
-              <a:rPr lang="ru-RU" dirty="0" smtClean="0"/>
-              <a:t>в начале </a:t>
-            </a:r>
-            <a:r>
-              <a:rPr lang="ru-RU" dirty="0" smtClean="0"/>
-              <a:t>и таким образом становятся </a:t>
-            </a:r>
-            <a:r>
-              <a:rPr lang="ru-RU" dirty="0" smtClean="0"/>
-              <a:t>«</a:t>
-            </a:r>
-            <a:r>
-              <a:rPr lang="ru-RU" dirty="0" smtClean="0"/>
-              <a:t>служебными».</a:t>
+              <a:t> в начале и таким образом становятся «служебными».</a:t>
             </a:r>
             <a:endParaRPr lang="ru-RU" dirty="0"/>
           </a:p>
@@ -3438,7 +3431,6 @@
               <a:rPr lang="ru-RU" dirty="0" smtClean="0"/>
               <a:t>файле.</a:t>
             </a:r>
-            <a:endParaRPr lang="ru-RU" dirty="0" smtClean="0"/>
           </a:p>
         </p:txBody>
       </p:sp>
@@ -3536,9 +3528,16 @@
             <p:ph idx="1"/>
           </p:nvPr>
         </p:nvSpPr>
-        <p:spPr/>
-        <p:txBody>
-          <a:bodyPr/>
+        <p:spPr>
+          <a:xfrm>
+            <a:off x="838200" y="1825625"/>
+            <a:ext cx="5715000" cy="4351338"/>
+          </a:xfrm>
+        </p:spPr>
+        <p:txBody>
+          <a:bodyPr>
+            <a:normAutofit fontScale="92500" lnSpcReduction="10000"/>
+          </a:bodyPr>
           <a:lstStyle/>
           <a:p>
             <a:pPr marL="0" indent="0">
@@ -3557,22 +3556,162 @@
               <a:t> позволяет подключать </a:t>
             </a:r>
             <a:r>
+              <a:rPr lang="ru-RU" dirty="0" smtClean="0"/>
+              <a:t>несколько </a:t>
+            </a:r>
+            <a:r>
               <a:rPr lang="en-US" dirty="0" smtClean="0"/>
               <a:t>sass </a:t>
             </a:r>
             <a:r>
+              <a:rPr lang="ru-RU" dirty="0" smtClean="0"/>
+              <a:t>файлов (</a:t>
+            </a:r>
+            <a:r>
               <a:rPr lang="ru-RU" dirty="0" err="1" smtClean="0"/>
-              <a:t>патриалы</a:t>
-            </a:r>
-            <a:r>
-              <a:rPr lang="ru-RU" dirty="0"/>
+              <a:t>партиалы</a:t>
+            </a:r>
+            <a:r>
+              <a:rPr lang="ru-RU" dirty="0" smtClean="0"/>
+              <a:t>) в один, упрощая работу со стилями.</a:t>
+            </a:r>
+          </a:p>
+          <a:p>
+            <a:pPr marL="0" indent="0">
+              <a:buNone/>
+            </a:pPr>
+            <a:r>
+              <a:rPr lang="ru-RU" dirty="0" smtClean="0"/>
+              <a:t>Для импорта достаточно указать путь до файла без подчёркивания и расширения</a:t>
+            </a:r>
+            <a:r>
+              <a:rPr lang="ru-RU" dirty="0" smtClean="0"/>
+              <a:t>, препроцессор сам определяет как компилировать стили:</a:t>
+            </a:r>
+          </a:p>
+          <a:p>
+            <a:r>
+              <a:rPr lang="ru-RU" dirty="0"/>
+              <a:t>Простые</a:t>
+            </a:r>
+            <a:r>
+              <a:rPr lang="en-US" dirty="0"/>
               <a:t> </a:t>
             </a:r>
             <a:r>
-              <a:rPr lang="ru-RU" smtClean="0"/>
-              <a:t>и использовать </a:t>
-            </a:r>
-            <a:endParaRPr lang="ru-RU" dirty="0"/>
+              <a:rPr lang="en-US" dirty="0" err="1"/>
+              <a:t>scss</a:t>
+            </a:r>
+            <a:r>
+              <a:rPr lang="en-US" dirty="0"/>
+              <a:t> </a:t>
+            </a:r>
+            <a:r>
+              <a:rPr lang="ru-RU" dirty="0"/>
+              <a:t>в </a:t>
+            </a:r>
+            <a:r>
+              <a:rPr lang="en-US" dirty="0" err="1"/>
+              <a:t>css</a:t>
+            </a:r>
+            <a:r>
+              <a:rPr lang="ru-RU" dirty="0"/>
+              <a:t> отдельным файлом</a:t>
+            </a:r>
+          </a:p>
+          <a:p>
+            <a:r>
+              <a:rPr lang="ru-RU" dirty="0" err="1" smtClean="0"/>
+              <a:t>Партиалы</a:t>
+            </a:r>
+            <a:r>
+              <a:rPr lang="ru-RU" dirty="0" smtClean="0"/>
+              <a:t> только внутрь </a:t>
+            </a:r>
+            <a:r>
+              <a:rPr lang="en-US" dirty="0" err="1" smtClean="0"/>
+              <a:t>css</a:t>
+            </a:r>
+            <a:r>
+              <a:rPr lang="ru-RU" dirty="0" smtClean="0"/>
+              <a:t> одним файлом</a:t>
+            </a:r>
+            <a:endParaRPr lang="en-US" dirty="0" smtClean="0"/>
+          </a:p>
+        </p:txBody>
+      </p:sp>
+      <p:pic>
+        <p:nvPicPr>
+          <p:cNvPr id="4" name="Рисунок 3"/>
+          <p:cNvPicPr>
+            <a:picLocks noChangeAspect="1"/>
+          </p:cNvPicPr>
+          <p:nvPr/>
+        </p:nvPicPr>
+        <p:blipFill rotWithShape="1">
+          <a:blip r:embed="rId2"/>
+          <a:srcRect r="25762" b="31864"/>
+          <a:stretch/>
+        </p:blipFill>
+        <p:spPr>
+          <a:xfrm>
+            <a:off x="6722533" y="1690688"/>
+            <a:ext cx="5068236" cy="3763095"/>
+          </a:xfrm>
+          <a:prstGeom prst="rect">
+            <a:avLst/>
+          </a:prstGeom>
+        </p:spPr>
+      </p:pic>
+      <p:sp>
+        <p:nvSpPr>
+          <p:cNvPr id="6" name="Прямоугольник 5"/>
+          <p:cNvSpPr/>
+          <p:nvPr/>
+        </p:nvSpPr>
+        <p:spPr>
+          <a:xfrm>
+            <a:off x="838199" y="5988734"/>
+            <a:ext cx="7340601" cy="369332"/>
+          </a:xfrm>
+          <a:prstGeom prst="rect">
+            <a:avLst/>
+          </a:prstGeom>
+        </p:spPr>
+        <p:txBody>
+          <a:bodyPr wrap="square">
+            <a:spAutoFit/>
+          </a:bodyPr>
+          <a:lstStyle/>
+          <a:p>
+            <a:r>
+              <a:rPr lang="en-US" dirty="0" smtClean="0"/>
+              <a:t>* </a:t>
+            </a:r>
+            <a:r>
+              <a:rPr lang="ru-RU" dirty="0" smtClean="0"/>
+              <a:t>С </a:t>
+            </a:r>
+            <a:r>
+              <a:rPr lang="ru-RU" dirty="0"/>
+              <a:t>версии </a:t>
+            </a:r>
+            <a:r>
+              <a:rPr lang="ru-RU" dirty="0" err="1"/>
+              <a:t>Dart</a:t>
+            </a:r>
+            <a:r>
+              <a:rPr lang="ru-RU" dirty="0"/>
+              <a:t> </a:t>
+            </a:r>
+            <a:r>
+              <a:rPr lang="ru-RU" dirty="0" err="1"/>
+              <a:t>Sass</a:t>
+            </a:r>
+            <a:r>
+              <a:rPr lang="ru-RU" dirty="0"/>
+              <a:t> 1.80.0 считается устаревшим, будет удалён в 3.0.0</a:t>
+            </a:r>
           </a:p>
         </p:txBody>
       </p:sp>
@@ -3629,12 +3768,20 @@
           <a:lstStyle/>
           <a:p>
             <a:r>
-              <a:rPr lang="ru-RU" dirty="0" smtClean="0"/>
-              <a:t>Наследование и </a:t>
-            </a:r>
-            <a:r>
-              <a:rPr lang="ru-RU" dirty="0" err="1" smtClean="0"/>
-              <a:t>плейсхолдеры</a:t>
+              <a:rPr lang="en-US" dirty="0" smtClean="0"/>
+              <a:t>@</a:t>
+            </a:r>
+            <a:r>
+              <a:rPr lang="en-US" dirty="0" smtClean="0"/>
+              <a:t>import: </a:t>
+            </a:r>
+            <a:r>
+              <a:rPr lang="ru-RU" dirty="0" smtClean="0"/>
+              <a:t>разница в </a:t>
+            </a:r>
+            <a:r>
+              <a:rPr lang="en-US" dirty="0" err="1" smtClean="0"/>
+              <a:t>css</a:t>
             </a:r>
             <a:endParaRPr lang="ru-RU" dirty="0"/>
           </a:p>
@@ -3653,175 +3800,109 @@
         <p:spPr>
           <a:xfrm>
             <a:off x="838200" y="1825625"/>
-            <a:ext cx="6189133" cy="4351338"/>
+            <a:ext cx="10515600" cy="4351338"/>
           </a:xfrm>
         </p:spPr>
         <p:txBody>
           <a:bodyPr>
-            <a:normAutofit fontScale="92500" lnSpcReduction="20000"/>
+            <a:normAutofit/>
           </a:bodyPr>
           <a:lstStyle/>
           <a:p>
-            <a:pPr marL="0" indent="0">
-              <a:buNone/>
-            </a:pPr>
-            <a:r>
-              <a:rPr lang="ru-RU" dirty="0"/>
-              <a:t>Иногда возникает ситуация, когда несколько элементов на странице используют одинаковую CSS </a:t>
-            </a:r>
-            <a:r>
-              <a:rPr lang="ru-RU" dirty="0" smtClean="0"/>
-              <a:t>код</a:t>
-            </a:r>
-            <a:r>
-              <a:rPr lang="ru-RU" dirty="0"/>
+            <a:r>
+              <a:rPr lang="ru-RU" dirty="0" smtClean="0"/>
+              <a:t>@</a:t>
+            </a:r>
+            <a:r>
+              <a:rPr lang="ru-RU" dirty="0" err="1" smtClean="0"/>
+              <a:t>import</a:t>
+            </a:r>
+            <a:r>
+              <a:rPr lang="ru-RU" dirty="0" smtClean="0"/>
+              <a:t> </a:t>
+            </a:r>
+            <a:r>
+              <a:rPr lang="ru-RU" dirty="0"/>
+              <a:t>также </a:t>
+            </a:r>
+            <a:r>
+              <a:rPr lang="ru-RU" dirty="0" smtClean="0"/>
+              <a:t>доступен </a:t>
+            </a:r>
+            <a:r>
+              <a:rPr lang="ru-RU" dirty="0"/>
+              <a:t>в </a:t>
+            </a:r>
+            <a:r>
+              <a:rPr lang="ru-RU" b="1" dirty="0" smtClean="0"/>
+              <a:t>CSS</a:t>
+            </a:r>
+            <a:r>
+              <a:rPr lang="ru-RU" dirty="0"/>
+              <a:t> </a:t>
+            </a:r>
+            <a:r>
+              <a:rPr lang="ru-RU" dirty="0" smtClean="0"/>
+              <a:t>и позволяет организовать код на части, но в этом случае </a:t>
+            </a:r>
+            <a:r>
+              <a:rPr lang="ru-RU" dirty="0"/>
+              <a:t>на сервер отправляется HTTP-запрос. Это увеличивает количество запросов ресурсов и негативно влияет на производительность веб-страницы</a:t>
+            </a:r>
+            <a:r>
+              <a:rPr lang="ru-RU" dirty="0" smtClean="0"/>
               <a:t>.</a:t>
             </a:r>
-            <a:endParaRPr lang="ru-RU" dirty="0" smtClean="0"/>
-          </a:p>
-          <a:p>
-            <a:r>
-              <a:rPr lang="ru-RU" dirty="0" smtClean="0"/>
-              <a:t>При необходимости можно унаследовать стили одного из селекторов, </a:t>
-            </a:r>
-            <a:r>
-              <a:rPr lang="ru-RU" dirty="0"/>
-              <a:t>что помогает избежать дублирования </a:t>
-            </a:r>
-            <a:r>
-              <a:rPr lang="ru-RU" dirty="0" smtClean="0"/>
-              <a:t>кода.</a:t>
-            </a:r>
-            <a:r>
-              <a:rPr lang="ru-RU" dirty="0"/>
+          </a:p>
+          <a:p>
+            <a:r>
+              <a:rPr lang="ru-RU" dirty="0"/>
+              <a:t>@</a:t>
+            </a:r>
+            <a:r>
+              <a:rPr lang="ru-RU" dirty="0" err="1" smtClean="0"/>
+              <a:t>import</a:t>
+            </a:r>
+            <a:r>
+              <a:rPr lang="ru-RU" dirty="0" smtClean="0"/>
+              <a:t> в </a:t>
+            </a:r>
+            <a:r>
+              <a:rPr lang="ru-RU" b="1" dirty="0" smtClean="0"/>
+              <a:t>SASS</a:t>
+            </a:r>
+            <a:r>
+              <a:rPr lang="ru-RU" dirty="0" smtClean="0"/>
               <a:t> </a:t>
             </a:r>
             <a:r>
-              <a:rPr lang="en" dirty="0" smtClean="0"/>
-              <a:t>Если </a:t>
-            </a:r>
-            <a:r>
-              <a:rPr lang="en" dirty="0"/>
-              <a:t>нам нужно расширить или унаследовать свойства класса, мы можем применить </a:t>
-            </a:r>
-            <a:r>
-              <a:rPr lang="ru-RU" dirty="0" smtClean="0"/>
-              <a:t>функцию </a:t>
-            </a:r>
-            <a:r>
-              <a:rPr lang="en" b="1" dirty="0" smtClean="0"/>
-              <a:t>@extend</a:t>
-            </a:r>
-            <a:r>
-              <a:rPr lang="ru-RU" b="1" dirty="0" smtClean="0"/>
+              <a:rPr lang="ru-RU" dirty="0"/>
+              <a:t>берет файл, из которого вы хотите импортировать, и объединяет его с файлом, который вы импортируете. Таким образом, </a:t>
+            </a:r>
+            <a:r>
+              <a:rPr lang="ru-RU" dirty="0" smtClean="0"/>
+              <a:t>браузеру передаётся один </a:t>
+            </a:r>
+            <a:r>
+              <a:rPr lang="ru-RU" dirty="0"/>
+              <a:t>CSS-файл, что не повлияет </a:t>
+            </a:r>
+            <a:r>
+              <a:rPr lang="ru-RU" dirty="0" smtClean="0"/>
+              <a:t>на производительность</a:t>
+            </a:r>
+            <a:r>
+              <a:rPr lang="ru-RU" dirty="0"/>
               <a:t>.</a:t>
             </a:r>
-            <a:endParaRPr lang="en" b="1" dirty="0"/>
-          </a:p>
-          <a:p>
-            <a:r>
-              <a:rPr lang="ru-RU" dirty="0" smtClean="0"/>
-              <a:t>Также можно создать селектор-шаблон </a:t>
-            </a:r>
-            <a:r>
-              <a:rPr lang="ru-RU" dirty="0"/>
-              <a:t>для использования в нескольких местах </a:t>
-            </a:r>
-            <a:r>
-              <a:rPr lang="ru-RU" dirty="0" err="1"/>
-              <a:t>Sass</a:t>
-            </a:r>
-            <a:r>
-              <a:rPr lang="ru-RU" dirty="0"/>
-              <a:t>. </a:t>
-            </a:r>
-            <a:r>
-              <a:rPr lang="ru-RU" dirty="0" smtClean="0"/>
-              <a:t>Он начинается со знака </a:t>
-            </a:r>
-            <a:r>
-              <a:rPr lang="ru-RU" b="1" dirty="0" smtClean="0"/>
-              <a:t>%</a:t>
-            </a:r>
-            <a:r>
-              <a:rPr lang="ru-RU" dirty="0"/>
-              <a:t> </a:t>
-            </a:r>
-            <a:r>
-              <a:rPr lang="ru-RU" dirty="0" smtClean="0"/>
-              <a:t>и выводится с помощью</a:t>
-            </a:r>
-            <a:r>
-              <a:rPr lang="ru-RU" dirty="0"/>
-              <a:t> </a:t>
-            </a:r>
-            <a:r>
-              <a:rPr lang="ru-RU" b="1" dirty="0"/>
-              <a:t>@</a:t>
-            </a:r>
-            <a:r>
-              <a:rPr lang="ru-RU" b="1" dirty="0" err="1"/>
-              <a:t>extend</a:t>
-            </a:r>
-            <a:r>
-              <a:rPr lang="ru-RU" dirty="0"/>
-              <a:t>.</a:t>
-            </a:r>
-          </a:p>
-        </p:txBody>
-      </p:sp>
-      <p:pic>
-        <p:nvPicPr>
-          <p:cNvPr id="4" name="Рисунок 3"/>
-          <p:cNvPicPr>
-            <a:picLocks noChangeAspect="1"/>
-          </p:cNvPicPr>
-          <p:nvPr/>
-        </p:nvPicPr>
-        <p:blipFill>
-          <a:blip r:embed="rId2"/>
-          <a:stretch>
-            <a:fillRect/>
-          </a:stretch>
-        </p:blipFill>
-        <p:spPr>
-          <a:xfrm>
-            <a:off x="8037372" y="1572155"/>
-            <a:ext cx="3157681" cy="2247093"/>
-          </a:xfrm>
-          <a:prstGeom prst="rect">
-            <a:avLst/>
-          </a:prstGeom>
-        </p:spPr>
-      </p:pic>
-      <p:pic>
-        <p:nvPicPr>
-          <p:cNvPr id="5" name="Рисунок 4"/>
-          <p:cNvPicPr>
-            <a:picLocks noChangeAspect="1"/>
-          </p:cNvPicPr>
-          <p:nvPr/>
-        </p:nvPicPr>
-        <p:blipFill>
-          <a:blip r:embed="rId3"/>
-          <a:stretch>
-            <a:fillRect/>
-          </a:stretch>
-        </p:blipFill>
-        <p:spPr>
-          <a:xfrm>
-            <a:off x="8037372" y="3819247"/>
-            <a:ext cx="3316428" cy="2766309"/>
-          </a:xfrm>
-          <a:prstGeom prst="rect">
-            <a:avLst/>
-          </a:prstGeom>
-        </p:spPr>
-      </p:pic>
+            <a:endParaRPr lang="ru-RU" dirty="0"/>
+          </a:p>
+        </p:txBody>
+      </p:sp>
     </p:spTree>
     <p:extLst>
       <p:ext uri="{BB962C8B-B14F-4D97-AF65-F5344CB8AC3E}">
-        <p14:creationId xmlns:p14="http://schemas.microsoft.com/office/powerpoint/2010/main" val="4164377854"/>
+        <p14:creationId xmlns:p14="http://schemas.microsoft.com/office/powerpoint/2010/main" val="2172952018"/>
       </p:ext>
     </p:extLst>
   </p:cSld>
@@ -3871,8 +3952,16 @@
           <a:lstStyle/>
           <a:p>
             <a:r>
-              <a:rPr lang="ru-RU" dirty="0" smtClean="0"/>
-              <a:t>Прочий функционал</a:t>
+              <a:rPr lang="en-US" dirty="0" smtClean="0"/>
+              <a:t>@use:</a:t>
+            </a:r>
+            <a:r>
+              <a:rPr lang="ru-RU" dirty="0" smtClean="0"/>
+              <a:t> замена </a:t>
+            </a:r>
+            <a:r>
+              <a:rPr lang="en-US" dirty="0" smtClean="0"/>
+              <a:t>@import</a:t>
             </a:r>
             <a:endParaRPr lang="ru-RU" dirty="0"/>
           </a:p>
@@ -3880,12 +3969,178 @@
       </p:sp>
       <p:sp>
         <p:nvSpPr>
-          <p:cNvPr id="3" name="Объект 2"/>
+          <p:cNvPr id="6" name="Объект 5"/>
           <p:cNvSpPr>
             <a:spLocks noGrp="1"/>
           </p:cNvSpPr>
           <p:nvPr>
             <p:ph idx="1"/>
+          </p:nvPr>
+        </p:nvSpPr>
+        <p:spPr>
+          <a:xfrm>
+            <a:off x="838200" y="1825625"/>
+            <a:ext cx="10515600" cy="1848908"/>
+          </a:xfrm>
+        </p:spPr>
+        <p:txBody>
+          <a:bodyPr>
+            <a:normAutofit lnSpcReduction="10000"/>
+          </a:bodyPr>
+          <a:lstStyle/>
+          <a:p>
+            <a:pPr marL="0" indent="0">
+              <a:buNone/>
+            </a:pPr>
+            <a:r>
+              <a:rPr lang="ru-RU" dirty="0"/>
+              <a:t>@</a:t>
+            </a:r>
+            <a:r>
+              <a:rPr lang="ru-RU" dirty="0" err="1"/>
+              <a:t>use</a:t>
+            </a:r>
+            <a:r>
+              <a:rPr lang="ru-RU" dirty="0"/>
+              <a:t> был введен в более поздних версиях </a:t>
+            </a:r>
+            <a:r>
+              <a:rPr lang="ru-RU" dirty="0" err="1"/>
+              <a:t>Sass</a:t>
+            </a:r>
+            <a:r>
+              <a:rPr lang="ru-RU" dirty="0"/>
+              <a:t> и предназначен для улучшения модульности и изоляции. </a:t>
+            </a:r>
+            <a:r>
+              <a:rPr lang="ru-RU" dirty="0" smtClean="0"/>
+              <a:t>Основное отличие от </a:t>
+            </a:r>
+            <a:r>
+              <a:rPr lang="en-US" dirty="0" smtClean="0"/>
+              <a:t>@import</a:t>
+            </a:r>
+            <a:r>
+              <a:rPr lang="ru-RU" dirty="0" smtClean="0"/>
+              <a:t> – это введение </a:t>
+            </a:r>
+            <a:r>
+              <a:rPr lang="en-US" dirty="0" err="1" smtClean="0"/>
+              <a:t>namespac</a:t>
+            </a:r>
+            <a:r>
+              <a:rPr lang="ru-RU" dirty="0" err="1" smtClean="0"/>
+              <a:t>ов</a:t>
+            </a:r>
+            <a:r>
+              <a:rPr lang="ru-RU" dirty="0" smtClean="0"/>
+              <a:t> к файлам, что позволяет избежать конфликтов имён.</a:t>
+            </a:r>
+            <a:r>
+              <a:rPr lang="en-US" dirty="0"/>
+              <a:t> Namespace </a:t>
+            </a:r>
+            <a:r>
+              <a:rPr lang="ru-RU" dirty="0"/>
+              <a:t>может быть название файла или </a:t>
+            </a:r>
+            <a:r>
+              <a:rPr lang="ru-RU" dirty="0" err="1"/>
+              <a:t>алиас</a:t>
+            </a:r>
+            <a:r>
+              <a:rPr lang="ru-RU" dirty="0"/>
+              <a:t>.</a:t>
+            </a:r>
+          </a:p>
+        </p:txBody>
+      </p:sp>
+      <p:pic>
+        <p:nvPicPr>
+          <p:cNvPr id="10" name="Рисунок 9"/>
+          <p:cNvPicPr>
+            <a:picLocks noChangeAspect="1"/>
+          </p:cNvPicPr>
+          <p:nvPr/>
+        </p:nvPicPr>
+        <p:blipFill>
+          <a:blip r:embed="rId2"/>
+          <a:stretch>
+            <a:fillRect/>
+          </a:stretch>
+        </p:blipFill>
+        <p:spPr>
+          <a:xfrm>
+            <a:off x="838200" y="3737058"/>
+            <a:ext cx="4375758" cy="2706060"/>
+          </a:xfrm>
+          <a:prstGeom prst="rect">
+            <a:avLst/>
+          </a:prstGeom>
+        </p:spPr>
+      </p:pic>
+      <p:pic>
+        <p:nvPicPr>
+          <p:cNvPr id="11" name="Рисунок 10"/>
+          <p:cNvPicPr>
+            <a:picLocks noChangeAspect="1"/>
+          </p:cNvPicPr>
+          <p:nvPr/>
+        </p:nvPicPr>
+        <p:blipFill>
+          <a:blip r:embed="rId3"/>
+          <a:stretch>
+            <a:fillRect/>
+          </a:stretch>
+        </p:blipFill>
+        <p:spPr>
+          <a:xfrm>
+            <a:off x="5332491" y="3802625"/>
+            <a:ext cx="6323052" cy="2561236"/>
+          </a:xfrm>
+          <a:prstGeom prst="rect">
+            <a:avLst/>
+          </a:prstGeom>
+        </p:spPr>
+      </p:pic>
+    </p:spTree>
+    <p:extLst>
+      <p:ext uri="{BB962C8B-B14F-4D97-AF65-F5344CB8AC3E}">
+        <p14:creationId xmlns:p14="http://schemas.microsoft.com/office/powerpoint/2010/main" val="1206851995"/>
+      </p:ext>
+    </p:extLst>
+  </p:cSld>
+  <p:clrMapOvr>
+    <a:masterClrMapping/>
+  </p:clrMapOvr>
+</p:sld>
+</file>
+
+<file path=ppt/slides/slide15.xml><?xml version="1.0" encoding="utf-8"?>
+<p:sld xmlns:a="http://schemas.openxmlformats.org/drawingml/2006/main" xmlns:r="http://schemas.openxmlformats.org/officeDocument/2006/relationships" xmlns:p="http://schemas.openxmlformats.org/presentationml/2006/main">
+  <p:cSld>
+    <p:spTree>
+      <p:nvGrpSpPr>
+        <p:cNvPr id="1" name=""/>
+        <p:cNvGrpSpPr/>
+        <p:nvPr/>
+      </p:nvGrpSpPr>
+      <p:grpSpPr>
+        <a:xfrm>
+          <a:off x="0" y="0"/>
+          <a:ext cx="0" cy="0"/>
+          <a:chOff x="0" y="0"/>
+          <a:chExt cx="0" cy="0"/>
+        </a:xfrm>
+      </p:grpSpPr>
+      <p:sp>
+        <p:nvSpPr>
+          <p:cNvPr id="2" name="Заголовок 1"/>
+          <p:cNvSpPr>
+            <a:spLocks noGrp="1"/>
+          </p:cNvSpPr>
+          <p:nvPr>
+            <p:ph type="title"/>
           </p:nvPr>
         </p:nvSpPr>
         <p:spPr/>
@@ -3894,12 +4149,1381 @@
           <a:lstStyle/>
           <a:p>
             <a:r>
-              <a:rPr lang="ru-RU" dirty="0" smtClean="0"/>
-              <a:t>Работа </a:t>
-            </a:r>
-            <a:r>
-              <a:rPr lang="ru-RU" dirty="0" smtClean="0"/>
-              <a:t>с циклами </a:t>
+              <a:rPr lang="en-US" dirty="0" smtClean="0"/>
+              <a:t>@use:</a:t>
+            </a:r>
+            <a:r>
+              <a:rPr lang="ru-RU" dirty="0" smtClean="0"/>
+              <a:t> приватность</a:t>
+            </a:r>
+            <a:endParaRPr lang="ru-RU" dirty="0"/>
+          </a:p>
+        </p:txBody>
+      </p:sp>
+      <p:sp>
+        <p:nvSpPr>
+          <p:cNvPr id="6" name="Объект 5"/>
+          <p:cNvSpPr>
+            <a:spLocks noGrp="1"/>
+          </p:cNvSpPr>
+          <p:nvPr>
+            <p:ph idx="1"/>
+          </p:nvPr>
+        </p:nvSpPr>
+        <p:spPr>
+          <a:xfrm>
+            <a:off x="838200" y="1825624"/>
+            <a:ext cx="5003800" cy="4625975"/>
+          </a:xfrm>
+        </p:spPr>
+        <p:txBody>
+          <a:bodyPr>
+            <a:normAutofit/>
+          </a:bodyPr>
+          <a:lstStyle/>
+          <a:p>
+            <a:pPr marL="0" indent="0">
+              <a:buNone/>
+            </a:pPr>
+            <a:r>
+              <a:rPr lang="ru-RU" dirty="0" smtClean="0"/>
+              <a:t>Благодаря </a:t>
+            </a:r>
+            <a:r>
+              <a:rPr lang="en-US" dirty="0" smtClean="0"/>
+              <a:t>@use </a:t>
+            </a:r>
+            <a:r>
+              <a:rPr lang="ru-RU" dirty="0" smtClean="0"/>
+              <a:t>появилась возможность создавать приватные функции, </a:t>
+            </a:r>
+            <a:r>
+              <a:rPr lang="ru-RU" dirty="0" err="1" smtClean="0"/>
+              <a:t>миксины</a:t>
+            </a:r>
+            <a:r>
+              <a:rPr lang="ru-RU" dirty="0" smtClean="0"/>
+              <a:t> и т.д.</a:t>
+            </a:r>
+          </a:p>
+          <a:p>
+            <a:pPr marL="0" indent="0">
+              <a:buNone/>
+            </a:pPr>
+            <a:r>
+              <a:rPr lang="ru-RU" dirty="0" smtClean="0"/>
+              <a:t>Необходимо ввести тире или подчёркивание в начале названия. ( </a:t>
+            </a:r>
+            <a:r>
+              <a:rPr lang="ru-RU" b="1" dirty="0" smtClean="0"/>
+              <a:t>-</a:t>
+            </a:r>
+            <a:r>
+              <a:rPr lang="ru-RU" dirty="0" smtClean="0"/>
+              <a:t> или </a:t>
+            </a:r>
+            <a:r>
+              <a:rPr lang="ru-RU" b="1" dirty="0" smtClean="0"/>
+              <a:t>_ </a:t>
+            </a:r>
+            <a:r>
+              <a:rPr lang="ru-RU" dirty="0" smtClean="0"/>
+              <a:t>).</a:t>
+            </a:r>
+          </a:p>
+          <a:p>
+            <a:pPr marL="0" indent="0">
+              <a:buNone/>
+            </a:pPr>
+            <a:endParaRPr lang="ru-RU" dirty="0"/>
+          </a:p>
+        </p:txBody>
+      </p:sp>
+      <p:pic>
+        <p:nvPicPr>
+          <p:cNvPr id="4" name="Рисунок 3"/>
+          <p:cNvPicPr>
+            <a:picLocks noChangeAspect="1"/>
+          </p:cNvPicPr>
+          <p:nvPr/>
+        </p:nvPicPr>
+        <p:blipFill>
+          <a:blip r:embed="rId2"/>
+          <a:stretch>
+            <a:fillRect/>
+          </a:stretch>
+        </p:blipFill>
+        <p:spPr>
+          <a:xfrm>
+            <a:off x="6178158" y="1690687"/>
+            <a:ext cx="5844508" cy="4760911"/>
+          </a:xfrm>
+          <a:prstGeom prst="rect">
+            <a:avLst/>
+          </a:prstGeom>
+        </p:spPr>
+      </p:pic>
+    </p:spTree>
+    <p:extLst>
+      <p:ext uri="{BB962C8B-B14F-4D97-AF65-F5344CB8AC3E}">
+        <p14:creationId xmlns:p14="http://schemas.microsoft.com/office/powerpoint/2010/main" val="3339082225"/>
+      </p:ext>
+    </p:extLst>
+  </p:cSld>
+  <p:clrMapOvr>
+    <a:masterClrMapping/>
+  </p:clrMapOvr>
+</p:sld>
+</file>
+
+<file path=ppt/slides/slide16.xml><?xml version="1.0" encoding="utf-8"?>
+<p:sld xmlns:a="http://schemas.openxmlformats.org/drawingml/2006/main" xmlns:r="http://schemas.openxmlformats.org/officeDocument/2006/relationships" xmlns:p="http://schemas.openxmlformats.org/presentationml/2006/main">
+  <p:cSld>
+    <p:spTree>
+      <p:nvGrpSpPr>
+        <p:cNvPr id="1" name=""/>
+        <p:cNvGrpSpPr/>
+        <p:nvPr/>
+      </p:nvGrpSpPr>
+      <p:grpSpPr>
+        <a:xfrm>
+          <a:off x="0" y="0"/>
+          <a:ext cx="0" cy="0"/>
+          <a:chOff x="0" y="0"/>
+          <a:chExt cx="0" cy="0"/>
+        </a:xfrm>
+      </p:grpSpPr>
+      <p:sp>
+        <p:nvSpPr>
+          <p:cNvPr id="2" name="Заголовок 1"/>
+          <p:cNvSpPr>
+            <a:spLocks noGrp="1"/>
+          </p:cNvSpPr>
+          <p:nvPr>
+            <p:ph type="title"/>
+          </p:nvPr>
+        </p:nvSpPr>
+        <p:spPr/>
+        <p:txBody>
+          <a:bodyPr/>
+          <a:lstStyle/>
+          <a:p>
+            <a:r>
+              <a:rPr lang="ru-RU" dirty="0" smtClean="0"/>
+              <a:t>Отличия </a:t>
+            </a:r>
+            <a:r>
+              <a:rPr lang="en-US" dirty="0" smtClean="0"/>
+              <a:t>@import</a:t>
+            </a:r>
+            <a:r>
+              <a:rPr lang="ru-RU" dirty="0" smtClean="0"/>
+              <a:t> и </a:t>
+            </a:r>
+            <a:r>
+              <a:rPr lang="en-US" dirty="0" smtClean="0"/>
+              <a:t>@use</a:t>
+            </a:r>
+            <a:endParaRPr lang="ru-RU" dirty="0"/>
+          </a:p>
+        </p:txBody>
+      </p:sp>
+      <p:sp>
+        <p:nvSpPr>
+          <p:cNvPr id="3" name="Объект 2"/>
+          <p:cNvSpPr>
+            <a:spLocks noGrp="1"/>
+          </p:cNvSpPr>
+          <p:nvPr>
+            <p:ph idx="1"/>
+          </p:nvPr>
+        </p:nvSpPr>
+        <p:spPr/>
+        <p:txBody>
+          <a:bodyPr>
+            <a:normAutofit fontScale="70000" lnSpcReduction="20000"/>
+          </a:bodyPr>
+          <a:lstStyle/>
+          <a:p>
+            <a:pPr marL="0" indent="0">
+              <a:buNone/>
+            </a:pPr>
+            <a:r>
+              <a:rPr lang="ru-RU" b="1" dirty="0" smtClean="0"/>
+              <a:t>@</a:t>
+            </a:r>
+            <a:r>
+              <a:rPr lang="en-US" b="1" dirty="0" smtClean="0"/>
+              <a:t>import</a:t>
+            </a:r>
+            <a:r>
+              <a:rPr lang="ru-RU" b="1" dirty="0" smtClean="0"/>
+              <a:t>:</a:t>
+            </a:r>
+          </a:p>
+          <a:p>
+            <a:r>
+              <a:rPr lang="ru-RU" dirty="0" smtClean="0"/>
+              <a:t>Позволяет </a:t>
+            </a:r>
+            <a:r>
+              <a:rPr lang="ru-RU" dirty="0"/>
+              <a:t>импортировать все функции, доступные </a:t>
+            </a:r>
+            <a:r>
+              <a:rPr lang="ru-RU" dirty="0" smtClean="0"/>
+              <a:t>в глобальной области видимости.</a:t>
+            </a:r>
+          </a:p>
+          <a:p>
+            <a:r>
+              <a:rPr lang="ru-RU" dirty="0" smtClean="0"/>
+              <a:t>Трудно отследить откуда идут </a:t>
+            </a:r>
+            <a:r>
+              <a:rPr lang="ru-RU" dirty="0" err="1" smtClean="0"/>
+              <a:t>миксины</a:t>
+            </a:r>
+            <a:r>
+              <a:rPr lang="ru-RU" dirty="0" smtClean="0"/>
+              <a:t>, переменные и т.д.</a:t>
+            </a:r>
+          </a:p>
+          <a:p>
+            <a:r>
+              <a:rPr lang="ru-RU" dirty="0" smtClean="0"/>
+              <a:t>Поскольку всё доступно глобально, </a:t>
+            </a:r>
+            <a:r>
+              <a:rPr lang="ru-RU" dirty="0"/>
+              <a:t>происходит </a:t>
+            </a:r>
+            <a:r>
+              <a:rPr lang="ru-RU" dirty="0" smtClean="0"/>
+              <a:t>конфликт </a:t>
+            </a:r>
+            <a:r>
+              <a:rPr lang="ru-RU" dirty="0"/>
+              <a:t>имен для разных </a:t>
+            </a:r>
+            <a:r>
+              <a:rPr lang="ru-RU" dirty="0" smtClean="0"/>
+              <a:t>модулей </a:t>
+            </a:r>
+            <a:r>
+              <a:rPr lang="ru-RU" dirty="0"/>
+              <a:t>с одинаковыми </a:t>
+            </a:r>
+            <a:r>
+              <a:rPr lang="ru-RU" dirty="0" smtClean="0"/>
+              <a:t>именами</a:t>
+            </a:r>
+          </a:p>
+          <a:p>
+            <a:r>
+              <a:rPr lang="ru-RU" dirty="0" smtClean="0"/>
+              <a:t>Генерируется большой </a:t>
+            </a:r>
+            <a:r>
+              <a:rPr lang="en-US" dirty="0" smtClean="0"/>
+              <a:t>CSS</a:t>
+            </a:r>
+            <a:r>
+              <a:rPr lang="ru-RU" dirty="0"/>
+              <a:t> </a:t>
+            </a:r>
+            <a:r>
+              <a:rPr lang="ru-RU" dirty="0" smtClean="0"/>
+              <a:t>из-за повторяющихся импортов одного </a:t>
+            </a:r>
+            <a:r>
+              <a:rPr lang="ru-RU" dirty="0"/>
+              <a:t>и того же </a:t>
+            </a:r>
+            <a:r>
+              <a:rPr lang="ru-RU" dirty="0" smtClean="0"/>
+              <a:t>файла.</a:t>
+            </a:r>
+          </a:p>
+          <a:p>
+            <a:pPr marL="0" indent="0">
+              <a:buNone/>
+            </a:pPr>
+            <a:r>
+              <a:rPr lang="ru-RU" b="1" dirty="0" smtClean="0"/>
+              <a:t>@</a:t>
+            </a:r>
+            <a:r>
+              <a:rPr lang="ru-RU" b="1" dirty="0" err="1"/>
+              <a:t>use</a:t>
+            </a:r>
+            <a:r>
+              <a:rPr lang="ru-RU" b="1" dirty="0" smtClean="0"/>
+              <a:t>:</a:t>
+            </a:r>
+          </a:p>
+          <a:p>
+            <a:r>
+              <a:rPr lang="ru-RU" dirty="0" smtClean="0"/>
+              <a:t>Предоставляет </a:t>
+            </a:r>
+            <a:r>
+              <a:rPr lang="ru-RU" dirty="0" err="1" smtClean="0"/>
+              <a:t>нэймспейсы</a:t>
+            </a:r>
+            <a:r>
+              <a:rPr lang="ru-RU" dirty="0" smtClean="0"/>
+              <a:t>/</a:t>
+            </a:r>
+            <a:r>
+              <a:rPr lang="ru-RU" dirty="0" err="1" smtClean="0"/>
+              <a:t>алиасы</a:t>
+            </a:r>
+            <a:r>
+              <a:rPr lang="ru-RU" dirty="0" smtClean="0"/>
+              <a:t> и </a:t>
+            </a:r>
+            <a:r>
+              <a:rPr lang="ru-RU" dirty="0"/>
+              <a:t>позволяет избежать проблем с конфликтом имен</a:t>
+            </a:r>
+            <a:r>
+              <a:rPr lang="ru-RU" dirty="0" smtClean="0"/>
+              <a:t>.</a:t>
+            </a:r>
+          </a:p>
+          <a:p>
+            <a:r>
+              <a:rPr lang="ru-RU" dirty="0" smtClean="0"/>
+              <a:t>Позволяет </a:t>
+            </a:r>
+            <a:r>
+              <a:rPr lang="ru-RU" dirty="0"/>
+              <a:t>импортировать </a:t>
+            </a:r>
+            <a:r>
+              <a:rPr lang="ru-RU" dirty="0" smtClean="0"/>
+              <a:t>файл только </a:t>
+            </a:r>
+            <a:r>
+              <a:rPr lang="ru-RU" dirty="0"/>
+              <a:t>один раз, </a:t>
+            </a:r>
+            <a:r>
+              <a:rPr lang="ru-RU" dirty="0"/>
+              <a:t>даже если он используется в нескольких местах</a:t>
+            </a:r>
+            <a:r>
+              <a:rPr lang="ru-RU" dirty="0" smtClean="0"/>
+              <a:t>.</a:t>
+            </a:r>
+          </a:p>
+          <a:p>
+            <a:r>
+              <a:rPr lang="ru-RU" dirty="0" smtClean="0"/>
+              <a:t>Можно создать приватные переменные, стили и прочее для одного файла.</a:t>
+            </a:r>
+          </a:p>
+          <a:p>
+            <a:r>
+              <a:rPr lang="ru-RU" dirty="0" smtClean="0"/>
+              <a:t>@</a:t>
+            </a:r>
+            <a:r>
+              <a:rPr lang="ru-RU" dirty="0" err="1"/>
+              <a:t>extend</a:t>
+            </a:r>
+            <a:r>
+              <a:rPr lang="ru-RU" dirty="0"/>
+              <a:t> применяется к импортируемой таблице стилей</a:t>
+            </a:r>
+            <a:r>
+              <a:rPr lang="ru-RU" dirty="0" smtClean="0"/>
+              <a:t>.</a:t>
+            </a:r>
+          </a:p>
+          <a:p>
+            <a:r>
+              <a:rPr lang="ru-RU" dirty="0" err="1" smtClean="0"/>
+              <a:t>Плейсхолдеры</a:t>
+            </a:r>
+            <a:r>
+              <a:rPr lang="ru-RU" dirty="0" smtClean="0"/>
+              <a:t> и </a:t>
+            </a:r>
+            <a:r>
+              <a:rPr lang="ru-RU" dirty="0"/>
+              <a:t>не применяют именование пространства имен.</a:t>
+            </a:r>
+          </a:p>
+        </p:txBody>
+      </p:sp>
+    </p:spTree>
+    <p:extLst>
+      <p:ext uri="{BB962C8B-B14F-4D97-AF65-F5344CB8AC3E}">
+        <p14:creationId xmlns:p14="http://schemas.microsoft.com/office/powerpoint/2010/main" val="3187956784"/>
+      </p:ext>
+    </p:extLst>
+  </p:cSld>
+  <p:clrMapOvr>
+    <a:masterClrMapping/>
+  </p:clrMapOvr>
+</p:sld>
+</file>
+
+<file path=ppt/slides/slide17.xml><?xml version="1.0" encoding="utf-8"?>
+<p:sld xmlns:a="http://schemas.openxmlformats.org/drawingml/2006/main" xmlns:r="http://schemas.openxmlformats.org/officeDocument/2006/relationships" xmlns:p="http://schemas.openxmlformats.org/presentationml/2006/main">
+  <p:cSld>
+    <p:spTree>
+      <p:nvGrpSpPr>
+        <p:cNvPr id="1" name=""/>
+        <p:cNvGrpSpPr/>
+        <p:nvPr/>
+      </p:nvGrpSpPr>
+      <p:grpSpPr>
+        <a:xfrm>
+          <a:off x="0" y="0"/>
+          <a:ext cx="0" cy="0"/>
+          <a:chOff x="0" y="0"/>
+          <a:chExt cx="0" cy="0"/>
+        </a:xfrm>
+      </p:grpSpPr>
+      <p:sp>
+        <p:nvSpPr>
+          <p:cNvPr id="2" name="Заголовок 1"/>
+          <p:cNvSpPr>
+            <a:spLocks noGrp="1"/>
+          </p:cNvSpPr>
+          <p:nvPr>
+            <p:ph type="title"/>
+          </p:nvPr>
+        </p:nvSpPr>
+        <p:spPr/>
+        <p:txBody>
+          <a:bodyPr/>
+          <a:lstStyle/>
+          <a:p>
+            <a:r>
+              <a:rPr lang="en-US" dirty="0" smtClean="0"/>
+              <a:t>@forward</a:t>
+            </a:r>
+            <a:endParaRPr lang="ru-RU" dirty="0"/>
+          </a:p>
+        </p:txBody>
+      </p:sp>
+      <p:pic>
+        <p:nvPicPr>
+          <p:cNvPr id="5" name="Объект 4"/>
+          <p:cNvPicPr>
+            <a:picLocks noGrp="1" noChangeAspect="1"/>
+          </p:cNvPicPr>
+          <p:nvPr>
+            <p:ph idx="1"/>
+          </p:nvPr>
+        </p:nvPicPr>
+        <p:blipFill>
+          <a:blip r:embed="rId2"/>
+          <a:stretch>
+            <a:fillRect/>
+          </a:stretch>
+        </p:blipFill>
+        <p:spPr>
+          <a:xfrm>
+            <a:off x="5430033" y="4371007"/>
+            <a:ext cx="6093100" cy="1860358"/>
+          </a:xfrm>
+          <a:prstGeom prst="rect">
+            <a:avLst/>
+          </a:prstGeom>
+        </p:spPr>
+      </p:pic>
+      <p:pic>
+        <p:nvPicPr>
+          <p:cNvPr id="4" name="Рисунок 3"/>
+          <p:cNvPicPr>
+            <a:picLocks noChangeAspect="1"/>
+          </p:cNvPicPr>
+          <p:nvPr/>
+        </p:nvPicPr>
+        <p:blipFill rotWithShape="1">
+          <a:blip r:embed="rId3"/>
+          <a:srcRect t="-1042" r="30976" b="40556"/>
+          <a:stretch/>
+        </p:blipFill>
+        <p:spPr>
+          <a:xfrm>
+            <a:off x="747967" y="4373743"/>
+            <a:ext cx="4512733" cy="1854886"/>
+          </a:xfrm>
+          <a:prstGeom prst="rect">
+            <a:avLst/>
+          </a:prstGeom>
+        </p:spPr>
+      </p:pic>
+      <p:sp>
+        <p:nvSpPr>
+          <p:cNvPr id="6" name="Объект 2"/>
+          <p:cNvSpPr txBox="1">
+            <a:spLocks/>
+          </p:cNvSpPr>
+          <p:nvPr/>
+        </p:nvSpPr>
+        <p:spPr>
+          <a:xfrm>
+            <a:off x="838200" y="1825624"/>
+            <a:ext cx="10515600" cy="2238375"/>
+          </a:xfrm>
+          <a:prstGeom prst="rect">
+            <a:avLst/>
+          </a:prstGeom>
+        </p:spPr>
+        <p:txBody>
+          <a:bodyPr vert="horz" lIns="91440" tIns="45720" rIns="91440" bIns="45720" rtlCol="0">
+            <a:normAutofit/>
+          </a:bodyPr>
+          <a:lstStyle>
+            <a:lvl1pPr marL="228600" indent="-228600" algn="l" defTabSz="914400" rtl="0" eaLnBrk="1" latinLnBrk="0" hangingPunct="1">
+              <a:lnSpc>
+                <a:spcPct val="90000"/>
+              </a:lnSpc>
+              <a:spcBef>
+                <a:spcPts val="1000"/>
+              </a:spcBef>
+              <a:buFont typeface="Arial" panose="020B0604020202020204" pitchFamily="34" charset="0"/>
+              <a:buChar char="•"/>
+              <a:defRPr sz="2800" kern="1200">
+                <a:solidFill>
+                  <a:schemeClr val="tx1"/>
+                </a:solidFill>
+                <a:latin typeface="+mn-lt"/>
+                <a:ea typeface="+mn-ea"/>
+                <a:cs typeface="+mn-cs"/>
+              </a:defRPr>
+            </a:lvl1pPr>
+            <a:lvl2pPr marL="685800" indent="-228600" algn="l" defTabSz="914400" rtl="0" eaLnBrk="1" latinLnBrk="0" hangingPunct="1">
+              <a:lnSpc>
+                <a:spcPct val="90000"/>
+              </a:lnSpc>
+              <a:spcBef>
+                <a:spcPts val="500"/>
+              </a:spcBef>
+              <a:buFont typeface="Arial" panose="020B0604020202020204" pitchFamily="34" charset="0"/>
+              <a:buChar char="•"/>
+              <a:defRPr sz="2400" kern="1200">
+                <a:solidFill>
+                  <a:schemeClr val="tx1"/>
+                </a:solidFill>
+                <a:latin typeface="+mn-lt"/>
+                <a:ea typeface="+mn-ea"/>
+                <a:cs typeface="+mn-cs"/>
+              </a:defRPr>
+            </a:lvl2pPr>
+            <a:lvl3pPr marL="1143000" indent="-228600" algn="l" defTabSz="914400" rtl="0" eaLnBrk="1" latinLnBrk="0" hangingPunct="1">
+              <a:lnSpc>
+                <a:spcPct val="90000"/>
+              </a:lnSpc>
+              <a:spcBef>
+                <a:spcPts val="500"/>
+              </a:spcBef>
+              <a:buFont typeface="Arial" panose="020B0604020202020204" pitchFamily="34" charset="0"/>
+              <a:buChar char="•"/>
+              <a:defRPr sz="2000" kern="1200">
+                <a:solidFill>
+                  <a:schemeClr val="tx1"/>
+                </a:solidFill>
+                <a:latin typeface="+mn-lt"/>
+                <a:ea typeface="+mn-ea"/>
+                <a:cs typeface="+mn-cs"/>
+              </a:defRPr>
+            </a:lvl3pPr>
+            <a:lvl4pPr marL="1600200" indent="-228600" algn="l" defTabSz="914400" rtl="0" eaLnBrk="1" latinLnBrk="0" hangingPunct="1">
+              <a:lnSpc>
+                <a:spcPct val="90000"/>
+              </a:lnSpc>
+              <a:spcBef>
+                <a:spcPts val="500"/>
+              </a:spcBef>
+              <a:buFont typeface="Arial" panose="020B0604020202020204" pitchFamily="34" charset="0"/>
+              <a:buChar char="•"/>
+              <a:defRPr sz="1800" kern="1200">
+                <a:solidFill>
+                  <a:schemeClr val="tx1"/>
+                </a:solidFill>
+                <a:latin typeface="+mn-lt"/>
+                <a:ea typeface="+mn-ea"/>
+                <a:cs typeface="+mn-cs"/>
+              </a:defRPr>
+            </a:lvl4pPr>
+            <a:lvl5pPr marL="2057400" indent="-228600" algn="l" defTabSz="914400" rtl="0" eaLnBrk="1" latinLnBrk="0" hangingPunct="1">
+              <a:lnSpc>
+                <a:spcPct val="90000"/>
+              </a:lnSpc>
+              <a:spcBef>
+                <a:spcPts val="500"/>
+              </a:spcBef>
+              <a:buFont typeface="Arial" panose="020B0604020202020204" pitchFamily="34" charset="0"/>
+              <a:buChar char="•"/>
+              <a:defRPr sz="1800" kern="1200">
+                <a:solidFill>
+                  <a:schemeClr val="tx1"/>
+                </a:solidFill>
+                <a:latin typeface="+mn-lt"/>
+                <a:ea typeface="+mn-ea"/>
+                <a:cs typeface="+mn-cs"/>
+              </a:defRPr>
+            </a:lvl5pPr>
+            <a:lvl6pPr marL="2514600" indent="-228600" algn="l" defTabSz="914400" rtl="0" eaLnBrk="1" latinLnBrk="0" hangingPunct="1">
+              <a:lnSpc>
+                <a:spcPct val="90000"/>
+              </a:lnSpc>
+              <a:spcBef>
+                <a:spcPts val="500"/>
+              </a:spcBef>
+              <a:buFont typeface="Arial" panose="020B0604020202020204" pitchFamily="34" charset="0"/>
+              <a:buChar char="•"/>
+              <a:defRPr sz="1800" kern="1200">
+                <a:solidFill>
+                  <a:schemeClr val="tx1"/>
+                </a:solidFill>
+                <a:latin typeface="+mn-lt"/>
+                <a:ea typeface="+mn-ea"/>
+                <a:cs typeface="+mn-cs"/>
+              </a:defRPr>
+            </a:lvl6pPr>
+            <a:lvl7pPr marL="2971800" indent="-228600" algn="l" defTabSz="914400" rtl="0" eaLnBrk="1" latinLnBrk="0" hangingPunct="1">
+              <a:lnSpc>
+                <a:spcPct val="90000"/>
+              </a:lnSpc>
+              <a:spcBef>
+                <a:spcPts val="500"/>
+              </a:spcBef>
+              <a:buFont typeface="Arial" panose="020B0604020202020204" pitchFamily="34" charset="0"/>
+              <a:buChar char="•"/>
+              <a:defRPr sz="1800" kern="1200">
+                <a:solidFill>
+                  <a:schemeClr val="tx1"/>
+                </a:solidFill>
+                <a:latin typeface="+mn-lt"/>
+                <a:ea typeface="+mn-ea"/>
+                <a:cs typeface="+mn-cs"/>
+              </a:defRPr>
+            </a:lvl7pPr>
+            <a:lvl8pPr marL="3429000" indent="-228600" algn="l" defTabSz="914400" rtl="0" eaLnBrk="1" latinLnBrk="0" hangingPunct="1">
+              <a:lnSpc>
+                <a:spcPct val="90000"/>
+              </a:lnSpc>
+              <a:spcBef>
+                <a:spcPts val="500"/>
+              </a:spcBef>
+              <a:buFont typeface="Arial" panose="020B0604020202020204" pitchFamily="34" charset="0"/>
+              <a:buChar char="•"/>
+              <a:defRPr sz="1800" kern="1200">
+                <a:solidFill>
+                  <a:schemeClr val="tx1"/>
+                </a:solidFill>
+                <a:latin typeface="+mn-lt"/>
+                <a:ea typeface="+mn-ea"/>
+                <a:cs typeface="+mn-cs"/>
+              </a:defRPr>
+            </a:lvl8pPr>
+            <a:lvl9pPr marL="3886200" indent="-228600" algn="l" defTabSz="914400" rtl="0" eaLnBrk="1" latinLnBrk="0" hangingPunct="1">
+              <a:lnSpc>
+                <a:spcPct val="90000"/>
+              </a:lnSpc>
+              <a:spcBef>
+                <a:spcPts val="500"/>
+              </a:spcBef>
+              <a:buFont typeface="Arial" panose="020B0604020202020204" pitchFamily="34" charset="0"/>
+              <a:buChar char="•"/>
+              <a:defRPr sz="1800" kern="1200">
+                <a:solidFill>
+                  <a:schemeClr val="tx1"/>
+                </a:solidFill>
+                <a:latin typeface="+mn-lt"/>
+                <a:ea typeface="+mn-ea"/>
+                <a:cs typeface="+mn-cs"/>
+              </a:defRPr>
+            </a:lvl9pPr>
+          </a:lstStyle>
+          <a:p>
+            <a:pPr marL="0" indent="0">
+              <a:buNone/>
+            </a:pPr>
+            <a:r>
+              <a:rPr lang="en-US" dirty="0" smtClean="0"/>
+              <a:t>@forward</a:t>
+            </a:r>
+            <a:r>
+              <a:rPr lang="ru-RU" dirty="0" smtClean="0"/>
+              <a:t> просто объединяет модули в одном месте.</a:t>
+            </a:r>
+          </a:p>
+          <a:p>
+            <a:pPr marL="0" indent="0">
+              <a:buNone/>
+            </a:pPr>
+            <a:r>
+              <a:rPr lang="ru-RU" dirty="0" smtClean="0"/>
+              <a:t>Использование </a:t>
+            </a:r>
+            <a:r>
+              <a:rPr lang="ru-RU" dirty="0"/>
+              <a:t>@</a:t>
+            </a:r>
+            <a:r>
+              <a:rPr lang="ru-RU" dirty="0" err="1"/>
+              <a:t>forward</a:t>
+            </a:r>
+            <a:r>
+              <a:rPr lang="ru-RU" dirty="0"/>
+              <a:t> упростит вам импорт нескольких файлов, не указывая их по отдельности, и вместо этого </a:t>
+            </a:r>
+            <a:r>
+              <a:rPr lang="ru-RU" dirty="0" smtClean="0"/>
+              <a:t>даст использовать общий </a:t>
+            </a:r>
+            <a:r>
+              <a:rPr lang="en-US" dirty="0" smtClean="0"/>
+              <a:t>namespace</a:t>
+            </a:r>
+            <a:r>
+              <a:rPr lang="ru-RU" dirty="0" smtClean="0"/>
+              <a:t>.</a:t>
+            </a:r>
+            <a:endParaRPr lang="ru-RU" dirty="0"/>
+          </a:p>
+        </p:txBody>
+      </p:sp>
+    </p:spTree>
+    <p:extLst>
+      <p:ext uri="{BB962C8B-B14F-4D97-AF65-F5344CB8AC3E}">
+        <p14:creationId xmlns:p14="http://schemas.microsoft.com/office/powerpoint/2010/main" val="1442766335"/>
+      </p:ext>
+    </p:extLst>
+  </p:cSld>
+  <p:clrMapOvr>
+    <a:masterClrMapping/>
+  </p:clrMapOvr>
+</p:sld>
+</file>
+
+<file path=ppt/slides/slide18.xml><?xml version="1.0" encoding="utf-8"?>
+<p:sld xmlns:a="http://schemas.openxmlformats.org/drawingml/2006/main" xmlns:r="http://schemas.openxmlformats.org/officeDocument/2006/relationships" xmlns:p="http://schemas.openxmlformats.org/presentationml/2006/main">
+  <p:cSld>
+    <p:spTree>
+      <p:nvGrpSpPr>
+        <p:cNvPr id="1" name=""/>
+        <p:cNvGrpSpPr/>
+        <p:nvPr/>
+      </p:nvGrpSpPr>
+      <p:grpSpPr>
+        <a:xfrm>
+          <a:off x="0" y="0"/>
+          <a:ext cx="0" cy="0"/>
+          <a:chOff x="0" y="0"/>
+          <a:chExt cx="0" cy="0"/>
+        </a:xfrm>
+      </p:grpSpPr>
+      <p:sp>
+        <p:nvSpPr>
+          <p:cNvPr id="2" name="Заголовок 1"/>
+          <p:cNvSpPr>
+            <a:spLocks noGrp="1"/>
+          </p:cNvSpPr>
+          <p:nvPr>
+            <p:ph type="title"/>
+          </p:nvPr>
+        </p:nvSpPr>
+        <p:spPr/>
+        <p:txBody>
+          <a:bodyPr/>
+          <a:lstStyle/>
+          <a:p>
+            <a:r>
+              <a:rPr lang="ru-RU" dirty="0" smtClean="0"/>
+              <a:t>Наследование</a:t>
+            </a:r>
+            <a:endParaRPr lang="ru-RU" dirty="0"/>
+          </a:p>
+        </p:txBody>
+      </p:sp>
+      <p:sp>
+        <p:nvSpPr>
+          <p:cNvPr id="3" name="Объект 2"/>
+          <p:cNvSpPr>
+            <a:spLocks noGrp="1"/>
+          </p:cNvSpPr>
+          <p:nvPr>
+            <p:ph idx="1"/>
+          </p:nvPr>
+        </p:nvSpPr>
+        <p:spPr>
+          <a:xfrm>
+            <a:off x="838200" y="1825625"/>
+            <a:ext cx="5998029" cy="4351338"/>
+          </a:xfrm>
+        </p:spPr>
+        <p:txBody>
+          <a:bodyPr>
+            <a:normAutofit/>
+          </a:bodyPr>
+          <a:lstStyle/>
+          <a:p>
+            <a:pPr marL="0" indent="0">
+              <a:buNone/>
+            </a:pPr>
+            <a:r>
+              <a:rPr lang="ru-RU" dirty="0"/>
+              <a:t>Иногда возникает ситуация, когда несколько элементов на странице используют одинаковую CSS </a:t>
+            </a:r>
+            <a:r>
+              <a:rPr lang="ru-RU" dirty="0" smtClean="0"/>
+              <a:t>код</a:t>
+            </a:r>
+            <a:r>
+              <a:rPr lang="ru-RU" dirty="0" smtClean="0"/>
+              <a:t>.</a:t>
+            </a:r>
+            <a:endParaRPr lang="en-US" dirty="0" smtClean="0"/>
+          </a:p>
+          <a:p>
+            <a:pPr marL="0" indent="0">
+              <a:buNone/>
+            </a:pPr>
+            <a:r>
+              <a:rPr lang="ru-RU" dirty="0"/>
+              <a:t>При необходимости можно унаследовать стили одного из селекторов, что помогает избежать дублирования кода. </a:t>
+            </a:r>
+            <a:r>
+              <a:rPr lang="en" dirty="0"/>
+              <a:t>Если нам нужно расширить или унаследовать свойства класса, мы можем применить </a:t>
+            </a:r>
+            <a:r>
+              <a:rPr lang="ru-RU" dirty="0"/>
+              <a:t>функцию </a:t>
+            </a:r>
+            <a:r>
+              <a:rPr lang="en" b="1" dirty="0"/>
+              <a:t>@extend</a:t>
+            </a:r>
+            <a:r>
+              <a:rPr lang="ru-RU" b="1" dirty="0" smtClean="0"/>
+              <a:t>.</a:t>
+            </a:r>
+            <a:endParaRPr lang="en" b="1" dirty="0"/>
+          </a:p>
+        </p:txBody>
+      </p:sp>
+      <p:pic>
+        <p:nvPicPr>
+          <p:cNvPr id="4" name="Рисунок 3"/>
+          <p:cNvPicPr>
+            <a:picLocks noChangeAspect="1"/>
+          </p:cNvPicPr>
+          <p:nvPr/>
+        </p:nvPicPr>
+        <p:blipFill>
+          <a:blip r:embed="rId2"/>
+          <a:stretch>
+            <a:fillRect/>
+          </a:stretch>
+        </p:blipFill>
+        <p:spPr>
+          <a:xfrm>
+            <a:off x="7027333" y="2114021"/>
+            <a:ext cx="4762761" cy="3389312"/>
+          </a:xfrm>
+          <a:prstGeom prst="rect">
+            <a:avLst/>
+          </a:prstGeom>
+        </p:spPr>
+      </p:pic>
+    </p:spTree>
+    <p:extLst>
+      <p:ext uri="{BB962C8B-B14F-4D97-AF65-F5344CB8AC3E}">
+        <p14:creationId xmlns:p14="http://schemas.microsoft.com/office/powerpoint/2010/main" val="4164377854"/>
+      </p:ext>
+    </p:extLst>
+  </p:cSld>
+  <p:clrMapOvr>
+    <a:masterClrMapping/>
+  </p:clrMapOvr>
+  <p:timing>
+    <p:tnLst>
+      <p:par>
+        <p:cTn id="1" dur="indefinite" restart="never" nodeType="tmRoot"/>
+      </p:par>
+    </p:tnLst>
+  </p:timing>
+</p:sld>
+</file>
+
+<file path=ppt/slides/slide19.xml><?xml version="1.0" encoding="utf-8"?>
+<p:sld xmlns:a="http://schemas.openxmlformats.org/drawingml/2006/main" xmlns:r="http://schemas.openxmlformats.org/officeDocument/2006/relationships" xmlns:p="http://schemas.openxmlformats.org/presentationml/2006/main">
+  <p:cSld>
+    <p:spTree>
+      <p:nvGrpSpPr>
+        <p:cNvPr id="1" name=""/>
+        <p:cNvGrpSpPr/>
+        <p:nvPr/>
+      </p:nvGrpSpPr>
+      <p:grpSpPr>
+        <a:xfrm>
+          <a:off x="0" y="0"/>
+          <a:ext cx="0" cy="0"/>
+          <a:chOff x="0" y="0"/>
+          <a:chExt cx="0" cy="0"/>
+        </a:xfrm>
+      </p:grpSpPr>
+      <p:sp>
+        <p:nvSpPr>
+          <p:cNvPr id="2" name="Заголовок 1"/>
+          <p:cNvSpPr>
+            <a:spLocks noGrp="1"/>
+          </p:cNvSpPr>
+          <p:nvPr>
+            <p:ph type="title"/>
+          </p:nvPr>
+        </p:nvSpPr>
+        <p:spPr/>
+        <p:txBody>
+          <a:bodyPr/>
+          <a:lstStyle/>
+          <a:p>
+            <a:r>
+              <a:rPr lang="ru-RU" dirty="0" err="1" smtClean="0"/>
+              <a:t>П</a:t>
+            </a:r>
+            <a:r>
+              <a:rPr lang="ru-RU" dirty="0" err="1" smtClean="0"/>
+              <a:t>лейсхолдеры</a:t>
+            </a:r>
+            <a:r>
+              <a:rPr lang="ru-RU" dirty="0" smtClean="0"/>
+              <a:t> (</a:t>
+            </a:r>
+            <a:r>
+              <a:rPr lang="en-US" dirty="0" smtClean="0"/>
+              <a:t>placeholders</a:t>
+            </a:r>
+            <a:r>
+              <a:rPr lang="ru-RU" dirty="0" smtClean="0"/>
+              <a:t>)</a:t>
+            </a:r>
+            <a:endParaRPr lang="ru-RU" dirty="0"/>
+          </a:p>
+        </p:txBody>
+      </p:sp>
+      <p:sp>
+        <p:nvSpPr>
+          <p:cNvPr id="3" name="Объект 2"/>
+          <p:cNvSpPr>
+            <a:spLocks noGrp="1"/>
+          </p:cNvSpPr>
+          <p:nvPr>
+            <p:ph idx="1"/>
+          </p:nvPr>
+        </p:nvSpPr>
+        <p:spPr>
+          <a:xfrm>
+            <a:off x="838200" y="1825625"/>
+            <a:ext cx="6189133" cy="4351338"/>
+          </a:xfrm>
+        </p:spPr>
+        <p:txBody>
+          <a:bodyPr>
+            <a:normAutofit/>
+          </a:bodyPr>
+          <a:lstStyle/>
+          <a:p>
+            <a:pPr marL="0" indent="0">
+              <a:buNone/>
+            </a:pPr>
+            <a:r>
+              <a:rPr lang="ru-RU" dirty="0" smtClean="0"/>
+              <a:t>Также </a:t>
+            </a:r>
+            <a:r>
+              <a:rPr lang="ru-RU" dirty="0" smtClean="0"/>
+              <a:t>можно создать </a:t>
+            </a:r>
+            <a:r>
+              <a:rPr lang="ru-RU" dirty="0"/>
+              <a:t>селектор-шаблон </a:t>
+            </a:r>
+            <a:r>
+              <a:rPr lang="ru-RU" b="1" dirty="0"/>
+              <a:t>(</a:t>
+            </a:r>
+            <a:r>
+              <a:rPr lang="ru-RU" b="1" dirty="0" err="1" smtClean="0"/>
+              <a:t>плейсхолдер</a:t>
+            </a:r>
+            <a:r>
+              <a:rPr lang="ru-RU" b="1" dirty="0" smtClean="0"/>
+              <a:t>) </a:t>
+            </a:r>
+            <a:r>
+              <a:rPr lang="ru-RU" dirty="0"/>
+              <a:t>для использования в нескольких местах </a:t>
+            </a:r>
+            <a:r>
+              <a:rPr lang="ru-RU" dirty="0" err="1"/>
+              <a:t>Sass</a:t>
+            </a:r>
+            <a:r>
+              <a:rPr lang="ru-RU" dirty="0"/>
+              <a:t>. </a:t>
+            </a:r>
+            <a:r>
+              <a:rPr lang="ru-RU" dirty="0" smtClean="0"/>
+              <a:t>Он начинается со знака </a:t>
+            </a:r>
+            <a:r>
+              <a:rPr lang="ru-RU" b="1" dirty="0" smtClean="0"/>
+              <a:t>%</a:t>
+            </a:r>
+            <a:r>
+              <a:rPr lang="ru-RU" dirty="0"/>
+              <a:t> </a:t>
+            </a:r>
+            <a:r>
+              <a:rPr lang="ru-RU" dirty="0" smtClean="0"/>
+              <a:t>и выводится с помощью</a:t>
+            </a:r>
+            <a:r>
+              <a:rPr lang="ru-RU" dirty="0"/>
+              <a:t> </a:t>
+            </a:r>
+            <a:r>
+              <a:rPr lang="ru-RU" b="1" dirty="0"/>
+              <a:t>@</a:t>
+            </a:r>
+            <a:r>
+              <a:rPr lang="ru-RU" b="1" dirty="0" err="1"/>
+              <a:t>extend</a:t>
+            </a:r>
+            <a:r>
+              <a:rPr lang="ru-RU" dirty="0" smtClean="0"/>
+              <a:t>.</a:t>
+            </a:r>
+          </a:p>
+          <a:p>
+            <a:pPr marL="0" indent="0">
+              <a:buNone/>
+            </a:pPr>
+            <a:r>
+              <a:rPr lang="ru-RU" dirty="0" smtClean="0"/>
+              <a:t>В </a:t>
+            </a:r>
+            <a:r>
+              <a:rPr lang="en-US" dirty="0" err="1" smtClean="0"/>
+              <a:t>css</a:t>
+            </a:r>
+            <a:r>
+              <a:rPr lang="en-US" dirty="0" smtClean="0"/>
+              <a:t> </a:t>
+            </a:r>
+            <a:r>
+              <a:rPr lang="ru-RU" dirty="0" smtClean="0"/>
+              <a:t>селектор с процентом не отобразится, только его содержимое.</a:t>
+            </a:r>
+            <a:endParaRPr lang="ru-RU" dirty="0"/>
+          </a:p>
+        </p:txBody>
+      </p:sp>
+      <p:pic>
+        <p:nvPicPr>
+          <p:cNvPr id="5" name="Рисунок 4"/>
+          <p:cNvPicPr>
+            <a:picLocks noChangeAspect="1"/>
+          </p:cNvPicPr>
+          <p:nvPr/>
+        </p:nvPicPr>
+        <p:blipFill>
+          <a:blip r:embed="rId2"/>
+          <a:stretch>
+            <a:fillRect/>
+          </a:stretch>
+        </p:blipFill>
+        <p:spPr>
+          <a:xfrm>
+            <a:off x="7416170" y="1981200"/>
+            <a:ext cx="4400236" cy="3670338"/>
+          </a:xfrm>
+          <a:prstGeom prst="rect">
+            <a:avLst/>
+          </a:prstGeom>
+        </p:spPr>
+      </p:pic>
+    </p:spTree>
+    <p:extLst>
+      <p:ext uri="{BB962C8B-B14F-4D97-AF65-F5344CB8AC3E}">
+        <p14:creationId xmlns:p14="http://schemas.microsoft.com/office/powerpoint/2010/main" val="4164377854"/>
+      </p:ext>
+    </p:extLst>
+  </p:cSld>
+  <p:clrMapOvr>
+    <a:masterClrMapping/>
+  </p:clrMapOvr>
+  <p:timing>
+    <p:tnLst>
+      <p:par>
+        <p:cTn id="1" dur="indefinite" restart="never" nodeType="tmRoot"/>
+      </p:par>
+    </p:tnLst>
+  </p:timing>
+</p:sld>
+</file>
+
+<file path=ppt/slides/slide2.xml><?xml version="1.0" encoding="utf-8"?>
+<p:sld xmlns:a="http://schemas.openxmlformats.org/drawingml/2006/main" xmlns:r="http://schemas.openxmlformats.org/officeDocument/2006/relationships" xmlns:p="http://schemas.openxmlformats.org/presentationml/2006/main">
+  <p:cSld>
+    <p:spTree>
+      <p:nvGrpSpPr>
+        <p:cNvPr id="1" name=""/>
+        <p:cNvGrpSpPr/>
+        <p:nvPr/>
+      </p:nvGrpSpPr>
+      <p:grpSpPr>
+        <a:xfrm>
+          <a:off x="0" y="0"/>
+          <a:ext cx="0" cy="0"/>
+          <a:chOff x="0" y="0"/>
+          <a:chExt cx="0" cy="0"/>
+        </a:xfrm>
+      </p:grpSpPr>
+      <p:sp>
+        <p:nvSpPr>
+          <p:cNvPr id="2" name="Заголовок 1"/>
+          <p:cNvSpPr>
+            <a:spLocks noGrp="1"/>
+          </p:cNvSpPr>
+          <p:nvPr>
+            <p:ph type="title"/>
+          </p:nvPr>
+        </p:nvSpPr>
+        <p:spPr/>
+        <p:txBody>
+          <a:bodyPr/>
+          <a:lstStyle/>
+          <a:p>
+            <a:r>
+              <a:rPr lang="ru-RU" dirty="0" smtClean="0"/>
+              <a:t>Что такое препроцессоры?</a:t>
+            </a:r>
+            <a:endParaRPr lang="ru-RU" dirty="0"/>
+          </a:p>
+        </p:txBody>
+      </p:sp>
+      <p:sp>
+        <p:nvSpPr>
+          <p:cNvPr id="3" name="Объект 2"/>
+          <p:cNvSpPr>
+            <a:spLocks noGrp="1"/>
+          </p:cNvSpPr>
+          <p:nvPr>
+            <p:ph idx="1"/>
+          </p:nvPr>
+        </p:nvSpPr>
+        <p:spPr/>
+        <p:txBody>
+          <a:bodyPr>
+            <a:normAutofit/>
+          </a:bodyPr>
+          <a:lstStyle/>
+          <a:p>
+            <a:pPr marL="0" indent="0">
+              <a:buNone/>
+            </a:pPr>
+            <a:r>
+              <a:rPr lang="ru-RU" b="1" dirty="0"/>
+              <a:t>Препроцессоры CSS </a:t>
+            </a:r>
+            <a:r>
+              <a:rPr lang="ru-RU" dirty="0"/>
+              <a:t>— это инструменты, которые расширяют функциональность CSS за счёт введения таких функций, как переменные, вложенность и </a:t>
+            </a:r>
+            <a:r>
+              <a:rPr lang="ru-RU" dirty="0" err="1" smtClean="0"/>
+              <a:t>миксины</a:t>
+            </a:r>
+            <a:r>
+              <a:rPr lang="ru-RU" dirty="0" smtClean="0"/>
+              <a:t> и др. </a:t>
+            </a:r>
+            <a:r>
+              <a:rPr lang="ru-RU" dirty="0"/>
+              <a:t>Они повышают удобство обслуживания и организованность таблиц стилей</a:t>
+            </a:r>
+            <a:r>
+              <a:rPr lang="ru-RU" dirty="0" smtClean="0"/>
+              <a:t>.</a:t>
+            </a:r>
+          </a:p>
+          <a:p>
+            <a:pPr marL="0" indent="0">
+              <a:buNone/>
+            </a:pPr>
+            <a:r>
+              <a:rPr lang="ru-RU" dirty="0"/>
+              <a:t>Препроцессоры так называются потому, что принимают данные </a:t>
+            </a:r>
+            <a:r>
+              <a:rPr lang="ru-RU" dirty="0" smtClean="0"/>
+              <a:t>(код </a:t>
+            </a:r>
+            <a:r>
+              <a:rPr lang="ru-RU" dirty="0"/>
+              <a:t>в </a:t>
+            </a:r>
+            <a:r>
+              <a:rPr lang="ru-RU" dirty="0" smtClean="0"/>
+              <a:t>формате </a:t>
+            </a:r>
+            <a:r>
+              <a:rPr lang="ru-RU" dirty="0" err="1"/>
+              <a:t>scss</a:t>
+            </a:r>
+            <a:r>
+              <a:rPr lang="ru-RU" dirty="0"/>
+              <a:t> или </a:t>
+            </a:r>
+            <a:r>
+              <a:rPr lang="ru-RU" dirty="0" err="1"/>
+              <a:t>less</a:t>
+            </a:r>
+            <a:r>
+              <a:rPr lang="ru-RU" dirty="0"/>
+              <a:t>) и потом </a:t>
+            </a:r>
+            <a:r>
+              <a:rPr lang="ru-RU" dirty="0" smtClean="0"/>
+              <a:t>компилируют </a:t>
+            </a:r>
+            <a:r>
+              <a:rPr lang="ru-RU" dirty="0"/>
+              <a:t>их в обычный CSS-код</a:t>
+            </a:r>
+            <a:r>
+              <a:rPr lang="ru-RU" dirty="0" smtClean="0"/>
+              <a:t>.</a:t>
+            </a:r>
+            <a:endParaRPr lang="ru-RU" dirty="0"/>
+          </a:p>
+          <a:p>
+            <a:pPr marL="0" indent="0">
+              <a:buNone/>
+            </a:pPr>
+            <a:r>
+              <a:rPr lang="ru-RU" dirty="0"/>
+              <a:t>Основные препроцессоры — это </a:t>
+            </a:r>
+            <a:r>
+              <a:rPr lang="ru-RU" dirty="0" err="1"/>
+              <a:t>Sass</a:t>
+            </a:r>
+            <a:r>
+              <a:rPr lang="ru-RU" dirty="0"/>
+              <a:t>, </a:t>
+            </a:r>
+            <a:r>
+              <a:rPr lang="ru-RU" dirty="0" err="1"/>
+              <a:t>Less</a:t>
+            </a:r>
+            <a:r>
+              <a:rPr lang="ru-RU" dirty="0"/>
+              <a:t> и </a:t>
+            </a:r>
+            <a:r>
+              <a:rPr lang="ru-RU" dirty="0" err="1" smtClean="0"/>
+              <a:t>Stylus</a:t>
+            </a:r>
+            <a:r>
+              <a:rPr lang="ru-RU" dirty="0"/>
+              <a:t>.</a:t>
+            </a:r>
+          </a:p>
+        </p:txBody>
+      </p:sp>
+    </p:spTree>
+    <p:extLst>
+      <p:ext uri="{BB962C8B-B14F-4D97-AF65-F5344CB8AC3E}">
+        <p14:creationId xmlns:p14="http://schemas.microsoft.com/office/powerpoint/2010/main" val="1360120161"/>
+      </p:ext>
+    </p:extLst>
+  </p:cSld>
+  <p:clrMapOvr>
+    <a:masterClrMapping/>
+  </p:clrMapOvr>
+  <p:timing>
+    <p:tnLst>
+      <p:par>
+        <p:cTn id="1" dur="indefinite" restart="never" nodeType="tmRoot"/>
+      </p:par>
+    </p:tnLst>
+  </p:timing>
+</p:sld>
+</file>
+
+<file path=ppt/slides/slide20.xml><?xml version="1.0" encoding="utf-8"?>
+<p:sld xmlns:a="http://schemas.openxmlformats.org/drawingml/2006/main" xmlns:r="http://schemas.openxmlformats.org/officeDocument/2006/relationships" xmlns:p="http://schemas.openxmlformats.org/presentationml/2006/main">
+  <p:cSld>
+    <p:spTree>
+      <p:nvGrpSpPr>
+        <p:cNvPr id="1" name=""/>
+        <p:cNvGrpSpPr/>
+        <p:nvPr/>
+      </p:nvGrpSpPr>
+      <p:grpSpPr>
+        <a:xfrm>
+          <a:off x="0" y="0"/>
+          <a:ext cx="0" cy="0"/>
+          <a:chOff x="0" y="0"/>
+          <a:chExt cx="0" cy="0"/>
+        </a:xfrm>
+      </p:grpSpPr>
+      <p:sp>
+        <p:nvSpPr>
+          <p:cNvPr id="2" name="Заголовок 1"/>
+          <p:cNvSpPr>
+            <a:spLocks noGrp="1"/>
+          </p:cNvSpPr>
+          <p:nvPr>
+            <p:ph type="title"/>
+          </p:nvPr>
+        </p:nvSpPr>
+        <p:spPr/>
+        <p:txBody>
+          <a:bodyPr/>
+          <a:lstStyle/>
+          <a:p>
+            <a:r>
+              <a:rPr lang="ru-RU" dirty="0" smtClean="0"/>
+              <a:t>Прочий функционал</a:t>
+            </a:r>
+            <a:endParaRPr lang="ru-RU" dirty="0"/>
+          </a:p>
+        </p:txBody>
+      </p:sp>
+      <p:sp>
+        <p:nvSpPr>
+          <p:cNvPr id="3" name="Объект 2"/>
+          <p:cNvSpPr>
+            <a:spLocks noGrp="1"/>
+          </p:cNvSpPr>
+          <p:nvPr>
+            <p:ph idx="1"/>
+          </p:nvPr>
+        </p:nvSpPr>
+        <p:spPr/>
+        <p:txBody>
+          <a:bodyPr/>
+          <a:lstStyle/>
+          <a:p>
+            <a:r>
+              <a:rPr lang="ru-RU" dirty="0" smtClean="0"/>
+              <a:t>Работа с циклами </a:t>
             </a:r>
             <a:r>
               <a:rPr lang="en-US" dirty="0" smtClean="0"/>
@@ -3923,11 +5547,7 @@
             </a:r>
             <a:r>
               <a:rPr lang="en-US" dirty="0" smtClean="0"/>
-              <a:t>@</a:t>
-            </a:r>
-            <a:r>
-              <a:rPr lang="en-US" dirty="0" smtClean="0"/>
-              <a:t>function</a:t>
+              <a:t>@function</a:t>
             </a:r>
             <a:endParaRPr lang="ru-RU" dirty="0" smtClean="0"/>
           </a:p>
@@ -3949,13 +5569,8 @@
           <a:p>
             <a:r>
               <a:rPr lang="ru-RU" dirty="0" smtClean="0"/>
-              <a:t>Улучшенная работа </a:t>
-            </a:r>
-            <a:r>
-              <a:rPr lang="ru-RU" dirty="0" smtClean="0"/>
-              <a:t>со строками, вычислениями и т.д.</a:t>
-            </a:r>
-            <a:endParaRPr lang="ru-RU" dirty="0" smtClean="0"/>
+              <a:t>Улучшенная работа со строками, вычислениями и т.д.</a:t>
+            </a:r>
           </a:p>
           <a:p>
             <a:r>
@@ -3986,7 +5601,7 @@
 </p:sld>
 </file>
 
-<file path=ppt/slides/slide15.xml><?xml version="1.0" encoding="utf-8"?>
+<file path=ppt/slides/slide21.xml><?xml version="1.0" encoding="utf-8"?>
 <p:sld xmlns:a="http://schemas.openxmlformats.org/drawingml/2006/main" xmlns:r="http://schemas.openxmlformats.org/officeDocument/2006/relationships" xmlns:p="http://schemas.openxmlformats.org/presentationml/2006/main">
   <p:cSld>
     <p:spTree>
@@ -4189,9 +5804,21 @@
               <a:rPr lang="en-US" sz="2800" dirty="0" smtClean="0"/>
               <a:t>…</a:t>
             </a:r>
-            <a:endParaRPr lang="ru-RU" sz="2800" dirty="0" smtClean="0"/>
-          </a:p>
-          <a:p>
+            <a:endParaRPr lang="ru-RU" dirty="0" smtClean="0"/>
+          </a:p>
+          <a:p>
+            <a:r>
+              <a:rPr lang="ru-RU" dirty="0" err="1" smtClean="0"/>
+              <a:t>Битрикс</a:t>
+            </a:r>
+            <a:r>
+              <a:rPr lang="ru-RU" dirty="0" smtClean="0"/>
+              <a:t>-модули в </a:t>
+            </a:r>
+            <a:r>
+              <a:rPr lang="ru-RU" dirty="0" err="1" smtClean="0"/>
+              <a:t>маркетплейсе</a:t>
+            </a:r>
             <a:endParaRPr lang="ru-RU" dirty="0"/>
           </a:p>
         </p:txBody>
@@ -4209,7 +5836,7 @@
 </p:sld>
 </file>
 
-<file path=ppt/slides/slide2.xml><?xml version="1.0" encoding="utf-8"?>
+<file path=ppt/slides/slide22.xml><?xml version="1.0" encoding="utf-8"?>
 <p:sld xmlns:a="http://schemas.openxmlformats.org/drawingml/2006/main" xmlns:r="http://schemas.openxmlformats.org/officeDocument/2006/relationships" xmlns:p="http://schemas.openxmlformats.org/presentationml/2006/main">
   <p:cSld>
     <p:spTree>
@@ -4243,7 +5870,7 @@
           <a:p>
             <a:r>
               <a:rPr lang="ru-RU" dirty="0" smtClean="0"/>
-              <a:t>Что такое препроцессоры?</a:t>
+              <a:t>Преимущества и недостатки</a:t>
             </a:r>
             <a:endParaRPr lang="ru-RU" dirty="0"/>
           </a:p>
@@ -4259,98 +5886,77 @@
             <p:ph idx="1"/>
           </p:nvPr>
         </p:nvSpPr>
-        <p:spPr/>
+        <p:spPr>
+          <a:xfrm>
+            <a:off x="838200" y="1825625"/>
+            <a:ext cx="10515600" cy="4444546"/>
+          </a:xfrm>
+        </p:spPr>
         <p:txBody>
           <a:bodyPr>
-            <a:normAutofit/>
+            <a:normAutofit fontScale="55000" lnSpcReduction="20000"/>
           </a:bodyPr>
           <a:lstStyle/>
           <a:p>
-            <a:pPr marL="0" indent="0">
+            <a:pPr marL="0" indent="0" fontAlgn="base">
               <a:buNone/>
             </a:pPr>
             <a:r>
               <a:rPr lang="ru-RU" b="1" dirty="0"/>
-              <a:t>Препроцессоры CSS </a:t>
-            </a:r>
-            <a:r>
-              <a:rPr lang="ru-RU" dirty="0"/>
-              <a:t>— это инструменты, которые расширяют функциональность CSS за счёт введения таких функций, как переменные, вложенность и </a:t>
-            </a:r>
-            <a:r>
-              <a:rPr lang="ru-RU" dirty="0" err="1" smtClean="0"/>
+              <a:t>Преимущества:</a:t>
+            </a:r>
+          </a:p>
+          <a:p>
+            <a:pPr fontAlgn="base"/>
+            <a:r>
+              <a:rPr lang="ru-RU" b="1" dirty="0"/>
+              <a:t>Упрощение рабочего процесса</a:t>
+            </a:r>
+            <a:r>
+              <a:rPr lang="ru-RU" dirty="0"/>
+              <a:t>: </a:t>
+            </a:r>
+            <a:r>
+              <a:rPr lang="ru-RU" dirty="0" smtClean="0"/>
+              <a:t>Использование переменных, вложенности, </a:t>
+            </a:r>
+            <a:r>
+              <a:rPr lang="ru-RU" dirty="0" err="1"/>
               <a:t>миксины</a:t>
             </a:r>
             <a:r>
-              <a:rPr lang="ru-RU" dirty="0" smtClean="0"/>
-              <a:t> и др. </a:t>
-            </a:r>
-            <a:r>
-              <a:rPr lang="ru-RU" dirty="0"/>
-              <a:t>Они повышают удобство обслуживания и организованность таблиц стилей</a:t>
-            </a:r>
-            <a:r>
-              <a:rPr lang="ru-RU" dirty="0" smtClean="0"/>
-              <a:t>.</a:t>
-            </a:r>
-          </a:p>
-          <a:p>
-            <a:pPr marL="0" indent="0">
-              <a:buNone/>
-            </a:pPr>
-            <a:r>
-              <a:rPr lang="ru-RU" dirty="0"/>
-              <a:t>Препроцессоры так называются потому, что принимают данные </a:t>
-            </a:r>
-            <a:r>
-              <a:rPr lang="ru-RU" dirty="0" smtClean="0"/>
-              <a:t>(код </a:t>
-            </a:r>
-            <a:r>
-              <a:rPr lang="ru-RU" dirty="0"/>
-              <a:t>в </a:t>
-            </a:r>
-            <a:r>
-              <a:rPr lang="ru-RU" dirty="0" smtClean="0"/>
-              <a:t>формате </a:t>
+              <a:rPr lang="ru-RU" dirty="0"/>
+              <a:t>, что делает код более организованным и легким для понимания.</a:t>
+            </a:r>
+          </a:p>
+          <a:p>
+            <a:pPr fontAlgn="base"/>
+            <a:r>
+              <a:rPr lang="ru-RU" b="1" dirty="0"/>
+              <a:t>Снижение повторяющегося кода</a:t>
+            </a:r>
+            <a:r>
+              <a:rPr lang="ru-RU" dirty="0"/>
+              <a:t>: Благодаря возможности создания функций и </a:t>
             </a:r>
             <a:r>
               <a:rPr lang="ru-RU" dirty="0" err="1"/>
-              <a:t>scss</a:t>
-            </a:r>
-            <a:r>
-              <a:rPr lang="ru-RU" dirty="0"/>
-              <a:t> или </a:t>
-            </a:r>
-            <a:r>
-              <a:rPr lang="ru-RU" dirty="0" err="1"/>
-              <a:t>less</a:t>
-            </a:r>
-            <a:r>
-              <a:rPr lang="ru-RU" dirty="0"/>
-              <a:t>) и потом </a:t>
-            </a:r>
-            <a:r>
-              <a:rPr lang="ru-RU" dirty="0" smtClean="0"/>
-              <a:t>компилируют </a:t>
-            </a:r>
-            <a:r>
-              <a:rPr lang="ru-RU" dirty="0"/>
-              <a:t>их в обычный CSS-код</a:t>
-            </a:r>
-            <a:r>
-              <a:rPr lang="ru-RU" dirty="0" smtClean="0"/>
-              <a:t>.</a:t>
-            </a:r>
-            <a:endParaRPr lang="ru-RU" dirty="0"/>
-          </a:p>
-          <a:p>
-            <a:pPr marL="0" indent="0">
-              <a:buNone/>
-            </a:pPr>
-            <a:r>
-              <a:rPr lang="ru-RU" dirty="0"/>
-              <a:t>Основные препроцессоры — это </a:t>
+              <a:t>миксинов</a:t>
+            </a:r>
+            <a:r>
+              <a:rPr lang="ru-RU" dirty="0"/>
+              <a:t>, можно избежать дублирования кода, что упрощает его поддержку.</a:t>
+            </a:r>
+          </a:p>
+          <a:p>
+            <a:pPr fontAlgn="base"/>
+            <a:r>
+              <a:rPr lang="ru-RU" b="1" dirty="0"/>
+              <a:t>Поддержка модульности</a:t>
+            </a:r>
+            <a:r>
+              <a:rPr lang="ru-RU" dirty="0"/>
+              <a:t>: </a:t>
             </a:r>
             <a:r>
               <a:rPr lang="ru-RU" dirty="0" err="1"/>
@@ -4358,44 +5964,163 @@
             </a:r>
             <a:r>
               <a:rPr lang="ru-RU" dirty="0"/>
-              <a:t>, </a:t>
+              <a:t>/SCSS позволяет разбивать стили на </a:t>
+            </a:r>
+            <a:r>
+              <a:rPr lang="ru-RU" dirty="0" smtClean="0"/>
+              <a:t>модули, что подойдёт для больших проектов.</a:t>
+            </a:r>
+            <a:endParaRPr lang="ru-RU" dirty="0"/>
+          </a:p>
+          <a:p>
+            <a:pPr fontAlgn="base"/>
+            <a:r>
+              <a:rPr lang="ru-RU" b="1" dirty="0"/>
+              <a:t>Расширенные возможности</a:t>
+            </a:r>
+            <a:r>
+              <a:rPr lang="ru-RU" dirty="0"/>
+              <a:t>: </a:t>
             </a:r>
             <a:r>
               <a:rPr lang="ru-RU" dirty="0" err="1"/>
-              <a:t>Less</a:t>
-            </a:r>
-            <a:r>
-              <a:rPr lang="ru-RU" dirty="0"/>
-              <a:t> и </a:t>
+              <a:t>Sass</a:t>
+            </a:r>
+            <a:r>
+              <a:rPr lang="ru-RU" dirty="0"/>
+              <a:t>/SCSS предлагает множество функций, таких как циклы, условия и математические </a:t>
+            </a:r>
+            <a:r>
+              <a:rPr lang="ru-RU" dirty="0" smtClean="0"/>
+              <a:t>операции.</a:t>
+            </a:r>
+            <a:endParaRPr lang="ru-RU" dirty="0"/>
+          </a:p>
+          <a:p>
+            <a:pPr marL="0" indent="0" fontAlgn="base">
+              <a:buNone/>
+            </a:pPr>
+            <a:r>
+              <a:rPr lang="ru-RU" b="1" dirty="0" smtClean="0"/>
+              <a:t>Недостатки</a:t>
+            </a:r>
+            <a:r>
+              <a:rPr lang="ru-RU" b="1" dirty="0"/>
+              <a:t>:</a:t>
+            </a:r>
+          </a:p>
+          <a:p>
+            <a:pPr fontAlgn="base"/>
+            <a:r>
+              <a:rPr lang="ru-RU" b="1" dirty="0"/>
+              <a:t>Необходимость изучения нового синтаксиса</a:t>
+            </a:r>
+            <a:r>
+              <a:rPr lang="ru-RU" dirty="0"/>
+              <a:t>: Для работы с </a:t>
+            </a:r>
+            <a:r>
+              <a:rPr lang="ru-RU" dirty="0" err="1"/>
+              <a:t>Sass</a:t>
+            </a:r>
+            <a:r>
+              <a:rPr lang="ru-RU" dirty="0"/>
+              <a:t>/SCSS требуется время на изучение его особенностей и синтаксиса.</a:t>
+            </a:r>
+          </a:p>
+          <a:p>
+            <a:pPr fontAlgn="base"/>
+            <a:r>
+              <a:rPr lang="ru-RU" b="1" dirty="0"/>
+              <a:t>Зависимость от компиляции</a:t>
+            </a:r>
+            <a:r>
+              <a:rPr lang="ru-RU" dirty="0"/>
+              <a:t>: </a:t>
+            </a:r>
+            <a:r>
+              <a:rPr lang="ru-RU" dirty="0" err="1"/>
+              <a:t>Sass</a:t>
+            </a:r>
+            <a:r>
+              <a:rPr lang="ru-RU" dirty="0"/>
+              <a:t>/SCSS необходимо компилировать в CSS, что добавляет дополнительный шаг в рабочий процесс.</a:t>
+            </a:r>
+          </a:p>
+          <a:p>
+            <a:pPr fontAlgn="base"/>
+            <a:r>
+              <a:rPr lang="ru-RU" b="1" dirty="0"/>
+              <a:t>Потенциальная сложность</a:t>
+            </a:r>
+            <a:r>
+              <a:rPr lang="ru-RU" dirty="0"/>
+              <a:t>: </a:t>
             </a:r>
             <a:r>
               <a:rPr lang="ru-RU" dirty="0" err="1" smtClean="0"/>
-              <a:t>Stylus</a:t>
-            </a:r>
-            <a:r>
-              <a:rPr lang="ru-RU" dirty="0"/>
-              <a:t>.</a:t>
-            </a:r>
+              <a:t>Sass</a:t>
+            </a:r>
+            <a:r>
+              <a:rPr lang="ru-RU" dirty="0" smtClean="0"/>
+              <a:t>/SCSS </a:t>
+            </a:r>
+            <a:r>
+              <a:rPr lang="ru-RU" dirty="0"/>
+              <a:t>код может стать сложным и трудным для понимания.</a:t>
+            </a:r>
+          </a:p>
+          <a:p>
+            <a:r>
+              <a:rPr lang="ru-RU" b="1" dirty="0" smtClean="0"/>
+              <a:t>Нет обратной совместимости </a:t>
+            </a:r>
+            <a:r>
+              <a:rPr lang="en-US" b="1" dirty="0" smtClean="0"/>
+              <a:t>CSS</a:t>
+            </a:r>
+            <a:r>
+              <a:rPr lang="ru-RU" b="1" dirty="0" smtClean="0"/>
+              <a:t> к </a:t>
+            </a:r>
+            <a:r>
+              <a:rPr lang="en-US" b="1" dirty="0" smtClean="0"/>
+              <a:t>SCSS: </a:t>
+            </a:r>
+            <a:r>
+              <a:rPr lang="ru-RU" dirty="0" smtClean="0"/>
+              <a:t>На сайте может быть очень сильно изменён</a:t>
+            </a:r>
+            <a:r>
+              <a:rPr lang="en-US" dirty="0" smtClean="0"/>
+              <a:t> </a:t>
+            </a:r>
+            <a:r>
+              <a:rPr lang="ru-RU" dirty="0" smtClean="0"/>
+              <a:t>скомпилированный </a:t>
+            </a:r>
+            <a:r>
+              <a:rPr lang="en-US" dirty="0" smtClean="0"/>
+              <a:t>CSS</a:t>
+            </a:r>
+            <a:r>
+              <a:rPr lang="ru-RU" dirty="0" smtClean="0"/>
+              <a:t>, что приводит к неактуальности препроцессора.</a:t>
+            </a:r>
+            <a:endParaRPr lang="ru-RU" b="1" dirty="0"/>
           </a:p>
         </p:txBody>
       </p:sp>
     </p:spTree>
     <p:extLst>
       <p:ext uri="{BB962C8B-B14F-4D97-AF65-F5344CB8AC3E}">
-        <p14:creationId xmlns:p14="http://schemas.microsoft.com/office/powerpoint/2010/main" val="1360120161"/>
+        <p14:creationId xmlns:p14="http://schemas.microsoft.com/office/powerpoint/2010/main" val="4009864047"/>
       </p:ext>
     </p:extLst>
   </p:cSld>
   <p:clrMapOvr>
     <a:masterClrMapping/>
   </p:clrMapOvr>
-  <p:timing>
-    <p:tnLst>
-      <p:par>
-        <p:cTn id="1" dur="indefinite" restart="never" nodeType="tmRoot"/>
-      </p:par>
-    </p:tnLst>
-  </p:timing>
 </p:sld>
 </file>
 
@@ -4551,11 +6276,7 @@
             </a:r>
             <a:r>
               <a:rPr lang="ru-RU" dirty="0" smtClean="0"/>
-              <a:t>тот же препроцессор, синтаксис которого похож на CSS</a:t>
-            </a:r>
-            <a:r>
-              <a:rPr lang="ru-RU" dirty="0" smtClean="0"/>
-              <a:t>.</a:t>
+              <a:t>тот же препроцессор, синтаксис которого похож на CSS.</a:t>
             </a:r>
             <a:endParaRPr lang="en-US" dirty="0" smtClean="0"/>
           </a:p>
@@ -7091,11 +8812,7 @@
             </a:r>
             <a:r>
               <a:rPr lang="ru-RU" dirty="0" smtClean="0"/>
-              <a:t>структурированным</a:t>
-            </a:r>
-            <a:r>
-              <a:rPr lang="ru-RU" dirty="0" smtClean="0"/>
-              <a:t>.</a:t>
+              <a:t>структурированным.</a:t>
             </a:r>
           </a:p>
           <a:p>
@@ -7262,8 +8979,8 @@
         </p:nvSpPr>
         <p:spPr>
           <a:xfrm>
-            <a:off x="838200" y="1825625"/>
-            <a:ext cx="5698067" cy="4351338"/>
+            <a:off x="838201" y="1825625"/>
+            <a:ext cx="5424834" cy="4351338"/>
           </a:xfrm>
         </p:spPr>
         <p:txBody>
@@ -7313,11 +9030,7 @@
             </a:r>
             <a:r>
               <a:rPr lang="ru-RU" dirty="0" smtClean="0"/>
-              <a:t> </a:t>
-            </a:r>
-            <a:r>
-              <a:rPr lang="ru-RU" dirty="0" smtClean="0"/>
-              <a:t>помогают </a:t>
+              <a:t> помогают </a:t>
             </a:r>
             <a:r>
               <a:rPr lang="ru-RU" dirty="0"/>
@@ -7339,16 +9052,15 @@
           </p:cNvPicPr>
           <p:nvPr/>
         </p:nvPicPr>
-        <p:blipFill>
+        <p:blipFill rotWithShape="1">
           <a:blip r:embed="rId2"/>
-          <a:stretch>
-            <a:fillRect/>
-          </a:stretch>
+          <a:srcRect b="42849"/>
+          <a:stretch/>
         </p:blipFill>
         <p:spPr>
           <a:xfrm>
-            <a:off x="7240329" y="365125"/>
-            <a:ext cx="4333604" cy="6294309"/>
+            <a:off x="6263035" y="1197240"/>
+            <a:ext cx="5700365" cy="4731808"/>
           </a:xfrm>
           <a:prstGeom prst="rect">
             <a:avLst/>

</xml_diff>

<commit_message>
presentation is completed, add some changes
</commit_message>
<xml_diff>
--- a/sass.pptx
+++ b/sass.pptx
@@ -15,18 +15,27 @@
     <p:sldId id="284" r:id="rId9"/>
     <p:sldId id="285" r:id="rId10"/>
     <p:sldId id="290" r:id="rId11"/>
-    <p:sldId id="286" r:id="rId12"/>
-    <p:sldId id="292" r:id="rId13"/>
-    <p:sldId id="293" r:id="rId14"/>
-    <p:sldId id="294" r:id="rId15"/>
-    <p:sldId id="296" r:id="rId16"/>
-    <p:sldId id="295" r:id="rId17"/>
-    <p:sldId id="297" r:id="rId18"/>
-    <p:sldId id="287" r:id="rId19"/>
-    <p:sldId id="298" r:id="rId20"/>
-    <p:sldId id="288" r:id="rId21"/>
-    <p:sldId id="289" r:id="rId22"/>
-    <p:sldId id="299" r:id="rId23"/>
+    <p:sldId id="301" r:id="rId12"/>
+    <p:sldId id="286" r:id="rId13"/>
+    <p:sldId id="292" r:id="rId14"/>
+    <p:sldId id="293" r:id="rId15"/>
+    <p:sldId id="294" r:id="rId16"/>
+    <p:sldId id="296" r:id="rId17"/>
+    <p:sldId id="295" r:id="rId18"/>
+    <p:sldId id="297" r:id="rId19"/>
+    <p:sldId id="287" r:id="rId20"/>
+    <p:sldId id="302" r:id="rId21"/>
+    <p:sldId id="298" r:id="rId22"/>
+    <p:sldId id="303" r:id="rId23"/>
+    <p:sldId id="288" r:id="rId24"/>
+    <p:sldId id="289" r:id="rId25"/>
+    <p:sldId id="304" r:id="rId26"/>
+    <p:sldId id="305" r:id="rId27"/>
+    <p:sldId id="306" r:id="rId28"/>
+    <p:sldId id="307" r:id="rId29"/>
+    <p:sldId id="308" r:id="rId30"/>
+    <p:sldId id="299" r:id="rId31"/>
+    <p:sldId id="300" r:id="rId32"/>
   </p:sldIdLst>
   <p:sldSz cx="12192000" cy="6858000"/>
   <p:notesSz cx="6858000" cy="9144000"/>
@@ -264,7 +273,7 @@
           <a:p>
             <a:fld id="{B19AC94C-8DDE-4B1A-BDD8-5078A1882F2A}" type="datetimeFigureOut">
               <a:rPr lang="ru-RU" smtClean="0"/>
-              <a:t>11.12.2024</a:t>
+              <a:t>12.12.2024</a:t>
             </a:fld>
             <a:endParaRPr lang="ru-RU"/>
           </a:p>
@@ -434,7 +443,7 @@
           <a:p>
             <a:fld id="{B19AC94C-8DDE-4B1A-BDD8-5078A1882F2A}" type="datetimeFigureOut">
               <a:rPr lang="ru-RU" smtClean="0"/>
-              <a:t>11.12.2024</a:t>
+              <a:t>12.12.2024</a:t>
             </a:fld>
             <a:endParaRPr lang="ru-RU"/>
           </a:p>
@@ -614,7 +623,7 @@
           <a:p>
             <a:fld id="{B19AC94C-8DDE-4B1A-BDD8-5078A1882F2A}" type="datetimeFigureOut">
               <a:rPr lang="ru-RU" smtClean="0"/>
-              <a:t>11.12.2024</a:t>
+              <a:t>12.12.2024</a:t>
             </a:fld>
             <a:endParaRPr lang="ru-RU"/>
           </a:p>
@@ -784,7 +793,7 @@
           <a:p>
             <a:fld id="{B19AC94C-8DDE-4B1A-BDD8-5078A1882F2A}" type="datetimeFigureOut">
               <a:rPr lang="ru-RU" smtClean="0"/>
-              <a:t>11.12.2024</a:t>
+              <a:t>12.12.2024</a:t>
             </a:fld>
             <a:endParaRPr lang="ru-RU"/>
           </a:p>
@@ -1030,7 +1039,7 @@
           <a:p>
             <a:fld id="{B19AC94C-8DDE-4B1A-BDD8-5078A1882F2A}" type="datetimeFigureOut">
               <a:rPr lang="ru-RU" smtClean="0"/>
-              <a:t>11.12.2024</a:t>
+              <a:t>12.12.2024</a:t>
             </a:fld>
             <a:endParaRPr lang="ru-RU"/>
           </a:p>
@@ -1262,7 +1271,7 @@
           <a:p>
             <a:fld id="{B19AC94C-8DDE-4B1A-BDD8-5078A1882F2A}" type="datetimeFigureOut">
               <a:rPr lang="ru-RU" smtClean="0"/>
-              <a:t>11.12.2024</a:t>
+              <a:t>12.12.2024</a:t>
             </a:fld>
             <a:endParaRPr lang="ru-RU"/>
           </a:p>
@@ -1629,7 +1638,7 @@
           <a:p>
             <a:fld id="{B19AC94C-8DDE-4B1A-BDD8-5078A1882F2A}" type="datetimeFigureOut">
               <a:rPr lang="ru-RU" smtClean="0"/>
-              <a:t>11.12.2024</a:t>
+              <a:t>12.12.2024</a:t>
             </a:fld>
             <a:endParaRPr lang="ru-RU"/>
           </a:p>
@@ -1747,7 +1756,7 @@
           <a:p>
             <a:fld id="{B19AC94C-8DDE-4B1A-BDD8-5078A1882F2A}" type="datetimeFigureOut">
               <a:rPr lang="ru-RU" smtClean="0"/>
-              <a:t>11.12.2024</a:t>
+              <a:t>12.12.2024</a:t>
             </a:fld>
             <a:endParaRPr lang="ru-RU"/>
           </a:p>
@@ -1842,7 +1851,7 @@
           <a:p>
             <a:fld id="{B19AC94C-8DDE-4B1A-BDD8-5078A1882F2A}" type="datetimeFigureOut">
               <a:rPr lang="ru-RU" smtClean="0"/>
-              <a:t>11.12.2024</a:t>
+              <a:t>12.12.2024</a:t>
             </a:fld>
             <a:endParaRPr lang="ru-RU"/>
           </a:p>
@@ -2119,7 +2128,7 @@
           <a:p>
             <a:fld id="{B19AC94C-8DDE-4B1A-BDD8-5078A1882F2A}" type="datetimeFigureOut">
               <a:rPr lang="ru-RU" smtClean="0"/>
-              <a:t>11.12.2024</a:t>
+              <a:t>12.12.2024</a:t>
             </a:fld>
             <a:endParaRPr lang="ru-RU"/>
           </a:p>
@@ -2372,7 +2381,7 @@
           <a:p>
             <a:fld id="{B19AC94C-8DDE-4B1A-BDD8-5078A1882F2A}" type="datetimeFigureOut">
               <a:rPr lang="ru-RU" smtClean="0"/>
-              <a:t>11.12.2024</a:t>
+              <a:t>12.12.2024</a:t>
             </a:fld>
             <a:endParaRPr lang="ru-RU"/>
           </a:p>
@@ -2585,7 +2594,7 @@
           <a:p>
             <a:fld id="{B19AC94C-8DDE-4B1A-BDD8-5078A1882F2A}" type="datetimeFigureOut">
               <a:rPr lang="ru-RU" smtClean="0"/>
-              <a:t>11.12.2024</a:t>
+              <a:t>12.12.2024</a:t>
             </a:fld>
             <a:endParaRPr lang="ru-RU"/>
           </a:p>
@@ -3266,6 +3275,132 @@
       </p:grpSpPr>
       <p:sp>
         <p:nvSpPr>
+          <p:cNvPr id="7" name="Заголовок 6"/>
+          <p:cNvSpPr>
+            <a:spLocks noGrp="1"/>
+          </p:cNvSpPr>
+          <p:nvPr>
+            <p:ph type="title"/>
+          </p:nvPr>
+        </p:nvSpPr>
+        <p:spPr/>
+        <p:txBody>
+          <a:bodyPr/>
+          <a:lstStyle/>
+          <a:p>
+            <a:endParaRPr lang="ru-RU"/>
+          </a:p>
+        </p:txBody>
+      </p:sp>
+      <p:pic>
+        <p:nvPicPr>
+          <p:cNvPr id="8" name="Рисунок 7"/>
+          <p:cNvPicPr>
+            <a:picLocks noChangeAspect="1"/>
+          </p:cNvPicPr>
+          <p:nvPr/>
+        </p:nvPicPr>
+        <p:blipFill rotWithShape="1">
+          <a:blip r:embed="rId2"/>
+          <a:srcRect b="42849"/>
+          <a:stretch/>
+        </p:blipFill>
+        <p:spPr>
+          <a:xfrm>
+            <a:off x="676982" y="198323"/>
+            <a:ext cx="5700365" cy="4731808"/>
+          </a:xfrm>
+          <a:prstGeom prst="rect">
+            <a:avLst/>
+          </a:prstGeom>
+        </p:spPr>
+      </p:pic>
+      <p:pic>
+        <p:nvPicPr>
+          <p:cNvPr id="10" name="Рисунок 9"/>
+          <p:cNvPicPr>
+            <a:picLocks noChangeAspect="1"/>
+          </p:cNvPicPr>
+          <p:nvPr/>
+        </p:nvPicPr>
+        <p:blipFill>
+          <a:blip r:embed="rId3"/>
+          <a:stretch>
+            <a:fillRect/>
+          </a:stretch>
+        </p:blipFill>
+        <p:spPr>
+          <a:xfrm>
+            <a:off x="676982" y="4676131"/>
+            <a:ext cx="7043365" cy="2022937"/>
+          </a:xfrm>
+          <a:prstGeom prst="rect">
+            <a:avLst/>
+          </a:prstGeom>
+        </p:spPr>
+      </p:pic>
+      <p:pic>
+        <p:nvPicPr>
+          <p:cNvPr id="5" name="Рисунок 4"/>
+          <p:cNvPicPr>
+            <a:picLocks noChangeAspect="1"/>
+          </p:cNvPicPr>
+          <p:nvPr/>
+        </p:nvPicPr>
+        <p:blipFill rotWithShape="1">
+          <a:blip r:embed="rId4"/>
+          <a:srcRect t="29098" r="36564"/>
+          <a:stretch/>
+        </p:blipFill>
+        <p:spPr>
+          <a:xfrm>
+            <a:off x="7213600" y="198322"/>
+            <a:ext cx="4301418" cy="6147677"/>
+          </a:xfrm>
+          <a:prstGeom prst="rect">
+            <a:avLst/>
+          </a:prstGeom>
+        </p:spPr>
+      </p:pic>
+    </p:spTree>
+    <p:extLst>
+      <p:ext uri="{BB962C8B-B14F-4D97-AF65-F5344CB8AC3E}">
+        <p14:creationId xmlns:p14="http://schemas.microsoft.com/office/powerpoint/2010/main" val="1336180469"/>
+      </p:ext>
+    </p:extLst>
+  </p:cSld>
+  <p:clrMapOvr>
+    <a:masterClrMapping/>
+  </p:clrMapOvr>
+  <p:timing>
+    <p:tnLst>
+      <p:par>
+        <p:cTn id="1" dur="indefinite" restart="never" nodeType="tmRoot"/>
+      </p:par>
+    </p:tnLst>
+  </p:timing>
+</p:sld>
+</file>
+
+<file path=ppt/slides/slide12.xml><?xml version="1.0" encoding="utf-8"?>
+<p:sld xmlns:a="http://schemas.openxmlformats.org/drawingml/2006/main" xmlns:r="http://schemas.openxmlformats.org/officeDocument/2006/relationships" xmlns:p="http://schemas.openxmlformats.org/presentationml/2006/main">
+  <p:cSld>
+    <p:spTree>
+      <p:nvGrpSpPr>
+        <p:cNvPr id="1" name=""/>
+        <p:cNvGrpSpPr/>
+        <p:nvPr/>
+      </p:nvGrpSpPr>
+      <p:grpSpPr>
+        <a:xfrm>
+          <a:off x="0" y="0"/>
+          <a:ext cx="0" cy="0"/>
+          <a:chOff x="0" y="0"/>
+          <a:chExt cx="0" cy="0"/>
+        </a:xfrm>
+      </p:grpSpPr>
+      <p:sp>
+        <p:nvSpPr>
           <p:cNvPr id="2" name="Заголовок 1"/>
           <p:cNvSpPr>
             <a:spLocks noGrp="1"/>
@@ -3322,11 +3457,7 @@
             </a:pPr>
             <a:r>
               <a:rPr lang="ru-RU" dirty="0"/>
-              <a:t>Модульность </a:t>
-            </a:r>
-            <a:r>
-              <a:rPr lang="ru-RU" dirty="0"/>
-              <a:t>в SCSS — это </a:t>
+              <a:t>Модульность в SCSS — это </a:t>
             </a:r>
             <a:r>
               <a:rPr lang="ru-RU" dirty="0" smtClean="0"/>
@@ -3346,11 +3477,7 @@
             </a:r>
             <a:r>
               <a:rPr lang="ru-RU" dirty="0" smtClean="0"/>
-              <a:t>может отвечать за определённый функционал, хранить </a:t>
-            </a:r>
-            <a:r>
-              <a:rPr lang="ru-RU" dirty="0" smtClean="0"/>
-              <a:t>переменные</a:t>
+              <a:t>может отвечать за определённый функционал, хранить переменные</a:t>
             </a:r>
             <a:r>
               <a:rPr lang="en-US" dirty="0" smtClean="0"/>
@@ -3358,11 +3485,7 @@
             </a:r>
             <a:r>
               <a:rPr lang="ru-RU" dirty="0" smtClean="0"/>
-              <a:t> стили для хедера </a:t>
-            </a:r>
-            <a:r>
-              <a:rPr lang="ru-RU" dirty="0" smtClean="0"/>
-              <a:t>и т.д.</a:t>
+              <a:t> стили для хедера и т.д.</a:t>
             </a:r>
           </a:p>
           <a:p>
@@ -3478,7 +3601,7 @@
 </p:sld>
 </file>
 
-<file path=ppt/slides/slide12.xml><?xml version="1.0" encoding="utf-8"?>
+<file path=ppt/slides/slide13.xml><?xml version="1.0" encoding="utf-8"?>
 <p:sld xmlns:a="http://schemas.openxmlformats.org/drawingml/2006/main" xmlns:r="http://schemas.openxmlformats.org/officeDocument/2006/relationships" xmlns:p="http://schemas.openxmlformats.org/presentationml/2006/main">
   <p:cSld>
     <p:spTree>
@@ -3553,11 +3676,7 @@
             </a:r>
             <a:r>
               <a:rPr lang="ru-RU" dirty="0" smtClean="0"/>
-              <a:t> позволяет подключать </a:t>
-            </a:r>
-            <a:r>
-              <a:rPr lang="ru-RU" dirty="0" smtClean="0"/>
-              <a:t>несколько </a:t>
+              <a:t> позволяет подключать несколько </a:t>
             </a:r>
             <a:r>
               <a:rPr lang="en-US" dirty="0" smtClean="0"/>
@@ -3582,11 +3701,7 @@
             </a:pPr>
             <a:r>
               <a:rPr lang="ru-RU" dirty="0" smtClean="0"/>
-              <a:t>Для импорта достаточно указать путь до файла без подчёркивания и расширения</a:t>
-            </a:r>
-            <a:r>
-              <a:rPr lang="ru-RU" dirty="0" smtClean="0"/>
-              <a:t>, препроцессор сам определяет как компилировать стили:</a:t>
+              <a:t>Для импорта достаточно указать путь до файла без подчёркивания и расширения, препроцессор сам определяет как компилировать стили:</a:t>
             </a:r>
           </a:p>
           <a:p>
@@ -3735,7 +3850,7 @@
 </p:sld>
 </file>
 
-<file path=ppt/slides/slide13.xml><?xml version="1.0" encoding="utf-8"?>
+<file path=ppt/slides/slide14.xml><?xml version="1.0" encoding="utf-8"?>
 <p:sld xmlns:a="http://schemas.openxmlformats.org/drawingml/2006/main" xmlns:r="http://schemas.openxmlformats.org/officeDocument/2006/relationships" xmlns:p="http://schemas.openxmlformats.org/presentationml/2006/main">
   <p:cSld>
     <p:spTree>
@@ -3769,11 +3884,7 @@
           <a:p>
             <a:r>
               <a:rPr lang="en-US" dirty="0" smtClean="0"/>
-              <a:t>@</a:t>
-            </a:r>
-            <a:r>
-              <a:rPr lang="en-US" dirty="0" smtClean="0"/>
-              <a:t>import: </a:t>
+              <a:t>@import: </a:t>
             </a:r>
             <a:r>
               <a:rPr lang="ru-RU" dirty="0" smtClean="0"/>
@@ -3895,7 +4006,6 @@
               <a:rPr lang="ru-RU" dirty="0"/>
               <a:t>.</a:t>
             </a:r>
-            <a:endParaRPr lang="ru-RU" dirty="0"/>
           </a:p>
         </p:txBody>
       </p:sp>
@@ -3919,7 +4029,7 @@
 </p:sld>
 </file>
 
-<file path=ppt/slides/slide14.xml><?xml version="1.0" encoding="utf-8"?>
+<file path=ppt/slides/slide15.xml><?xml version="1.0" encoding="utf-8"?>
 <p:sld xmlns:a="http://schemas.openxmlformats.org/drawingml/2006/main" xmlns:r="http://schemas.openxmlformats.org/officeDocument/2006/relationships" xmlns:p="http://schemas.openxmlformats.org/presentationml/2006/main">
   <p:cSld>
     <p:spTree>
@@ -4116,7 +4226,7 @@
 </p:sld>
 </file>
 
-<file path=ppt/slides/slide15.xml><?xml version="1.0" encoding="utf-8"?>
+<file path=ppt/slides/slide16.xml><?xml version="1.0" encoding="utf-8"?>
 <p:sld xmlns:a="http://schemas.openxmlformats.org/drawingml/2006/main" xmlns:r="http://schemas.openxmlformats.org/officeDocument/2006/relationships" xmlns:p="http://schemas.openxmlformats.org/presentationml/2006/main">
   <p:cSld>
     <p:spTree>
@@ -4276,7 +4386,7 @@
 </p:sld>
 </file>
 
-<file path=ppt/slides/slide16.xml><?xml version="1.0" encoding="utf-8"?>
+<file path=ppt/slides/slide17.xml><?xml version="1.0" encoding="utf-8"?>
 <p:sld xmlns:a="http://schemas.openxmlformats.org/drawingml/2006/main" xmlns:r="http://schemas.openxmlformats.org/officeDocument/2006/relationships" xmlns:p="http://schemas.openxmlformats.org/presentationml/2006/main">
   <p:cSld>
     <p:spTree>
@@ -4507,11 +4617,7 @@
             </a:r>
             <a:r>
               <a:rPr lang="ru-RU" dirty="0"/>
-              <a:t>один раз, </a:t>
-            </a:r>
-            <a:r>
-              <a:rPr lang="ru-RU" dirty="0"/>
-              <a:t>даже если он используется в нескольких местах</a:t>
+              <a:t>один раз, даже если он используется в нескольких местах</a:t>
             </a:r>
             <a:r>
               <a:rPr lang="ru-RU" dirty="0" smtClean="0"/>
@@ -4571,7 +4677,7 @@
 </p:sld>
 </file>
 
-<file path=ppt/slides/slide17.xml><?xml version="1.0" encoding="utf-8"?>
+<file path=ppt/slides/slide18.xml><?xml version="1.0" encoding="utf-8"?>
 <p:sld xmlns:a="http://schemas.openxmlformats.org/drawingml/2006/main" xmlns:r="http://schemas.openxmlformats.org/officeDocument/2006/relationships" xmlns:p="http://schemas.openxmlformats.org/presentationml/2006/main">
   <p:cSld>
     <p:spTree>
@@ -4855,8 +4961,17 @@
             </a:r>
             <a:r>
               <a:rPr lang="ru-RU" dirty="0" smtClean="0"/>
-              <a:t> просто объединяет модули в одном месте.</a:t>
-            </a:r>
+              <a:t> просто объединяет модули в одном </a:t>
+            </a:r>
+            <a:r>
+              <a:rPr lang="ru-RU" dirty="0" smtClean="0"/>
+              <a:t>файле</a:t>
+            </a:r>
+            <a:r>
+              <a:rPr lang="ru-RU" dirty="0" smtClean="0"/>
+              <a:t>.</a:t>
+            </a:r>
+            <a:endParaRPr lang="ru-RU" dirty="0" smtClean="0"/>
           </a:p>
           <a:p>
             <a:pPr marL="0" indent="0">
@@ -4907,7 +5022,7 @@
 </p:sld>
 </file>
 
-<file path=ppt/slides/slide18.xml><?xml version="1.0" encoding="utf-8"?>
+<file path=ppt/slides/slide19.xml><?xml version="1.0" encoding="utf-8"?>
 <p:sld xmlns:a="http://schemas.openxmlformats.org/drawingml/2006/main" xmlns:r="http://schemas.openxmlformats.org/officeDocument/2006/relationships" xmlns:p="http://schemas.openxmlformats.org/presentationml/2006/main">
   <p:cSld>
     <p:spTree>
@@ -4974,15 +5089,19 @@
             </a:pPr>
             <a:r>
               <a:rPr lang="ru-RU" dirty="0"/>
-              <a:t>Иногда возникает ситуация, когда несколько элементов на странице используют одинаковую CSS </a:t>
-            </a:r>
-            <a:r>
-              <a:rPr lang="ru-RU" dirty="0" smtClean="0"/>
-              <a:t>код</a:t>
-            </a:r>
-            <a:r>
-              <a:rPr lang="ru-RU" dirty="0" smtClean="0"/>
-              <a:t>.</a:t>
+              <a:t>Иногда возникает ситуация, когда несколько элементов на странице используют </a:t>
+            </a:r>
+            <a:r>
+              <a:rPr lang="ru-RU" dirty="0" smtClean="0"/>
+              <a:t>одинаковый </a:t>
+            </a:r>
+            <a:r>
+              <a:rPr lang="ru-RU" dirty="0"/>
+              <a:t>CSS </a:t>
+            </a:r>
+            <a:r>
+              <a:rPr lang="ru-RU" dirty="0" smtClean="0"/>
+              <a:t>код.</a:t>
             </a:r>
             <a:endParaRPr lang="en-US" dirty="0" smtClean="0"/>
           </a:p>
@@ -5058,7 +5177,7 @@
 </p:sld>
 </file>
 
-<file path=ppt/slides/slide19.xml><?xml version="1.0" encoding="utf-8"?>
+<file path=ppt/slides/slide2.xml><?xml version="1.0" encoding="utf-8"?>
 <p:sld xmlns:a="http://schemas.openxmlformats.org/drawingml/2006/main" xmlns:r="http://schemas.openxmlformats.org/officeDocument/2006/relationships" xmlns:p="http://schemas.openxmlformats.org/presentationml/2006/main">
   <p:cSld>
     <p:spTree>
@@ -5091,12 +5210,309 @@
           <a:lstStyle/>
           <a:p>
             <a:r>
+              <a:rPr lang="ru-RU" dirty="0" smtClean="0"/>
+              <a:t>Что такое препроцессоры?</a:t>
+            </a:r>
+            <a:endParaRPr lang="ru-RU" dirty="0"/>
+          </a:p>
+        </p:txBody>
+      </p:sp>
+      <p:sp>
+        <p:nvSpPr>
+          <p:cNvPr id="3" name="Объект 2"/>
+          <p:cNvSpPr>
+            <a:spLocks noGrp="1"/>
+          </p:cNvSpPr>
+          <p:nvPr>
+            <p:ph idx="1"/>
+          </p:nvPr>
+        </p:nvSpPr>
+        <p:spPr/>
+        <p:txBody>
+          <a:bodyPr>
+            <a:normAutofit/>
+          </a:bodyPr>
+          <a:lstStyle/>
+          <a:p>
+            <a:pPr marL="0" indent="0">
+              <a:buNone/>
+            </a:pPr>
+            <a:r>
+              <a:rPr lang="ru-RU" b="1" dirty="0"/>
+              <a:t>Препроцессоры CSS </a:t>
+            </a:r>
+            <a:r>
+              <a:rPr lang="ru-RU" dirty="0"/>
+              <a:t>— это инструменты, которые расширяют функциональность CSS за счёт введения таких функций, как переменные, </a:t>
+            </a:r>
+            <a:r>
+              <a:rPr lang="ru-RU" dirty="0" smtClean="0"/>
+              <a:t>вложенность</a:t>
+            </a:r>
+            <a:r>
+              <a:rPr lang="en-US" dirty="0" smtClean="0"/>
+              <a:t>, </a:t>
+            </a:r>
+            <a:r>
               <a:rPr lang="ru-RU" dirty="0" err="1" smtClean="0"/>
-              <a:t>П</a:t>
+              <a:t>миксины</a:t>
+            </a:r>
+            <a:r>
+              <a:rPr lang="ru-RU" dirty="0" smtClean="0"/>
+              <a:t> </a:t>
+            </a:r>
+            <a:r>
+              <a:rPr lang="ru-RU" dirty="0" smtClean="0"/>
+              <a:t>и др. </a:t>
+            </a:r>
+            <a:r>
+              <a:rPr lang="ru-RU" dirty="0"/>
+              <a:t>Они повышают удобство обслуживания и организованность таблиц стилей</a:t>
+            </a:r>
+            <a:r>
+              <a:rPr lang="ru-RU" dirty="0" smtClean="0"/>
+              <a:t>.</a:t>
+            </a:r>
+          </a:p>
+          <a:p>
+            <a:pPr marL="0" indent="0">
+              <a:buNone/>
+            </a:pPr>
+            <a:r>
+              <a:rPr lang="ru-RU" dirty="0"/>
+              <a:t>Препроцессоры так называются потому, что принимают данные </a:t>
+            </a:r>
+            <a:r>
+              <a:rPr lang="ru-RU" dirty="0" smtClean="0"/>
+              <a:t>(код </a:t>
+            </a:r>
+            <a:r>
+              <a:rPr lang="ru-RU" dirty="0"/>
+              <a:t>в </a:t>
+            </a:r>
+            <a:r>
+              <a:rPr lang="ru-RU" dirty="0" smtClean="0"/>
+              <a:t>формате </a:t>
+            </a:r>
+            <a:r>
+              <a:rPr lang="ru-RU" dirty="0" err="1"/>
+              <a:t>scss</a:t>
+            </a:r>
+            <a:r>
+              <a:rPr lang="ru-RU" dirty="0"/>
+              <a:t> или </a:t>
+            </a:r>
+            <a:r>
+              <a:rPr lang="ru-RU" dirty="0" err="1"/>
+              <a:t>less</a:t>
+            </a:r>
+            <a:r>
+              <a:rPr lang="ru-RU" dirty="0"/>
+              <a:t>) и потом </a:t>
+            </a:r>
+            <a:r>
+              <a:rPr lang="ru-RU" dirty="0" smtClean="0"/>
+              <a:t>компилируют </a:t>
+            </a:r>
+            <a:r>
+              <a:rPr lang="ru-RU" dirty="0"/>
+              <a:t>их в обычный CSS-код</a:t>
+            </a:r>
+            <a:r>
+              <a:rPr lang="ru-RU" dirty="0" smtClean="0"/>
+              <a:t>.</a:t>
+            </a:r>
+            <a:endParaRPr lang="ru-RU" dirty="0"/>
+          </a:p>
+          <a:p>
+            <a:pPr marL="0" indent="0">
+              <a:buNone/>
+            </a:pPr>
+            <a:r>
+              <a:rPr lang="ru-RU" dirty="0"/>
+              <a:t>Основные препроцессоры — это </a:t>
+            </a:r>
+            <a:r>
+              <a:rPr lang="ru-RU" dirty="0" err="1"/>
+              <a:t>Sass</a:t>
+            </a:r>
+            <a:r>
+              <a:rPr lang="ru-RU" dirty="0"/>
+              <a:t>, </a:t>
+            </a:r>
+            <a:r>
+              <a:rPr lang="ru-RU" dirty="0" err="1"/>
+              <a:t>Less</a:t>
+            </a:r>
+            <a:r>
+              <a:rPr lang="ru-RU" dirty="0"/>
+              <a:t> и </a:t>
             </a:r>
             <a:r>
               <a:rPr lang="ru-RU" dirty="0" err="1" smtClean="0"/>
-              <a:t>лейсхолдеры</a:t>
+              <a:t>Stylus</a:t>
+            </a:r>
+            <a:r>
+              <a:rPr lang="ru-RU" dirty="0"/>
+              <a:t>.</a:t>
+            </a:r>
+          </a:p>
+        </p:txBody>
+      </p:sp>
+    </p:spTree>
+    <p:extLst>
+      <p:ext uri="{BB962C8B-B14F-4D97-AF65-F5344CB8AC3E}">
+        <p14:creationId xmlns:p14="http://schemas.microsoft.com/office/powerpoint/2010/main" val="1360120161"/>
+      </p:ext>
+    </p:extLst>
+  </p:cSld>
+  <p:clrMapOvr>
+    <a:masterClrMapping/>
+  </p:clrMapOvr>
+  <p:timing>
+    <p:tnLst>
+      <p:par>
+        <p:cTn id="1" dur="indefinite" restart="never" nodeType="tmRoot"/>
+      </p:par>
+    </p:tnLst>
+  </p:timing>
+</p:sld>
+</file>
+
+<file path=ppt/slides/slide20.xml><?xml version="1.0" encoding="utf-8"?>
+<p:sld xmlns:a="http://schemas.openxmlformats.org/drawingml/2006/main" xmlns:r="http://schemas.openxmlformats.org/officeDocument/2006/relationships" xmlns:p="http://schemas.openxmlformats.org/presentationml/2006/main">
+  <p:cSld>
+    <p:spTree>
+      <p:nvGrpSpPr>
+        <p:cNvPr id="1" name=""/>
+        <p:cNvGrpSpPr/>
+        <p:nvPr/>
+      </p:nvGrpSpPr>
+      <p:grpSpPr>
+        <a:xfrm>
+          <a:off x="0" y="0"/>
+          <a:ext cx="0" cy="0"/>
+          <a:chOff x="0" y="0"/>
+          <a:chExt cx="0" cy="0"/>
+        </a:xfrm>
+      </p:grpSpPr>
+      <p:sp>
+        <p:nvSpPr>
+          <p:cNvPr id="2" name="Заголовок 1"/>
+          <p:cNvSpPr>
+            <a:spLocks noGrp="1"/>
+          </p:cNvSpPr>
+          <p:nvPr>
+            <p:ph type="title"/>
+          </p:nvPr>
+        </p:nvSpPr>
+        <p:spPr/>
+        <p:txBody>
+          <a:bodyPr/>
+          <a:lstStyle/>
+          <a:p>
+            <a:endParaRPr lang="ru-RU"/>
+          </a:p>
+        </p:txBody>
+      </p:sp>
+      <p:pic>
+        <p:nvPicPr>
+          <p:cNvPr id="4" name="Объект 3"/>
+          <p:cNvPicPr>
+            <a:picLocks noGrp="1" noChangeAspect="1"/>
+          </p:cNvPicPr>
+          <p:nvPr>
+            <p:ph idx="1"/>
+          </p:nvPr>
+        </p:nvPicPr>
+        <p:blipFill>
+          <a:blip r:embed="rId2"/>
+          <a:stretch>
+            <a:fillRect/>
+          </a:stretch>
+        </p:blipFill>
+        <p:spPr>
+          <a:xfrm>
+            <a:off x="838200" y="678392"/>
+            <a:ext cx="5057640" cy="5189008"/>
+          </a:xfrm>
+          <a:prstGeom prst="rect">
+            <a:avLst/>
+          </a:prstGeom>
+        </p:spPr>
+      </p:pic>
+      <p:pic>
+        <p:nvPicPr>
+          <p:cNvPr id="5" name="Рисунок 4"/>
+          <p:cNvPicPr>
+            <a:picLocks noChangeAspect="1"/>
+          </p:cNvPicPr>
+          <p:nvPr/>
+        </p:nvPicPr>
+        <p:blipFill>
+          <a:blip r:embed="rId3"/>
+          <a:stretch>
+            <a:fillRect/>
+          </a:stretch>
+        </p:blipFill>
+        <p:spPr>
+          <a:xfrm>
+            <a:off x="5895840" y="365125"/>
+            <a:ext cx="5550530" cy="5815542"/>
+          </a:xfrm>
+          <a:prstGeom prst="rect">
+            <a:avLst/>
+          </a:prstGeom>
+        </p:spPr>
+      </p:pic>
+    </p:spTree>
+    <p:extLst>
+      <p:ext uri="{BB962C8B-B14F-4D97-AF65-F5344CB8AC3E}">
+        <p14:creationId xmlns:p14="http://schemas.microsoft.com/office/powerpoint/2010/main" val="785143958"/>
+      </p:ext>
+    </p:extLst>
+  </p:cSld>
+  <p:clrMapOvr>
+    <a:masterClrMapping/>
+  </p:clrMapOvr>
+</p:sld>
+</file>
+
+<file path=ppt/slides/slide21.xml><?xml version="1.0" encoding="utf-8"?>
+<p:sld xmlns:a="http://schemas.openxmlformats.org/drawingml/2006/main" xmlns:r="http://schemas.openxmlformats.org/officeDocument/2006/relationships" xmlns:p="http://schemas.openxmlformats.org/presentationml/2006/main">
+  <p:cSld>
+    <p:spTree>
+      <p:nvGrpSpPr>
+        <p:cNvPr id="1" name=""/>
+        <p:cNvGrpSpPr/>
+        <p:nvPr/>
+      </p:nvGrpSpPr>
+      <p:grpSpPr>
+        <a:xfrm>
+          <a:off x="0" y="0"/>
+          <a:ext cx="0" cy="0"/>
+          <a:chOff x="0" y="0"/>
+          <a:chExt cx="0" cy="0"/>
+        </a:xfrm>
+      </p:grpSpPr>
+      <p:sp>
+        <p:nvSpPr>
+          <p:cNvPr id="2" name="Заголовок 1"/>
+          <p:cNvSpPr>
+            <a:spLocks noGrp="1"/>
+          </p:cNvSpPr>
+          <p:nvPr>
+            <p:ph type="title"/>
+          </p:nvPr>
+        </p:nvSpPr>
+        <p:spPr/>
+        <p:txBody>
+          <a:bodyPr/>
+          <a:lstStyle/>
+          <a:p>
+            <a:r>
+              <a:rPr lang="ru-RU" dirty="0" err="1" smtClean="0"/>
+              <a:t>Плейсхолдеры</a:t>
             </a:r>
             <a:r>
               <a:rPr lang="ru-RU" dirty="0" smtClean="0"/>
@@ -5141,11 +5557,7 @@
             </a:pPr>
             <a:r>
               <a:rPr lang="ru-RU" dirty="0" smtClean="0"/>
-              <a:t>Также </a:t>
-            </a:r>
-            <a:r>
-              <a:rPr lang="ru-RU" dirty="0" smtClean="0"/>
-              <a:t>можно создать </a:t>
+              <a:t>Также можно создать </a:t>
             </a:r>
             <a:r>
               <a:rPr lang="ru-RU" dirty="0"/>
@@ -5276,7 +5688,7 @@
 </p:sld>
 </file>
 
-<file path=ppt/slides/slide2.xml><?xml version="1.0" encoding="utf-8"?>
+<file path=ppt/slides/slide22.xml><?xml version="1.0" encoding="utf-8"?>
 <p:sld xmlns:a="http://schemas.openxmlformats.org/drawingml/2006/main" xmlns:r="http://schemas.openxmlformats.org/officeDocument/2006/relationships" xmlns:p="http://schemas.openxmlformats.org/presentationml/2006/main">
   <p:cSld>
     <p:spTree>
@@ -5308,165 +5720,73 @@
           <a:bodyPr/>
           <a:lstStyle/>
           <a:p>
-            <a:r>
-              <a:rPr lang="ru-RU" dirty="0" smtClean="0"/>
-              <a:t>Что такое препроцессоры?</a:t>
-            </a:r>
-            <a:endParaRPr lang="ru-RU" dirty="0"/>
-          </a:p>
-        </p:txBody>
-      </p:sp>
-      <p:sp>
-        <p:nvSpPr>
-          <p:cNvPr id="3" name="Объект 2"/>
-          <p:cNvSpPr>
-            <a:spLocks noGrp="1"/>
-          </p:cNvSpPr>
+            <a:endParaRPr lang="ru-RU"/>
+          </a:p>
+        </p:txBody>
+      </p:sp>
+      <p:pic>
+        <p:nvPicPr>
+          <p:cNvPr id="5" name="Объект 4"/>
+          <p:cNvPicPr>
+            <a:picLocks noGrp="1" noChangeAspect="1"/>
+          </p:cNvPicPr>
           <p:nvPr>
             <p:ph idx="1"/>
           </p:nvPr>
-        </p:nvSpPr>
-        <p:spPr/>
-        <p:txBody>
-          <a:bodyPr>
-            <a:normAutofit/>
-          </a:bodyPr>
-          <a:lstStyle/>
-          <a:p>
-            <a:pPr marL="0" indent="0">
-              <a:buNone/>
-            </a:pPr>
-            <a:r>
-              <a:rPr lang="ru-RU" b="1" dirty="0"/>
-              <a:t>Препроцессоры CSS </a:t>
-            </a:r>
-            <a:r>
-              <a:rPr lang="ru-RU" dirty="0"/>
-              <a:t>— это инструменты, которые расширяют функциональность CSS за счёт введения таких функций, как переменные, вложенность и </a:t>
-            </a:r>
-            <a:r>
-              <a:rPr lang="ru-RU" dirty="0" err="1" smtClean="0"/>
-              <a:t>миксины</a:t>
-            </a:r>
-            <a:r>
-              <a:rPr lang="ru-RU" dirty="0" smtClean="0"/>
-              <a:t> и др. </a:t>
-            </a:r>
-            <a:r>
-              <a:rPr lang="ru-RU" dirty="0"/>
-              <a:t>Они повышают удобство обслуживания и организованность таблиц стилей</a:t>
-            </a:r>
-            <a:r>
-              <a:rPr lang="ru-RU" dirty="0" smtClean="0"/>
-              <a:t>.</a:t>
-            </a:r>
-          </a:p>
-          <a:p>
-            <a:pPr marL="0" indent="0">
-              <a:buNone/>
-            </a:pPr>
-            <a:r>
-              <a:rPr lang="ru-RU" dirty="0"/>
-              <a:t>Препроцессоры так называются потому, что принимают данные </a:t>
-            </a:r>
-            <a:r>
-              <a:rPr lang="ru-RU" dirty="0" smtClean="0"/>
-              <a:t>(код </a:t>
-            </a:r>
-            <a:r>
-              <a:rPr lang="ru-RU" dirty="0"/>
-              <a:t>в </a:t>
-            </a:r>
-            <a:r>
-              <a:rPr lang="ru-RU" dirty="0" smtClean="0"/>
-              <a:t>формате </a:t>
-            </a:r>
-            <a:r>
-              <a:rPr lang="ru-RU" dirty="0" err="1"/>
-              <a:t>scss</a:t>
-            </a:r>
-            <a:r>
-              <a:rPr lang="ru-RU" dirty="0"/>
-              <a:t> или </a:t>
-            </a:r>
-            <a:r>
-              <a:rPr lang="ru-RU" dirty="0" err="1"/>
-              <a:t>less</a:t>
-            </a:r>
-            <a:r>
-              <a:rPr lang="ru-RU" dirty="0"/>
-              <a:t>) и потом </a:t>
-            </a:r>
-            <a:r>
-              <a:rPr lang="ru-RU" dirty="0" smtClean="0"/>
-              <a:t>компилируют </a:t>
-            </a:r>
-            <a:r>
-              <a:rPr lang="ru-RU" dirty="0"/>
-              <a:t>их в обычный CSS-код</a:t>
-            </a:r>
-            <a:r>
-              <a:rPr lang="ru-RU" dirty="0" smtClean="0"/>
-              <a:t>.</a:t>
-            </a:r>
-            <a:endParaRPr lang="ru-RU" dirty="0"/>
-          </a:p>
-          <a:p>
-            <a:pPr marL="0" indent="0">
-              <a:buNone/>
-            </a:pPr>
-            <a:r>
-              <a:rPr lang="ru-RU" dirty="0"/>
-              <a:t>Основные препроцессоры — это </a:t>
-            </a:r>
-            <a:r>
-              <a:rPr lang="ru-RU" dirty="0" err="1"/>
-              <a:t>Sass</a:t>
-            </a:r>
-            <a:r>
-              <a:rPr lang="ru-RU" dirty="0"/>
-              <a:t>, </a:t>
-            </a:r>
-            <a:r>
-              <a:rPr lang="ru-RU" dirty="0" err="1"/>
-              <a:t>Less</a:t>
-            </a:r>
-            <a:r>
-              <a:rPr lang="ru-RU" dirty="0"/>
-              <a:t> и </a:t>
-            </a:r>
-            <a:r>
-              <a:rPr lang="ru-RU" dirty="0" err="1" smtClean="0"/>
-              <a:t>Stylus</a:t>
-            </a:r>
-            <a:r>
-              <a:rPr lang="ru-RU" dirty="0"/>
-              <a:t>.</a:t>
-            </a:r>
-          </a:p>
-        </p:txBody>
-      </p:sp>
+        </p:nvPicPr>
+        <p:blipFill rotWithShape="1">
+          <a:blip r:embed="rId2"/>
+          <a:srcRect r="44568"/>
+          <a:stretch/>
+        </p:blipFill>
+        <p:spPr>
+          <a:xfrm>
+            <a:off x="6906173" y="1027906"/>
+            <a:ext cx="3981960" cy="4965748"/>
+          </a:xfrm>
+          <a:prstGeom prst="rect">
+            <a:avLst/>
+          </a:prstGeom>
+        </p:spPr>
+      </p:pic>
+      <p:pic>
+        <p:nvPicPr>
+          <p:cNvPr id="4" name="Рисунок 3"/>
+          <p:cNvPicPr>
+            <a:picLocks noChangeAspect="1"/>
+          </p:cNvPicPr>
+          <p:nvPr/>
+        </p:nvPicPr>
+        <p:blipFill>
+          <a:blip r:embed="rId3"/>
+          <a:stretch>
+            <a:fillRect/>
+          </a:stretch>
+        </p:blipFill>
+        <p:spPr>
+          <a:xfrm>
+            <a:off x="1233506" y="1027906"/>
+            <a:ext cx="5207000" cy="4965749"/>
+          </a:xfrm>
+          <a:prstGeom prst="rect">
+            <a:avLst/>
+          </a:prstGeom>
+        </p:spPr>
+      </p:pic>
     </p:spTree>
     <p:extLst>
       <p:ext uri="{BB962C8B-B14F-4D97-AF65-F5344CB8AC3E}">
-        <p14:creationId xmlns:p14="http://schemas.microsoft.com/office/powerpoint/2010/main" val="1360120161"/>
+        <p14:creationId xmlns:p14="http://schemas.microsoft.com/office/powerpoint/2010/main" val="670172258"/>
       </p:ext>
     </p:extLst>
   </p:cSld>
   <p:clrMapOvr>
     <a:masterClrMapping/>
   </p:clrMapOvr>
-  <p:timing>
-    <p:tnLst>
-      <p:par>
-        <p:cTn id="1" dur="indefinite" restart="never" nodeType="tmRoot"/>
-      </p:par>
-    </p:tnLst>
-  </p:timing>
 </p:sld>
 </file>
 
-<file path=ppt/slides/slide20.xml><?xml version="1.0" encoding="utf-8"?>
+<file path=ppt/slides/slide23.xml><?xml version="1.0" encoding="utf-8"?>
 <p:sld xmlns:a="http://schemas.openxmlformats.org/drawingml/2006/main" xmlns:r="http://schemas.openxmlformats.org/officeDocument/2006/relationships" xmlns:p="http://schemas.openxmlformats.org/presentationml/2006/main">
   <p:cSld>
     <p:spTree>
@@ -5575,7 +5895,19 @@
           <a:p>
             <a:r>
               <a:rPr lang="ru-RU" dirty="0" smtClean="0"/>
-              <a:t>Встроенные библиотеки, например математика и прочее</a:t>
+              <a:t>Встроенные библиотеки, например </a:t>
+            </a:r>
+            <a:r>
+              <a:rPr lang="en-US" dirty="0" err="1" smtClean="0"/>
+              <a:t>sass:math</a:t>
+            </a:r>
+            <a:r>
+              <a:rPr lang="ru-RU" dirty="0" smtClean="0"/>
+              <a:t> </a:t>
+            </a:r>
+            <a:r>
+              <a:rPr lang="ru-RU" dirty="0" smtClean="0"/>
+              <a:t>и прочее</a:t>
             </a:r>
             <a:endParaRPr lang="en-US" dirty="0" smtClean="0"/>
           </a:p>
@@ -5601,7 +5933,7 @@
 </p:sld>
 </file>
 
-<file path=ppt/slides/slide21.xml><?xml version="1.0" encoding="utf-8"?>
+<file path=ppt/slides/slide24.xml><?xml version="1.0" encoding="utf-8"?>
 <p:sld xmlns:a="http://schemas.openxmlformats.org/drawingml/2006/main" xmlns:r="http://schemas.openxmlformats.org/officeDocument/2006/relationships" xmlns:p="http://schemas.openxmlformats.org/presentationml/2006/main">
   <p:cSld>
     <p:spTree>
@@ -5658,7 +5990,19 @@
           <a:p>
             <a:r>
               <a:rPr lang="en-US" b="1" dirty="0" smtClean="0"/>
-              <a:t>Live Sass Compiler - </a:t>
+              <a:t>Live Sass Compiler </a:t>
+            </a:r>
+            <a:r>
+              <a:rPr lang="en-US" b="1" dirty="0" smtClean="0"/>
+              <a:t>(</a:t>
+            </a:r>
+            <a:r>
+              <a:rPr lang="en-US" dirty="0"/>
+              <a:t>Glenn Marks</a:t>
+            </a:r>
+            <a:r>
+              <a:rPr lang="en-US" b="1" dirty="0" smtClean="0"/>
+              <a:t>) - </a:t>
             </a:r>
             <a:r>
               <a:rPr lang="ru-RU" dirty="0" smtClean="0"/>
@@ -5804,16 +6148,31 @@
               <a:rPr lang="en-US" sz="2800" dirty="0" smtClean="0"/>
               <a:t>…</a:t>
             </a:r>
-            <a:endParaRPr lang="ru-RU" dirty="0" smtClean="0"/>
-          </a:p>
-          <a:p>
-            <a:r>
-              <a:rPr lang="ru-RU" dirty="0" err="1" smtClean="0"/>
+            <a:endParaRPr lang="ru-RU" sz="2800" dirty="0" smtClean="0"/>
+          </a:p>
+          <a:p>
+            <a:pPr lvl="1">
+              <a:buFont typeface="Courier New" panose="02070309020205020404" pitchFamily="49" charset="0"/>
+              <a:buChar char="o"/>
+            </a:pPr>
+            <a:r>
+              <a:rPr lang="en-US" sz="2800" b="1" dirty="0" smtClean="0"/>
+              <a:t>JavaScript API</a:t>
+            </a:r>
+            <a:endParaRPr lang="ru-RU" b="1" dirty="0" smtClean="0"/>
+          </a:p>
+          <a:p>
+            <a:r>
+              <a:rPr lang="ru-RU" b="1" dirty="0" err="1" smtClean="0"/>
               <a:t>Битрикс</a:t>
             </a:r>
             <a:r>
-              <a:rPr lang="ru-RU" dirty="0" smtClean="0"/>
-              <a:t>-модули в </a:t>
+              <a:rPr lang="ru-RU" b="1" dirty="0" smtClean="0"/>
+              <a:t>-модули</a:t>
+            </a:r>
+            <a:r>
+              <a:rPr lang="ru-RU" dirty="0" smtClean="0"/>
+              <a:t> в </a:t>
             </a:r>
             <a:r>
               <a:rPr lang="ru-RU" dirty="0" err="1" smtClean="0"/>
@@ -5836,7 +6195,7 @@
 </p:sld>
 </file>
 
-<file path=ppt/slides/slide22.xml><?xml version="1.0" encoding="utf-8"?>
+<file path=ppt/slides/slide25.xml><?xml version="1.0" encoding="utf-8"?>
 <p:sld xmlns:a="http://schemas.openxmlformats.org/drawingml/2006/main" xmlns:r="http://schemas.openxmlformats.org/officeDocument/2006/relationships" xmlns:p="http://schemas.openxmlformats.org/presentationml/2006/main">
   <p:cSld>
     <p:spTree>
@@ -5869,8 +6228,245 @@
           <a:lstStyle/>
           <a:p>
             <a:r>
-              <a:rPr lang="ru-RU" dirty="0" smtClean="0"/>
-              <a:t>Преимущества и недостатки</a:t>
+              <a:rPr lang="en-US" dirty="0" smtClean="0"/>
+              <a:t>SASS cli (Dart Sass)</a:t>
+            </a:r>
+            <a:endParaRPr lang="ru-RU" dirty="0"/>
+          </a:p>
+        </p:txBody>
+      </p:sp>
+      <p:sp>
+        <p:nvSpPr>
+          <p:cNvPr id="3" name="Объект 2"/>
+          <p:cNvSpPr>
+            <a:spLocks noGrp="1"/>
+          </p:cNvSpPr>
+          <p:nvPr>
+            <p:ph idx="1"/>
+          </p:nvPr>
+        </p:nvSpPr>
+        <p:spPr/>
+        <p:txBody>
+          <a:bodyPr>
+            <a:normAutofit/>
+          </a:bodyPr>
+          <a:lstStyle/>
+          <a:p>
+            <a:pPr marL="0" indent="0">
+              <a:buNone/>
+            </a:pPr>
+            <a:r>
+              <a:rPr lang="en-US" dirty="0" smtClean="0"/>
+              <a:t>Sass cli</a:t>
+            </a:r>
+            <a:r>
+              <a:rPr lang="ru-RU" dirty="0" smtClean="0"/>
+              <a:t> позволяет компилировать стили через командную строку:</a:t>
+            </a:r>
+          </a:p>
+          <a:p>
+            <a:r>
+              <a:rPr lang="en-US" i="1" dirty="0" smtClean="0"/>
+              <a:t>sass </a:t>
+            </a:r>
+            <a:r>
+              <a:rPr lang="en-US" i="1" dirty="0" err="1" smtClean="0"/>
+              <a:t>style.scss:style.css</a:t>
+            </a:r>
+            <a:r>
+              <a:rPr lang="ru-RU" i="1" dirty="0" smtClean="0"/>
+              <a:t> </a:t>
+            </a:r>
+            <a:r>
+              <a:rPr lang="ru-RU" dirty="0" smtClean="0"/>
+              <a:t>– для одного файла</a:t>
+            </a:r>
+            <a:endParaRPr lang="en-US" dirty="0" smtClean="0"/>
+          </a:p>
+          <a:p>
+            <a:r>
+              <a:rPr lang="en-US" i="1" dirty="0"/>
+              <a:t>sass </a:t>
+            </a:r>
+            <a:r>
+              <a:rPr lang="en-US" i="1" dirty="0" err="1" smtClean="0"/>
+              <a:t>themes:public</a:t>
+            </a:r>
+            <a:r>
+              <a:rPr lang="en-US" i="1" dirty="0" smtClean="0"/>
+              <a:t>/</a:t>
+            </a:r>
+            <a:r>
+              <a:rPr lang="en-US" i="1" dirty="0" err="1" smtClean="0"/>
+              <a:t>css</a:t>
+            </a:r>
+            <a:r>
+              <a:rPr lang="ru-RU" i="1" dirty="0" smtClean="0"/>
+              <a:t> </a:t>
+            </a:r>
+            <a:r>
+              <a:rPr lang="ru-RU" dirty="0" smtClean="0"/>
+              <a:t>– из папки с файлами в другую папку</a:t>
+            </a:r>
+            <a:endParaRPr lang="en-US" dirty="0" smtClean="0"/>
+          </a:p>
+          <a:p>
+            <a:pPr marL="0" indent="0">
+              <a:buNone/>
+            </a:pPr>
+            <a:r>
+              <a:rPr lang="ru-RU" dirty="0" smtClean="0"/>
+              <a:t>Флаги:</a:t>
+            </a:r>
+          </a:p>
+          <a:p>
+            <a:r>
+              <a:rPr lang="en-US" dirty="0"/>
+              <a:t>--</a:t>
+            </a:r>
+            <a:r>
+              <a:rPr lang="en-US" dirty="0" smtClean="0"/>
+              <a:t>style</a:t>
+            </a:r>
+            <a:r>
+              <a:rPr lang="ru-RU" dirty="0" smtClean="0"/>
+              <a:t>:</a:t>
+            </a:r>
+          </a:p>
+          <a:p>
+            <a:pPr lvl="1"/>
+            <a:r>
+              <a:rPr lang="en-US" dirty="0"/>
+              <a:t>--</a:t>
+            </a:r>
+            <a:r>
+              <a:rPr lang="en-US" dirty="0" smtClean="0"/>
+              <a:t>style=expanded</a:t>
+            </a:r>
+            <a:r>
+              <a:rPr lang="ru-RU" dirty="0" smtClean="0"/>
+              <a:t> – компилирует простой </a:t>
+            </a:r>
+            <a:r>
+              <a:rPr lang="en-US" dirty="0" err="1" smtClean="0"/>
+              <a:t>css</a:t>
+            </a:r>
+            <a:endParaRPr lang="ru-RU" dirty="0" smtClean="0"/>
+          </a:p>
+          <a:p>
+            <a:pPr lvl="1"/>
+            <a:r>
+              <a:rPr lang="en-US" dirty="0"/>
+              <a:t>--style=compressed</a:t>
+            </a:r>
+            <a:r>
+              <a:rPr lang="ru-RU" dirty="0" smtClean="0"/>
+              <a:t> </a:t>
+            </a:r>
+            <a:r>
+              <a:rPr lang="en-US" dirty="0" smtClean="0"/>
+              <a:t>– </a:t>
+            </a:r>
+            <a:r>
+              <a:rPr lang="ru-RU" dirty="0" smtClean="0"/>
+              <a:t>компилирует </a:t>
+            </a:r>
+            <a:r>
+              <a:rPr lang="ru-RU" dirty="0" err="1" smtClean="0"/>
+              <a:t>минифированный</a:t>
+            </a:r>
+            <a:r>
+              <a:rPr lang="ru-RU" dirty="0" smtClean="0"/>
+              <a:t> </a:t>
+            </a:r>
+            <a:r>
+              <a:rPr lang="en-US" dirty="0" err="1" smtClean="0"/>
+              <a:t>css</a:t>
+            </a:r>
+            <a:endParaRPr lang="ru-RU" dirty="0" smtClean="0"/>
+          </a:p>
+          <a:p>
+            <a:r>
+              <a:rPr lang="en-US" dirty="0"/>
+              <a:t>--</a:t>
+            </a:r>
+            <a:r>
+              <a:rPr lang="en-US" dirty="0" smtClean="0"/>
+              <a:t>update</a:t>
+            </a:r>
+            <a:r>
+              <a:rPr lang="ru-RU" dirty="0" smtClean="0"/>
+              <a:t> – компилирует не все файлы, а только изменённые</a:t>
+            </a:r>
+          </a:p>
+          <a:p>
+            <a:r>
+              <a:rPr lang="en-US" dirty="0"/>
+              <a:t>--</a:t>
+            </a:r>
+            <a:r>
+              <a:rPr lang="en-US" dirty="0" smtClean="0"/>
+              <a:t>watch</a:t>
+            </a:r>
+            <a:r>
+              <a:rPr lang="ru-RU" dirty="0" smtClean="0"/>
+              <a:t> – ведёт отслеживание изменений, уведомляет в консоли</a:t>
+            </a:r>
+          </a:p>
+        </p:txBody>
+      </p:sp>
+    </p:spTree>
+    <p:extLst>
+      <p:ext uri="{BB962C8B-B14F-4D97-AF65-F5344CB8AC3E}">
+        <p14:creationId xmlns:p14="http://schemas.microsoft.com/office/powerpoint/2010/main" val="3050528721"/>
+      </p:ext>
+    </p:extLst>
+  </p:cSld>
+  <p:clrMapOvr>
+    <a:masterClrMapping/>
+  </p:clrMapOvr>
+</p:sld>
+</file>
+
+<file path=ppt/slides/slide26.xml><?xml version="1.0" encoding="utf-8"?>
+<p:sld xmlns:a="http://schemas.openxmlformats.org/drawingml/2006/main" xmlns:r="http://schemas.openxmlformats.org/officeDocument/2006/relationships" xmlns:p="http://schemas.openxmlformats.org/presentationml/2006/main">
+  <p:cSld>
+    <p:spTree>
+      <p:nvGrpSpPr>
+        <p:cNvPr id="1" name=""/>
+        <p:cNvGrpSpPr/>
+        <p:nvPr/>
+      </p:nvGrpSpPr>
+      <p:grpSpPr>
+        <a:xfrm>
+          <a:off x="0" y="0"/>
+          <a:ext cx="0" cy="0"/>
+          <a:chOff x="0" y="0"/>
+          <a:chExt cx="0" cy="0"/>
+        </a:xfrm>
+      </p:grpSpPr>
+      <p:sp>
+        <p:nvSpPr>
+          <p:cNvPr id="2" name="Заголовок 1"/>
+          <p:cNvSpPr>
+            <a:spLocks noGrp="1"/>
+          </p:cNvSpPr>
+          <p:nvPr>
+            <p:ph type="title"/>
+          </p:nvPr>
+        </p:nvSpPr>
+        <p:spPr/>
+        <p:txBody>
+          <a:bodyPr/>
+          <a:lstStyle/>
+          <a:p>
+            <a:r>
+              <a:rPr lang="en-US" dirty="0"/>
+              <a:t>Live Sass </a:t>
+            </a:r>
+            <a:r>
+              <a:rPr lang="en-US" dirty="0" smtClean="0"/>
+              <a:t>Compiler (VSCODE)</a:t>
             </a:r>
             <a:endParaRPr lang="ru-RU" dirty="0"/>
           </a:p>
@@ -5889,232 +6485,478 @@
         <p:spPr>
           <a:xfrm>
             <a:off x="838200" y="1825625"/>
-            <a:ext cx="10515600" cy="4444546"/>
+            <a:ext cx="10515600" cy="1544107"/>
           </a:xfrm>
         </p:spPr>
         <p:txBody>
           <a:bodyPr>
-            <a:normAutofit fontScale="55000" lnSpcReduction="20000"/>
+            <a:normAutofit fontScale="92500" lnSpcReduction="10000"/>
           </a:bodyPr>
           <a:lstStyle/>
           <a:p>
-            <a:pPr marL="0" indent="0" fontAlgn="base">
+            <a:pPr marL="0" indent="0">
               <a:buNone/>
             </a:pPr>
             <a:r>
-              <a:rPr lang="ru-RU" b="1" dirty="0"/>
-              <a:t>Преимущества:</a:t>
-            </a:r>
-          </a:p>
-          <a:p>
-            <a:pPr fontAlgn="base"/>
-            <a:r>
-              <a:rPr lang="ru-RU" b="1" dirty="0"/>
-              <a:t>Упрощение рабочего процесса</a:t>
-            </a:r>
-            <a:r>
-              <a:rPr lang="ru-RU" dirty="0"/>
-              <a:t>: </a:t>
-            </a:r>
-            <a:r>
-              <a:rPr lang="ru-RU" dirty="0" smtClean="0"/>
-              <a:t>Использование переменных, вложенности, </a:t>
-            </a:r>
-            <a:r>
-              <a:rPr lang="ru-RU" dirty="0" err="1"/>
-              <a:t>миксины</a:t>
-            </a:r>
-            <a:r>
-              <a:rPr lang="ru-RU" dirty="0"/>
-              <a:t>, что делает код более организованным и легким для понимания.</a:t>
-            </a:r>
-          </a:p>
-          <a:p>
-            <a:pPr fontAlgn="base"/>
-            <a:r>
-              <a:rPr lang="ru-RU" b="1" dirty="0"/>
-              <a:t>Снижение повторяющегося кода</a:t>
-            </a:r>
-            <a:r>
-              <a:rPr lang="ru-RU" dirty="0"/>
-              <a:t>: Благодаря возможности создания функций и </a:t>
-            </a:r>
-            <a:r>
-              <a:rPr lang="ru-RU" dirty="0" err="1"/>
-              <a:t>миксинов</a:t>
-            </a:r>
-            <a:r>
-              <a:rPr lang="ru-RU" dirty="0"/>
-              <a:t>, можно избежать дублирования кода, что упрощает его поддержку.</a:t>
-            </a:r>
-          </a:p>
-          <a:p>
-            <a:pPr fontAlgn="base"/>
-            <a:r>
-              <a:rPr lang="ru-RU" b="1" dirty="0"/>
-              <a:t>Поддержка модульности</a:t>
-            </a:r>
-            <a:r>
-              <a:rPr lang="ru-RU" dirty="0"/>
-              <a:t>: </a:t>
-            </a:r>
-            <a:r>
-              <a:rPr lang="ru-RU" dirty="0" err="1"/>
-              <a:t>Sass</a:t>
-            </a:r>
-            <a:r>
-              <a:rPr lang="ru-RU" dirty="0"/>
-              <a:t>/SCSS позволяет разбивать стили на </a:t>
-            </a:r>
-            <a:r>
-              <a:rPr lang="ru-RU" dirty="0" smtClean="0"/>
-              <a:t>модули, что подойдёт для больших проектов.</a:t>
-            </a:r>
-            <a:endParaRPr lang="ru-RU" dirty="0"/>
-          </a:p>
-          <a:p>
-            <a:pPr fontAlgn="base"/>
-            <a:r>
-              <a:rPr lang="ru-RU" b="1" dirty="0"/>
-              <a:t>Расширенные возможности</a:t>
-            </a:r>
-            <a:r>
-              <a:rPr lang="ru-RU" dirty="0"/>
-              <a:t>: </a:t>
-            </a:r>
-            <a:r>
-              <a:rPr lang="ru-RU" dirty="0" err="1"/>
-              <a:t>Sass</a:t>
-            </a:r>
-            <a:r>
-              <a:rPr lang="ru-RU" dirty="0"/>
-              <a:t>/SCSS предлагает множество функций, таких как циклы, условия и математические </a:t>
-            </a:r>
-            <a:r>
-              <a:rPr lang="ru-RU" dirty="0" smtClean="0"/>
-              <a:t>операции.</a:t>
-            </a:r>
-            <a:endParaRPr lang="ru-RU" dirty="0"/>
-          </a:p>
-          <a:p>
-            <a:pPr marL="0" indent="0" fontAlgn="base">
+              <a:rPr lang="ru-RU" dirty="0" smtClean="0"/>
+              <a:t>Самый быстрый способ начать компиляцию – это установить расширение и внести пару настроек </a:t>
+            </a:r>
+            <a:r>
+              <a:rPr lang="en-US" dirty="0" smtClean="0"/>
+              <a:t>JSON</a:t>
+            </a:r>
+            <a:r>
+              <a:rPr lang="ru-RU" dirty="0" smtClean="0"/>
+              <a:t>.</a:t>
+            </a:r>
+          </a:p>
+          <a:p>
+            <a:pPr marL="0" indent="0">
               <a:buNone/>
             </a:pPr>
             <a:r>
-              <a:rPr lang="ru-RU" b="1" dirty="0" smtClean="0"/>
-              <a:t>Недостатки</a:t>
-            </a:r>
-            <a:r>
-              <a:rPr lang="ru-RU" b="1" dirty="0"/>
-              <a:t>:</a:t>
-            </a:r>
-          </a:p>
-          <a:p>
-            <a:pPr fontAlgn="base"/>
-            <a:r>
-              <a:rPr lang="ru-RU" b="1" dirty="0"/>
-              <a:t>Необходимость изучения нового синтаксиса</a:t>
-            </a:r>
-            <a:r>
-              <a:rPr lang="ru-RU" dirty="0"/>
-              <a:t>: Для работы с </a:t>
-            </a:r>
-            <a:r>
-              <a:rPr lang="ru-RU" dirty="0" err="1"/>
-              <a:t>Sass</a:t>
-            </a:r>
-            <a:r>
-              <a:rPr lang="ru-RU" dirty="0"/>
-              <a:t>/SCSS требуется время на изучение его особенностей и синтаксиса.</a:t>
-            </a:r>
-          </a:p>
-          <a:p>
-            <a:pPr fontAlgn="base"/>
-            <a:r>
-              <a:rPr lang="ru-RU" b="1" dirty="0"/>
-              <a:t>Зависимость от компиляции</a:t>
-            </a:r>
-            <a:r>
-              <a:rPr lang="ru-RU" dirty="0"/>
-              <a:t>: </a:t>
-            </a:r>
-            <a:r>
-              <a:rPr lang="ru-RU" dirty="0" err="1"/>
-              <a:t>Sass</a:t>
-            </a:r>
-            <a:r>
-              <a:rPr lang="ru-RU" dirty="0"/>
-              <a:t>/SCSS необходимо компилировать в CSS, что добавляет дополнительный шаг в рабочий процесс.</a:t>
-            </a:r>
-          </a:p>
-          <a:p>
-            <a:pPr fontAlgn="base"/>
-            <a:r>
-              <a:rPr lang="ru-RU" b="1" dirty="0"/>
-              <a:t>Потенциальная сложность</a:t>
-            </a:r>
-            <a:r>
-              <a:rPr lang="ru-RU" dirty="0"/>
-              <a:t>: </a:t>
-            </a:r>
-            <a:r>
-              <a:rPr lang="ru-RU" dirty="0" err="1" smtClean="0"/>
-              <a:t>Sass</a:t>
-            </a:r>
-            <a:r>
-              <a:rPr lang="ru-RU" dirty="0" smtClean="0"/>
-              <a:t>/SCSS </a:t>
-            </a:r>
-            <a:r>
-              <a:rPr lang="ru-RU" dirty="0"/>
-              <a:t>код может стать сложным и трудным для понимания.</a:t>
-            </a:r>
-          </a:p>
-          <a:p>
-            <a:r>
-              <a:rPr lang="ru-RU" b="1" dirty="0" smtClean="0"/>
-              <a:t>Нет обратной совместимости </a:t>
-            </a:r>
-            <a:r>
-              <a:rPr lang="en-US" b="1" dirty="0" smtClean="0"/>
-              <a:t>CSS</a:t>
-            </a:r>
-            <a:r>
-              <a:rPr lang="ru-RU" b="1" dirty="0" smtClean="0"/>
-              <a:t> к </a:t>
-            </a:r>
-            <a:r>
-              <a:rPr lang="en-US" b="1" dirty="0" smtClean="0"/>
-              <a:t>SCSS: </a:t>
-            </a:r>
-            <a:r>
-              <a:rPr lang="ru-RU" dirty="0" smtClean="0"/>
-              <a:t>На сайте может быть очень сильно изменён</a:t>
-            </a:r>
-            <a:r>
               <a:rPr lang="en-US" dirty="0" smtClean="0"/>
-              <a:t> </a:t>
-            </a:r>
-            <a:r>
-              <a:rPr lang="ru-RU" dirty="0" smtClean="0"/>
-              <a:t>скомпилированный </a:t>
+              <a:t>NPM </a:t>
+            </a:r>
+            <a:r>
+              <a:rPr lang="ru-RU" dirty="0" smtClean="0"/>
+              <a:t>не требуется, чтобы начать отслеживание нужно нажать «</a:t>
             </a:r>
             <a:r>
               <a:rPr lang="en-US" dirty="0" smtClean="0"/>
-              <a:t>CSS</a:t>
-            </a:r>
-            <a:r>
-              <a:rPr lang="ru-RU" dirty="0" smtClean="0"/>
-              <a:t>, что приводит к неактуальности препроцессора.</a:t>
-            </a:r>
-            <a:endParaRPr lang="ru-RU" b="1" dirty="0"/>
-          </a:p>
-        </p:txBody>
-      </p:sp>
+              <a:t>Watch Sass</a:t>
+            </a:r>
+            <a:r>
+              <a:rPr lang="ru-RU" dirty="0" smtClean="0"/>
+              <a:t>» в правом нижнем углу</a:t>
+            </a:r>
+            <a:endParaRPr lang="ru-RU" dirty="0"/>
+          </a:p>
+        </p:txBody>
+      </p:sp>
+      <p:pic>
+        <p:nvPicPr>
+          <p:cNvPr id="5" name="Рисунок 4"/>
+          <p:cNvPicPr>
+            <a:picLocks noChangeAspect="1"/>
+          </p:cNvPicPr>
+          <p:nvPr/>
+        </p:nvPicPr>
+        <p:blipFill>
+          <a:blip r:embed="rId2"/>
+          <a:stretch>
+            <a:fillRect/>
+          </a:stretch>
+        </p:blipFill>
+        <p:spPr>
+          <a:xfrm>
+            <a:off x="838200" y="3545730"/>
+            <a:ext cx="7365232" cy="2959607"/>
+          </a:xfrm>
+          <a:prstGeom prst="rect">
+            <a:avLst/>
+          </a:prstGeom>
+        </p:spPr>
+      </p:pic>
+      <p:pic>
+        <p:nvPicPr>
+          <p:cNvPr id="9" name="Рисунок 8"/>
+          <p:cNvPicPr>
+            <a:picLocks noChangeAspect="1"/>
+          </p:cNvPicPr>
+          <p:nvPr/>
+        </p:nvPicPr>
+        <p:blipFill rotWithShape="1">
+          <a:blip r:embed="rId3"/>
+          <a:srcRect l="46473" t="40278" r="27834" b="3780"/>
+          <a:stretch/>
+        </p:blipFill>
+        <p:spPr>
+          <a:xfrm>
+            <a:off x="8454813" y="4348199"/>
+            <a:ext cx="2898987" cy="1354667"/>
+          </a:xfrm>
+          <a:prstGeom prst="rect">
+            <a:avLst/>
+          </a:prstGeom>
+        </p:spPr>
+      </p:pic>
     </p:spTree>
     <p:extLst>
       <p:ext uri="{BB962C8B-B14F-4D97-AF65-F5344CB8AC3E}">
-        <p14:creationId xmlns:p14="http://schemas.microsoft.com/office/powerpoint/2010/main" val="4009864047"/>
+        <p14:creationId xmlns:p14="http://schemas.microsoft.com/office/powerpoint/2010/main" val="2966845638"/>
+      </p:ext>
+    </p:extLst>
+  </p:cSld>
+  <p:clrMapOvr>
+    <a:masterClrMapping/>
+  </p:clrMapOvr>
+</p:sld>
+</file>
+
+<file path=ppt/slides/slide27.xml><?xml version="1.0" encoding="utf-8"?>
+<p:sld xmlns:a="http://schemas.openxmlformats.org/drawingml/2006/main" xmlns:r="http://schemas.openxmlformats.org/officeDocument/2006/relationships" xmlns:p="http://schemas.openxmlformats.org/presentationml/2006/main">
+  <p:cSld>
+    <p:spTree>
+      <p:nvGrpSpPr>
+        <p:cNvPr id="1" name=""/>
+        <p:cNvGrpSpPr/>
+        <p:nvPr/>
+      </p:nvGrpSpPr>
+      <p:grpSpPr>
+        <a:xfrm>
+          <a:off x="0" y="0"/>
+          <a:ext cx="0" cy="0"/>
+          <a:chOff x="0" y="0"/>
+          <a:chExt cx="0" cy="0"/>
+        </a:xfrm>
+      </p:grpSpPr>
+      <p:sp>
+        <p:nvSpPr>
+          <p:cNvPr id="10" name="Заголовок 9"/>
+          <p:cNvSpPr>
+            <a:spLocks noGrp="1"/>
+          </p:cNvSpPr>
+          <p:nvPr>
+            <p:ph type="title"/>
+          </p:nvPr>
+        </p:nvSpPr>
+        <p:spPr/>
+        <p:txBody>
+          <a:bodyPr/>
+          <a:lstStyle/>
+          <a:p>
+            <a:endParaRPr lang="ru-RU"/>
+          </a:p>
+        </p:txBody>
+      </p:sp>
+      <p:pic>
+        <p:nvPicPr>
+          <p:cNvPr id="6" name="Рисунок 5"/>
+          <p:cNvPicPr>
+            <a:picLocks noChangeAspect="1"/>
+          </p:cNvPicPr>
+          <p:nvPr/>
+        </p:nvPicPr>
+        <p:blipFill rotWithShape="1">
+          <a:blip r:embed="rId2"/>
+          <a:srcRect l="27281" t="36155"/>
+          <a:stretch/>
+        </p:blipFill>
+        <p:spPr>
+          <a:xfrm>
+            <a:off x="838200" y="3804399"/>
+            <a:ext cx="7465575" cy="1831975"/>
+          </a:xfrm>
+          <a:prstGeom prst="rect">
+            <a:avLst/>
+          </a:prstGeom>
+        </p:spPr>
+      </p:pic>
+      <p:pic>
+        <p:nvPicPr>
+          <p:cNvPr id="9" name="Рисунок 8"/>
+          <p:cNvPicPr>
+            <a:picLocks noChangeAspect="1"/>
+          </p:cNvPicPr>
+          <p:nvPr/>
+        </p:nvPicPr>
+        <p:blipFill>
+          <a:blip r:embed="rId3"/>
+          <a:stretch>
+            <a:fillRect/>
+          </a:stretch>
+        </p:blipFill>
+        <p:spPr>
+          <a:xfrm>
+            <a:off x="828688" y="1451930"/>
+            <a:ext cx="7107053" cy="1424409"/>
+          </a:xfrm>
+          <a:prstGeom prst="rect">
+            <a:avLst/>
+          </a:prstGeom>
+        </p:spPr>
+      </p:pic>
+      <p:pic>
+        <p:nvPicPr>
+          <p:cNvPr id="7" name="Рисунок 6"/>
+          <p:cNvPicPr>
+            <a:picLocks noChangeAspect="1"/>
+          </p:cNvPicPr>
+          <p:nvPr/>
+        </p:nvPicPr>
+        <p:blipFill>
+          <a:blip r:embed="rId4"/>
+          <a:stretch>
+            <a:fillRect/>
+          </a:stretch>
+        </p:blipFill>
+        <p:spPr>
+          <a:xfrm>
+            <a:off x="6185668" y="365125"/>
+            <a:ext cx="5439066" cy="5898530"/>
+          </a:xfrm>
+          <a:prstGeom prst="rect">
+            <a:avLst/>
+          </a:prstGeom>
+        </p:spPr>
+      </p:pic>
+    </p:spTree>
+    <p:extLst>
+      <p:ext uri="{BB962C8B-B14F-4D97-AF65-F5344CB8AC3E}">
+        <p14:creationId xmlns:p14="http://schemas.microsoft.com/office/powerpoint/2010/main" val="1098401074"/>
+      </p:ext>
+    </p:extLst>
+  </p:cSld>
+  <p:clrMapOvr>
+    <a:masterClrMapping/>
+  </p:clrMapOvr>
+</p:sld>
+</file>
+
+<file path=ppt/slides/slide28.xml><?xml version="1.0" encoding="utf-8"?>
+<p:sld xmlns:a="http://schemas.openxmlformats.org/drawingml/2006/main" xmlns:r="http://schemas.openxmlformats.org/officeDocument/2006/relationships" xmlns:p="http://schemas.openxmlformats.org/presentationml/2006/main">
+  <p:cSld>
+    <p:spTree>
+      <p:nvGrpSpPr>
+        <p:cNvPr id="1" name=""/>
+        <p:cNvGrpSpPr/>
+        <p:nvPr/>
+      </p:nvGrpSpPr>
+      <p:grpSpPr>
+        <a:xfrm>
+          <a:off x="0" y="0"/>
+          <a:ext cx="0" cy="0"/>
+          <a:chOff x="0" y="0"/>
+          <a:chExt cx="0" cy="0"/>
+        </a:xfrm>
+      </p:grpSpPr>
+      <p:sp>
+        <p:nvSpPr>
+          <p:cNvPr id="2" name="Заголовок 1"/>
+          <p:cNvSpPr>
+            <a:spLocks noGrp="1"/>
+          </p:cNvSpPr>
+          <p:nvPr>
+            <p:ph type="title"/>
+          </p:nvPr>
+        </p:nvSpPr>
+        <p:spPr/>
+        <p:txBody>
+          <a:bodyPr/>
+          <a:lstStyle/>
+          <a:p>
+            <a:r>
+              <a:rPr lang="en-US" dirty="0" smtClean="0"/>
+              <a:t>File Watchers (</a:t>
+            </a:r>
+            <a:r>
+              <a:rPr lang="en-US" dirty="0" err="1" smtClean="0"/>
+              <a:t>PHPStorm</a:t>
+            </a:r>
+            <a:r>
+              <a:rPr lang="en-US" dirty="0" smtClean="0"/>
+              <a:t>)</a:t>
+            </a:r>
+            <a:endParaRPr lang="ru-RU" dirty="0"/>
+          </a:p>
+        </p:txBody>
+      </p:sp>
+      <p:sp>
+        <p:nvSpPr>
+          <p:cNvPr id="3" name="Объект 2"/>
+          <p:cNvSpPr>
+            <a:spLocks noGrp="1"/>
+          </p:cNvSpPr>
+          <p:nvPr>
+            <p:ph idx="1"/>
+          </p:nvPr>
+        </p:nvSpPr>
+        <p:spPr>
+          <a:xfrm>
+            <a:off x="838200" y="1825625"/>
+            <a:ext cx="4800600" cy="4351338"/>
+          </a:xfrm>
+        </p:spPr>
+        <p:txBody>
+          <a:bodyPr>
+            <a:normAutofit/>
+          </a:bodyPr>
+          <a:lstStyle/>
+          <a:p>
+            <a:pPr marL="0" indent="0">
+              <a:buNone/>
+            </a:pPr>
+            <a:r>
+              <a:rPr lang="ru-RU" dirty="0" smtClean="0"/>
+              <a:t>В </a:t>
+            </a:r>
+            <a:r>
+              <a:rPr lang="en-US" dirty="0" err="1" smtClean="0"/>
+              <a:t>PHPStorm</a:t>
+            </a:r>
+            <a:r>
+              <a:rPr lang="en-US" dirty="0" smtClean="0"/>
+              <a:t> </a:t>
+            </a:r>
+            <a:r>
+              <a:rPr lang="ru-RU" dirty="0" smtClean="0"/>
+              <a:t>(и не только) есть утилита, которая работает с компилируемыми файлами с помощью </a:t>
+            </a:r>
+            <a:r>
+              <a:rPr lang="en-US" dirty="0" err="1" smtClean="0"/>
+              <a:t>npm</a:t>
+            </a:r>
+            <a:r>
+              <a:rPr lang="ru-RU" dirty="0" smtClean="0"/>
+              <a:t>.</a:t>
+            </a:r>
+          </a:p>
+          <a:p>
+            <a:pPr marL="0" indent="0">
+              <a:buNone/>
+            </a:pPr>
+            <a:r>
+              <a:rPr lang="en-US" dirty="0" smtClean="0"/>
+              <a:t>Watcher </a:t>
+            </a:r>
+            <a:r>
+              <a:rPr lang="ru-RU" dirty="0" smtClean="0"/>
+              <a:t>добавляется через кнопку +.</a:t>
+            </a:r>
+          </a:p>
+          <a:p>
+            <a:pPr marL="0" indent="0">
+              <a:buNone/>
+            </a:pPr>
+            <a:r>
+              <a:rPr lang="ru-RU" dirty="0" smtClean="0"/>
+              <a:t>Возможен Импорт/Экспорт настроек.</a:t>
+            </a:r>
+            <a:endParaRPr lang="ru-RU" dirty="0"/>
+          </a:p>
+        </p:txBody>
+      </p:sp>
+      <p:pic>
+        <p:nvPicPr>
+          <p:cNvPr id="4" name="Рисунок 3"/>
+          <p:cNvPicPr>
+            <a:picLocks noChangeAspect="1"/>
+          </p:cNvPicPr>
+          <p:nvPr/>
+        </p:nvPicPr>
+        <p:blipFill>
+          <a:blip r:embed="rId2"/>
+          <a:stretch>
+            <a:fillRect/>
+          </a:stretch>
+        </p:blipFill>
+        <p:spPr>
+          <a:xfrm>
+            <a:off x="5850394" y="1690688"/>
+            <a:ext cx="5503406" cy="4486275"/>
+          </a:xfrm>
+          <a:prstGeom prst="rect">
+            <a:avLst/>
+          </a:prstGeom>
+        </p:spPr>
+      </p:pic>
+    </p:spTree>
+    <p:extLst>
+      <p:ext uri="{BB962C8B-B14F-4D97-AF65-F5344CB8AC3E}">
+        <p14:creationId xmlns:p14="http://schemas.microsoft.com/office/powerpoint/2010/main" val="302367816"/>
+      </p:ext>
+    </p:extLst>
+  </p:cSld>
+  <p:clrMapOvr>
+    <a:masterClrMapping/>
+  </p:clrMapOvr>
+</p:sld>
+</file>
+
+<file path=ppt/slides/slide29.xml><?xml version="1.0" encoding="utf-8"?>
+<p:sld xmlns:a="http://schemas.openxmlformats.org/drawingml/2006/main" xmlns:r="http://schemas.openxmlformats.org/officeDocument/2006/relationships" xmlns:p="http://schemas.openxmlformats.org/presentationml/2006/main">
+  <p:cSld>
+    <p:spTree>
+      <p:nvGrpSpPr>
+        <p:cNvPr id="1" name=""/>
+        <p:cNvGrpSpPr/>
+        <p:nvPr/>
+      </p:nvGrpSpPr>
+      <p:grpSpPr>
+        <a:xfrm>
+          <a:off x="0" y="0"/>
+          <a:ext cx="0" cy="0"/>
+          <a:chOff x="0" y="0"/>
+          <a:chExt cx="0" cy="0"/>
+        </a:xfrm>
+      </p:grpSpPr>
+      <p:sp>
+        <p:nvSpPr>
+          <p:cNvPr id="2" name="Заголовок 1"/>
+          <p:cNvSpPr>
+            <a:spLocks noGrp="1"/>
+          </p:cNvSpPr>
+          <p:nvPr>
+            <p:ph type="title"/>
+          </p:nvPr>
+        </p:nvSpPr>
+        <p:spPr/>
+        <p:txBody>
+          <a:bodyPr/>
+          <a:lstStyle/>
+          <a:p>
+            <a:endParaRPr lang="ru-RU" dirty="0"/>
+          </a:p>
+        </p:txBody>
+      </p:sp>
+      <p:sp>
+        <p:nvSpPr>
+          <p:cNvPr id="3" name="Объект 2"/>
+          <p:cNvSpPr>
+            <a:spLocks noGrp="1"/>
+          </p:cNvSpPr>
+          <p:nvPr>
+            <p:ph idx="1"/>
+          </p:nvPr>
+        </p:nvSpPr>
+        <p:spPr/>
+        <p:txBody>
+          <a:bodyPr/>
+          <a:lstStyle/>
+          <a:p>
+            <a:endParaRPr lang="ru-RU" dirty="0"/>
+          </a:p>
+        </p:txBody>
+      </p:sp>
+      <p:pic>
+        <p:nvPicPr>
+          <p:cNvPr id="5" name="Рисунок 4"/>
+          <p:cNvPicPr>
+            <a:picLocks noChangeAspect="1"/>
+          </p:cNvPicPr>
+          <p:nvPr/>
+        </p:nvPicPr>
+        <p:blipFill>
+          <a:blip r:embed="rId2"/>
+          <a:stretch>
+            <a:fillRect/>
+          </a:stretch>
+        </p:blipFill>
+        <p:spPr>
+          <a:xfrm>
+            <a:off x="1147233" y="365125"/>
+            <a:ext cx="9897533" cy="6220974"/>
+          </a:xfrm>
+          <a:prstGeom prst="rect">
+            <a:avLst/>
+          </a:prstGeom>
+        </p:spPr>
+      </p:pic>
+    </p:spTree>
+    <p:extLst>
+      <p:ext uri="{BB962C8B-B14F-4D97-AF65-F5344CB8AC3E}">
+        <p14:creationId xmlns:p14="http://schemas.microsoft.com/office/powerpoint/2010/main" val="1235228311"/>
       </p:ext>
     </p:extLst>
   </p:cSld>
@@ -6336,6 +7178,448 @@
 </p:sld>
 </file>
 
+<file path=ppt/slides/slide30.xml><?xml version="1.0" encoding="utf-8"?>
+<p:sld xmlns:a="http://schemas.openxmlformats.org/drawingml/2006/main" xmlns:r="http://schemas.openxmlformats.org/officeDocument/2006/relationships" xmlns:p="http://schemas.openxmlformats.org/presentationml/2006/main">
+  <p:cSld>
+    <p:spTree>
+      <p:nvGrpSpPr>
+        <p:cNvPr id="1" name=""/>
+        <p:cNvGrpSpPr/>
+        <p:nvPr/>
+      </p:nvGrpSpPr>
+      <p:grpSpPr>
+        <a:xfrm>
+          <a:off x="0" y="0"/>
+          <a:ext cx="0" cy="0"/>
+          <a:chOff x="0" y="0"/>
+          <a:chExt cx="0" cy="0"/>
+        </a:xfrm>
+      </p:grpSpPr>
+      <p:sp>
+        <p:nvSpPr>
+          <p:cNvPr id="2" name="Заголовок 1"/>
+          <p:cNvSpPr>
+            <a:spLocks noGrp="1"/>
+          </p:cNvSpPr>
+          <p:nvPr>
+            <p:ph type="title"/>
+          </p:nvPr>
+        </p:nvSpPr>
+        <p:spPr/>
+        <p:txBody>
+          <a:bodyPr/>
+          <a:lstStyle/>
+          <a:p>
+            <a:r>
+              <a:rPr lang="ru-RU" dirty="0" smtClean="0"/>
+              <a:t>Преимущества и недостатки</a:t>
+            </a:r>
+            <a:endParaRPr lang="ru-RU" dirty="0"/>
+          </a:p>
+        </p:txBody>
+      </p:sp>
+      <p:sp>
+        <p:nvSpPr>
+          <p:cNvPr id="3" name="Объект 2"/>
+          <p:cNvSpPr>
+            <a:spLocks noGrp="1"/>
+          </p:cNvSpPr>
+          <p:nvPr>
+            <p:ph idx="1"/>
+          </p:nvPr>
+        </p:nvSpPr>
+        <p:spPr>
+          <a:xfrm>
+            <a:off x="838200" y="1825625"/>
+            <a:ext cx="10515600" cy="4444546"/>
+          </a:xfrm>
+        </p:spPr>
+        <p:txBody>
+          <a:bodyPr>
+            <a:normAutofit fontScale="55000" lnSpcReduction="20000"/>
+          </a:bodyPr>
+          <a:lstStyle/>
+          <a:p>
+            <a:pPr marL="0" indent="0" fontAlgn="base">
+              <a:buNone/>
+            </a:pPr>
+            <a:r>
+              <a:rPr lang="ru-RU" b="1" dirty="0"/>
+              <a:t>Преимущества:</a:t>
+            </a:r>
+          </a:p>
+          <a:p>
+            <a:pPr fontAlgn="base"/>
+            <a:r>
+              <a:rPr lang="ru-RU" b="1" dirty="0"/>
+              <a:t>Упрощение рабочего процесса</a:t>
+            </a:r>
+            <a:r>
+              <a:rPr lang="ru-RU" dirty="0"/>
+              <a:t>: </a:t>
+            </a:r>
+            <a:r>
+              <a:rPr lang="ru-RU" dirty="0" smtClean="0"/>
+              <a:t>Использование переменных, вложенности, </a:t>
+            </a:r>
+            <a:r>
+              <a:rPr lang="ru-RU" dirty="0" err="1"/>
+              <a:t>миксины</a:t>
+            </a:r>
+            <a:r>
+              <a:rPr lang="ru-RU" dirty="0"/>
+              <a:t>, что делает код более организованным и легким для понимания.</a:t>
+            </a:r>
+          </a:p>
+          <a:p>
+            <a:pPr fontAlgn="base"/>
+            <a:r>
+              <a:rPr lang="ru-RU" b="1" dirty="0"/>
+              <a:t>Снижение повторяющегося кода</a:t>
+            </a:r>
+            <a:r>
+              <a:rPr lang="ru-RU" dirty="0"/>
+              <a:t>: Благодаря возможности создания функций и </a:t>
+            </a:r>
+            <a:r>
+              <a:rPr lang="ru-RU" dirty="0" err="1"/>
+              <a:t>миксинов</a:t>
+            </a:r>
+            <a:r>
+              <a:rPr lang="ru-RU" dirty="0"/>
+              <a:t>, можно избежать дублирования кода, что упрощает его поддержку.</a:t>
+            </a:r>
+          </a:p>
+          <a:p>
+            <a:pPr fontAlgn="base"/>
+            <a:r>
+              <a:rPr lang="ru-RU" b="1" dirty="0"/>
+              <a:t>Поддержка модульности</a:t>
+            </a:r>
+            <a:r>
+              <a:rPr lang="ru-RU" dirty="0"/>
+              <a:t>: </a:t>
+            </a:r>
+            <a:r>
+              <a:rPr lang="ru-RU" dirty="0" err="1"/>
+              <a:t>Sass</a:t>
+            </a:r>
+            <a:r>
+              <a:rPr lang="ru-RU" dirty="0"/>
+              <a:t>/SCSS позволяет разбивать стили на </a:t>
+            </a:r>
+            <a:r>
+              <a:rPr lang="ru-RU" dirty="0" smtClean="0"/>
+              <a:t>модули, что подойдёт для больших проектов.</a:t>
+            </a:r>
+            <a:endParaRPr lang="ru-RU" dirty="0"/>
+          </a:p>
+          <a:p>
+            <a:pPr fontAlgn="base"/>
+            <a:r>
+              <a:rPr lang="ru-RU" b="1" dirty="0"/>
+              <a:t>Расширенные возможности</a:t>
+            </a:r>
+            <a:r>
+              <a:rPr lang="ru-RU" dirty="0"/>
+              <a:t>: </a:t>
+            </a:r>
+            <a:r>
+              <a:rPr lang="ru-RU" dirty="0" err="1"/>
+              <a:t>Sass</a:t>
+            </a:r>
+            <a:r>
+              <a:rPr lang="ru-RU" dirty="0"/>
+              <a:t>/SCSS предлагает множество функций, таких как циклы, условия и математические </a:t>
+            </a:r>
+            <a:r>
+              <a:rPr lang="ru-RU" dirty="0" smtClean="0"/>
+              <a:t>операции.</a:t>
+            </a:r>
+            <a:endParaRPr lang="ru-RU" dirty="0"/>
+          </a:p>
+          <a:p>
+            <a:pPr marL="0" indent="0" fontAlgn="base">
+              <a:buNone/>
+            </a:pPr>
+            <a:r>
+              <a:rPr lang="ru-RU" b="1" dirty="0" smtClean="0"/>
+              <a:t>Недостатки</a:t>
+            </a:r>
+            <a:r>
+              <a:rPr lang="ru-RU" b="1" dirty="0"/>
+              <a:t>:</a:t>
+            </a:r>
+          </a:p>
+          <a:p>
+            <a:pPr fontAlgn="base"/>
+            <a:r>
+              <a:rPr lang="ru-RU" b="1" dirty="0"/>
+              <a:t>Необходимость изучения нового синтаксиса</a:t>
+            </a:r>
+            <a:r>
+              <a:rPr lang="ru-RU" dirty="0"/>
+              <a:t>: Для работы с </a:t>
+            </a:r>
+            <a:r>
+              <a:rPr lang="ru-RU" dirty="0" err="1"/>
+              <a:t>Sass</a:t>
+            </a:r>
+            <a:r>
+              <a:rPr lang="ru-RU" dirty="0"/>
+              <a:t>/SCSS требуется время на изучение его особенностей и синтаксиса.</a:t>
+            </a:r>
+          </a:p>
+          <a:p>
+            <a:pPr fontAlgn="base"/>
+            <a:r>
+              <a:rPr lang="ru-RU" b="1" dirty="0"/>
+              <a:t>Зависимость от компиляции</a:t>
+            </a:r>
+            <a:r>
+              <a:rPr lang="ru-RU" dirty="0"/>
+              <a:t>: </a:t>
+            </a:r>
+            <a:r>
+              <a:rPr lang="ru-RU" dirty="0" err="1"/>
+              <a:t>Sass</a:t>
+            </a:r>
+            <a:r>
+              <a:rPr lang="ru-RU" dirty="0"/>
+              <a:t>/SCSS необходимо компилировать в CSS, что добавляет дополнительный шаг в рабочий процесс.</a:t>
+            </a:r>
+          </a:p>
+          <a:p>
+            <a:pPr fontAlgn="base"/>
+            <a:r>
+              <a:rPr lang="ru-RU" b="1" dirty="0"/>
+              <a:t>Потенциальная сложность</a:t>
+            </a:r>
+            <a:r>
+              <a:rPr lang="ru-RU" dirty="0"/>
+              <a:t>: </a:t>
+            </a:r>
+            <a:r>
+              <a:rPr lang="ru-RU" dirty="0" err="1" smtClean="0"/>
+              <a:t>Sass</a:t>
+            </a:r>
+            <a:r>
+              <a:rPr lang="ru-RU" dirty="0" smtClean="0"/>
+              <a:t>/SCSS </a:t>
+            </a:r>
+            <a:r>
+              <a:rPr lang="ru-RU" dirty="0"/>
+              <a:t>код может стать сложным и трудным для понимания.</a:t>
+            </a:r>
+          </a:p>
+          <a:p>
+            <a:r>
+              <a:rPr lang="ru-RU" b="1" dirty="0" smtClean="0"/>
+              <a:t>Нет обратной совместимости </a:t>
+            </a:r>
+            <a:r>
+              <a:rPr lang="en-US" b="1" dirty="0" smtClean="0"/>
+              <a:t>CSS</a:t>
+            </a:r>
+            <a:r>
+              <a:rPr lang="ru-RU" b="1" dirty="0" smtClean="0"/>
+              <a:t> к </a:t>
+            </a:r>
+            <a:r>
+              <a:rPr lang="en-US" b="1" dirty="0" smtClean="0"/>
+              <a:t>SCSS: </a:t>
+            </a:r>
+            <a:r>
+              <a:rPr lang="ru-RU" dirty="0" smtClean="0"/>
+              <a:t>На сайте может быть очень сильно изменён</a:t>
+            </a:r>
+            <a:r>
+              <a:rPr lang="en-US" dirty="0" smtClean="0"/>
+              <a:t> </a:t>
+            </a:r>
+            <a:r>
+              <a:rPr lang="ru-RU" dirty="0" smtClean="0"/>
+              <a:t>скомпилированный </a:t>
+            </a:r>
+            <a:r>
+              <a:rPr lang="en-US" dirty="0" smtClean="0"/>
+              <a:t>CSS</a:t>
+            </a:r>
+            <a:r>
+              <a:rPr lang="ru-RU" dirty="0" smtClean="0"/>
+              <a:t>, что приводит к неактуальности препроцессора.</a:t>
+            </a:r>
+            <a:endParaRPr lang="ru-RU" b="1" dirty="0"/>
+          </a:p>
+        </p:txBody>
+      </p:sp>
+    </p:spTree>
+    <p:extLst>
+      <p:ext uri="{BB962C8B-B14F-4D97-AF65-F5344CB8AC3E}">
+        <p14:creationId xmlns:p14="http://schemas.microsoft.com/office/powerpoint/2010/main" val="4009864047"/>
+      </p:ext>
+    </p:extLst>
+  </p:cSld>
+  <p:clrMapOvr>
+    <a:masterClrMapping/>
+  </p:clrMapOvr>
+</p:sld>
+</file>
+
+<file path=ppt/slides/slide31.xml><?xml version="1.0" encoding="utf-8"?>
+<p:sld xmlns:a="http://schemas.openxmlformats.org/drawingml/2006/main" xmlns:r="http://schemas.openxmlformats.org/officeDocument/2006/relationships" xmlns:p="http://schemas.openxmlformats.org/presentationml/2006/main">
+  <p:cSld>
+    <p:spTree>
+      <p:nvGrpSpPr>
+        <p:cNvPr id="1" name=""/>
+        <p:cNvGrpSpPr/>
+        <p:nvPr/>
+      </p:nvGrpSpPr>
+      <p:grpSpPr>
+        <a:xfrm>
+          <a:off x="0" y="0"/>
+          <a:ext cx="0" cy="0"/>
+          <a:chOff x="0" y="0"/>
+          <a:chExt cx="0" cy="0"/>
+        </a:xfrm>
+      </p:grpSpPr>
+      <p:sp>
+        <p:nvSpPr>
+          <p:cNvPr id="2" name="Заголовок 1"/>
+          <p:cNvSpPr>
+            <a:spLocks noGrp="1"/>
+          </p:cNvSpPr>
+          <p:nvPr>
+            <p:ph type="title"/>
+          </p:nvPr>
+        </p:nvSpPr>
+        <p:spPr/>
+        <p:txBody>
+          <a:bodyPr/>
+          <a:lstStyle/>
+          <a:p>
+            <a:r>
+              <a:rPr lang="en-US" dirty="0" smtClean="0"/>
+              <a:t>CSS Nesting</a:t>
+            </a:r>
+            <a:endParaRPr lang="ru-RU" dirty="0"/>
+          </a:p>
+        </p:txBody>
+      </p:sp>
+      <p:sp>
+        <p:nvSpPr>
+          <p:cNvPr id="3" name="Объект 2"/>
+          <p:cNvSpPr>
+            <a:spLocks noGrp="1"/>
+          </p:cNvSpPr>
+          <p:nvPr>
+            <p:ph idx="1"/>
+          </p:nvPr>
+        </p:nvSpPr>
+        <p:spPr>
+          <a:xfrm>
+            <a:off x="838200" y="1825624"/>
+            <a:ext cx="5833533" cy="4117975"/>
+          </a:xfrm>
+        </p:spPr>
+        <p:txBody>
+          <a:bodyPr>
+            <a:normAutofit/>
+          </a:bodyPr>
+          <a:lstStyle/>
+          <a:p>
+            <a:pPr marL="0" indent="0">
+              <a:buNone/>
+            </a:pPr>
+            <a:r>
+              <a:rPr lang="ru-RU" dirty="0" smtClean="0"/>
+              <a:t>В CSS появилась возможность использовать вложенность внутри селекторов с введением спецификации CSS </a:t>
+            </a:r>
+            <a:r>
+              <a:rPr lang="ru-RU" dirty="0" err="1" smtClean="0"/>
+              <a:t>Nesting</a:t>
+            </a:r>
+            <a:r>
+              <a:rPr lang="ru-RU" dirty="0" smtClean="0"/>
+              <a:t>. Однако есть отличия от вложенности в SCSS:</a:t>
+            </a:r>
+          </a:p>
+          <a:p>
+            <a:r>
+              <a:rPr lang="ru-RU" dirty="0" smtClean="0"/>
+              <a:t>Нельзя использовать БЭМ</a:t>
+            </a:r>
+          </a:p>
+          <a:p>
+            <a:r>
+              <a:rPr lang="en-US" dirty="0" err="1" smtClean="0"/>
+              <a:t>Css</a:t>
+            </a:r>
+            <a:r>
+              <a:rPr lang="en-US" dirty="0" smtClean="0"/>
+              <a:t> </a:t>
+            </a:r>
+            <a:r>
+              <a:rPr lang="ru-RU" dirty="0" err="1" smtClean="0"/>
+              <a:t>валидатор</a:t>
+            </a:r>
+            <a:r>
+              <a:rPr lang="en-US" dirty="0" smtClean="0"/>
+              <a:t> W3C </a:t>
+            </a:r>
+            <a:r>
+              <a:rPr lang="ru-RU" dirty="0" smtClean="0"/>
+              <a:t>указывает ошибку</a:t>
+            </a:r>
+            <a:r>
+              <a:rPr lang="en-US" dirty="0" smtClean="0"/>
+              <a:t> </a:t>
+            </a:r>
+            <a:r>
+              <a:rPr lang="ru-RU" dirty="0" smtClean="0"/>
+              <a:t>в первой вложенности</a:t>
+            </a:r>
+            <a:endParaRPr lang="en-US" dirty="0" smtClean="0"/>
+          </a:p>
+        </p:txBody>
+      </p:sp>
+      <p:pic>
+        <p:nvPicPr>
+          <p:cNvPr id="7" name="Рисунок 6"/>
+          <p:cNvPicPr>
+            <a:picLocks noChangeAspect="1"/>
+          </p:cNvPicPr>
+          <p:nvPr/>
+        </p:nvPicPr>
+        <p:blipFill>
+          <a:blip r:embed="rId2"/>
+          <a:stretch>
+            <a:fillRect/>
+          </a:stretch>
+        </p:blipFill>
+        <p:spPr>
+          <a:xfrm>
+            <a:off x="7035800" y="365125"/>
+            <a:ext cx="4318000" cy="5914689"/>
+          </a:xfrm>
+          <a:prstGeom prst="rect">
+            <a:avLst/>
+          </a:prstGeom>
+        </p:spPr>
+      </p:pic>
+    </p:spTree>
+    <p:extLst>
+      <p:ext uri="{BB962C8B-B14F-4D97-AF65-F5344CB8AC3E}">
+        <p14:creationId xmlns:p14="http://schemas.microsoft.com/office/powerpoint/2010/main" val="17073257"/>
+      </p:ext>
+    </p:extLst>
+  </p:cSld>
+  <p:clrMapOvr>
+    <a:masterClrMapping/>
+  </p:clrMapOvr>
+</p:sld>
+</file>
+
 <file path=ppt/slides/slide4.xml><?xml version="1.0" encoding="utf-8"?>
 <p:sld xmlns:a="http://schemas.openxmlformats.org/drawingml/2006/main" xmlns:r="http://schemas.openxmlformats.org/officeDocument/2006/relationships" xmlns:p="http://schemas.openxmlformats.org/presentationml/2006/main">
   <p:cSld>
@@ -6401,7 +7685,7 @@
               <a:buNone/>
             </a:pPr>
             <a:r>
-              <a:rPr lang="ru-RU" smtClean="0"/>
+              <a:rPr lang="ru-RU" dirty="0" smtClean="0"/>
               <a:t>Отличительная </a:t>
             </a:r>
             <a:r>

</xml_diff>